<commit_message>
Adjusted Tkinter Views to display OS Check Data
</commit_message>
<xml_diff>
--- a/tests/Tkinter_Documents.pptx
+++ b/tests/Tkinter_Documents.pptx
@@ -5,7 +5,7 @@
     <p:sldMasterId id="2147483660" r:id="rId1"/>
   </p:sldMasterIdLst>
   <p:notesMasterIdLst>
-    <p:notesMasterId r:id="rId12"/>
+    <p:notesMasterId r:id="rId13"/>
   </p:notesMasterIdLst>
   <p:sldIdLst>
     <p:sldId id="256" r:id="rId2"/>
@@ -16,8 +16,9 @@
     <p:sldId id="260" r:id="rId7"/>
     <p:sldId id="263" r:id="rId8"/>
     <p:sldId id="265" r:id="rId9"/>
-    <p:sldId id="264" r:id="rId10"/>
-    <p:sldId id="258" r:id="rId11"/>
+    <p:sldId id="266" r:id="rId10"/>
+    <p:sldId id="264" r:id="rId11"/>
+    <p:sldId id="258" r:id="rId12"/>
   </p:sldIdLst>
   <p:sldSz cx="12192000" cy="6858000"/>
   <p:notesSz cx="6858000" cy="9144000"/>
@@ -209,7 +210,7 @@
           <a:p>
             <a:fld id="{089FC181-5490-4994-A86D-09FB2004977B}" type="datetimeFigureOut">
               <a:rPr lang="en-US" smtClean="0"/>
-              <a:t>10/31/2020</a:t>
+              <a:t>11/4/2020</a:t>
             </a:fld>
             <a:endParaRPr lang="en-US"/>
           </a:p>
@@ -2674,7 +2675,7 @@
           <a:p>
             <a:fld id="{FDF5DC59-2B0F-4EDE-9489-3C8259300622}" type="datetimeFigureOut">
               <a:rPr lang="en-US" smtClean="0"/>
-              <a:t>10/31/2020</a:t>
+              <a:t>11/4/2020</a:t>
             </a:fld>
             <a:endParaRPr lang="en-US"/>
           </a:p>
@@ -4897,7 +4898,7 @@
           <a:p>
             <a:fld id="{FDF5DC59-2B0F-4EDE-9489-3C8259300622}" type="datetimeFigureOut">
               <a:rPr lang="en-US" smtClean="0"/>
-              <a:t>10/31/2020</a:t>
+              <a:t>11/4/2020</a:t>
             </a:fld>
             <a:endParaRPr lang="en-US"/>
           </a:p>
@@ -7122,7 +7123,7 @@
           <a:p>
             <a:fld id="{FDF5DC59-2B0F-4EDE-9489-3C8259300622}" type="datetimeFigureOut">
               <a:rPr lang="en-US" smtClean="0"/>
-              <a:t>10/31/2020</a:t>
+              <a:t>11/4/2020</a:t>
             </a:fld>
             <a:endParaRPr lang="en-US"/>
           </a:p>
@@ -9358,7 +9359,7 @@
           <a:p>
             <a:fld id="{FDF5DC59-2B0F-4EDE-9489-3C8259300622}" type="datetimeFigureOut">
               <a:rPr lang="en-US" smtClean="0"/>
-              <a:t>10/31/2020</a:t>
+              <a:t>11/4/2020</a:t>
             </a:fld>
             <a:endParaRPr lang="en-US"/>
           </a:p>
@@ -11665,7 +11666,7 @@
           <a:p>
             <a:fld id="{FDF5DC59-2B0F-4EDE-9489-3C8259300622}" type="datetimeFigureOut">
               <a:rPr lang="en-US" smtClean="0"/>
-              <a:t>10/31/2020</a:t>
+              <a:t>11/4/2020</a:t>
             </a:fld>
             <a:endParaRPr lang="en-US"/>
           </a:p>
@@ -14660,6 +14661,1163 @@
           <p:cNvPr id="7" name="Text Placeholder 6">
             <a:extLst>
               <a:ext uri="{FF2B5EF4-FFF2-40B4-BE49-F238E27FC236}">
+                <a16:creationId xmlns:a16="http://schemas.microsoft.com/office/drawing/2014/main" id="{5581AA15-67BB-4623-9110-732E1D643410}"/>
+              </a:ext>
+            </a:extLst>
+          </p:cNvPr>
+          <p:cNvSpPr>
+            <a:spLocks noGrp="1"/>
+          </p:cNvSpPr>
+          <p:nvPr>
+            <p:ph type="body" sz="quarter" idx="10"/>
+          </p:nvPr>
+        </p:nvSpPr>
+        <p:spPr/>
+        <p:txBody>
+          <a:bodyPr>
+            <a:normAutofit fontScale="25000" lnSpcReduction="20000"/>
+          </a:bodyPr>
+          <a:lstStyle/>
+          <a:p>
+            <a:endParaRPr lang="en-US"/>
+          </a:p>
+        </p:txBody>
+      </p:sp>
+      <p:sp>
+        <p:nvSpPr>
+          <p:cNvPr id="8" name="Text Placeholder 7">
+            <a:extLst>
+              <a:ext uri="{FF2B5EF4-FFF2-40B4-BE49-F238E27FC236}">
+                <a16:creationId xmlns:a16="http://schemas.microsoft.com/office/drawing/2014/main" id="{859748B0-2778-4FCE-A833-52754ECDAF94}"/>
+              </a:ext>
+            </a:extLst>
+          </p:cNvPr>
+          <p:cNvSpPr>
+            <a:spLocks noGrp="1"/>
+          </p:cNvSpPr>
+          <p:nvPr>
+            <p:ph type="body" sz="quarter" idx="11"/>
+          </p:nvPr>
+        </p:nvSpPr>
+        <p:spPr/>
+        <p:txBody>
+          <a:bodyPr>
+            <a:normAutofit fontScale="25000" lnSpcReduction="20000"/>
+          </a:bodyPr>
+          <a:lstStyle/>
+          <a:p>
+            <a:endParaRPr lang="en-US"/>
+          </a:p>
+        </p:txBody>
+      </p:sp>
+      <p:sp>
+        <p:nvSpPr>
+          <p:cNvPr id="9" name="Text Placeholder 8">
+            <a:extLst>
+              <a:ext uri="{FF2B5EF4-FFF2-40B4-BE49-F238E27FC236}">
+                <a16:creationId xmlns:a16="http://schemas.microsoft.com/office/drawing/2014/main" id="{7D89670E-1CFF-4CDA-96CA-83FF22035A7D}"/>
+              </a:ext>
+            </a:extLst>
+          </p:cNvPr>
+          <p:cNvSpPr>
+            <a:spLocks noGrp="1"/>
+          </p:cNvSpPr>
+          <p:nvPr>
+            <p:ph type="body" sz="quarter" idx="12"/>
+          </p:nvPr>
+        </p:nvSpPr>
+        <p:spPr/>
+        <p:txBody>
+          <a:bodyPr>
+            <a:normAutofit fontScale="25000" lnSpcReduction="20000"/>
+          </a:bodyPr>
+          <a:lstStyle/>
+          <a:p>
+            <a:endParaRPr lang="en-US"/>
+          </a:p>
+        </p:txBody>
+      </p:sp>
+      <p:sp>
+        <p:nvSpPr>
+          <p:cNvPr id="11" name="Rectangle 10">
+            <a:extLst>
+              <a:ext uri="{FF2B5EF4-FFF2-40B4-BE49-F238E27FC236}">
+                <a16:creationId xmlns:a16="http://schemas.microsoft.com/office/drawing/2014/main" id="{41BD6FBB-736D-415E-88A3-2FE5FCBF84C0}"/>
+              </a:ext>
+            </a:extLst>
+          </p:cNvPr>
+          <p:cNvSpPr/>
+          <p:nvPr/>
+        </p:nvSpPr>
+        <p:spPr>
+          <a:xfrm>
+            <a:off x="285409" y="469659"/>
+            <a:ext cx="2165691" cy="1942315"/>
+          </a:xfrm>
+          <a:prstGeom prst="rect">
+            <a:avLst/>
+          </a:prstGeom>
+          <a:noFill/>
+          <a:ln w="9525" cap="flat" cmpd="sng" algn="ctr">
+            <a:solidFill>
+              <a:schemeClr val="dk1"/>
+            </a:solidFill>
+            <a:prstDash val="solid"/>
+            <a:round/>
+            <a:headEnd type="none" w="med" len="med"/>
+            <a:tailEnd type="none" w="med" len="med"/>
+          </a:ln>
+        </p:spPr>
+        <p:style>
+          <a:lnRef idx="0">
+            <a:scrgbClr r="0" g="0" b="0"/>
+          </a:lnRef>
+          <a:fillRef idx="0">
+            <a:scrgbClr r="0" g="0" b="0"/>
+          </a:fillRef>
+          <a:effectRef idx="0">
+            <a:scrgbClr r="0" g="0" b="0"/>
+          </a:effectRef>
+          <a:fontRef idx="minor">
+            <a:schemeClr val="dk1"/>
+          </a:fontRef>
+        </p:style>
+        <p:txBody>
+          <a:bodyPr rtlCol="0" anchor="ctr"/>
+          <a:lstStyle/>
+          <a:p>
+            <a:endParaRPr lang="en-US" sz="800">
+              <a:solidFill>
+                <a:schemeClr val="bg1"/>
+              </a:solidFill>
+              <a:latin typeface="Arial" panose="020B0604020202020204" pitchFamily="34" charset="0"/>
+              <a:cs typeface="Arial" panose="020B0604020202020204" pitchFamily="34" charset="0"/>
+            </a:endParaRPr>
+          </a:p>
+        </p:txBody>
+      </p:sp>
+      <p:sp>
+        <p:nvSpPr>
+          <p:cNvPr id="13" name="Rectangle 12">
+            <a:extLst>
+              <a:ext uri="{FF2B5EF4-FFF2-40B4-BE49-F238E27FC236}">
+                <a16:creationId xmlns:a16="http://schemas.microsoft.com/office/drawing/2014/main" id="{6BCD3098-6DB2-466B-96A2-AA05498B858D}"/>
+              </a:ext>
+            </a:extLst>
+          </p:cNvPr>
+          <p:cNvSpPr/>
+          <p:nvPr/>
+        </p:nvSpPr>
+        <p:spPr>
+          <a:xfrm>
+            <a:off x="285423" y="224093"/>
+            <a:ext cx="1191689" cy="245566"/>
+          </a:xfrm>
+          <a:prstGeom prst="rect">
+            <a:avLst/>
+          </a:prstGeom>
+          <a:noFill/>
+          <a:ln w="9525" cap="flat" cmpd="sng" algn="ctr">
+            <a:solidFill>
+              <a:schemeClr val="dk1"/>
+            </a:solidFill>
+            <a:prstDash val="solid"/>
+            <a:round/>
+            <a:headEnd type="none" w="med" len="med"/>
+            <a:tailEnd type="none" w="med" len="med"/>
+          </a:ln>
+        </p:spPr>
+        <p:style>
+          <a:lnRef idx="0">
+            <a:scrgbClr r="0" g="0" b="0"/>
+          </a:lnRef>
+          <a:fillRef idx="0">
+            <a:scrgbClr r="0" g="0" b="0"/>
+          </a:fillRef>
+          <a:effectRef idx="0">
+            <a:scrgbClr r="0" g="0" b="0"/>
+          </a:effectRef>
+          <a:fontRef idx="minor">
+            <a:schemeClr val="dk1"/>
+          </a:fontRef>
+        </p:style>
+        <p:txBody>
+          <a:bodyPr rtlCol="0" anchor="ctr"/>
+          <a:lstStyle/>
+          <a:p>
+            <a:pPr algn="ctr"/>
+            <a:r>
+              <a:rPr lang="en-US" sz="800">
+                <a:solidFill>
+                  <a:schemeClr val="bg1"/>
+                </a:solidFill>
+                <a:latin typeface="Arial" panose="020B0604020202020204" pitchFamily="34" charset="0"/>
+                <a:cs typeface="Arial" panose="020B0604020202020204" pitchFamily="34" charset="0"/>
+              </a:rPr>
+              <a:t>&lt;&lt;Controller&gt;&gt;</a:t>
+            </a:r>
+          </a:p>
+        </p:txBody>
+      </p:sp>
+      <p:sp>
+        <p:nvSpPr>
+          <p:cNvPr id="15" name="Rectangle 14">
+            <a:extLst>
+              <a:ext uri="{FF2B5EF4-FFF2-40B4-BE49-F238E27FC236}">
+                <a16:creationId xmlns:a16="http://schemas.microsoft.com/office/drawing/2014/main" id="{3F001311-87F5-4234-961C-BB162371DA19}"/>
+              </a:ext>
+            </a:extLst>
+          </p:cNvPr>
+          <p:cNvSpPr/>
+          <p:nvPr/>
+        </p:nvSpPr>
+        <p:spPr>
+          <a:xfrm>
+            <a:off x="352083" y="564590"/>
+            <a:ext cx="1934551" cy="157162"/>
+          </a:xfrm>
+          <a:prstGeom prst="rect">
+            <a:avLst/>
+          </a:prstGeom>
+          <a:noFill/>
+          <a:ln w="9525" cap="flat" cmpd="sng" algn="ctr">
+            <a:solidFill>
+              <a:schemeClr val="dk1"/>
+            </a:solidFill>
+            <a:prstDash val="solid"/>
+            <a:round/>
+            <a:headEnd type="none" w="med" len="med"/>
+            <a:tailEnd type="none" w="med" len="med"/>
+          </a:ln>
+        </p:spPr>
+        <p:style>
+          <a:lnRef idx="0">
+            <a:scrgbClr r="0" g="0" b="0"/>
+          </a:lnRef>
+          <a:fillRef idx="0">
+            <a:scrgbClr r="0" g="0" b="0"/>
+          </a:fillRef>
+          <a:effectRef idx="0">
+            <a:scrgbClr r="0" g="0" b="0"/>
+          </a:effectRef>
+          <a:fontRef idx="minor">
+            <a:schemeClr val="dk1"/>
+          </a:fontRef>
+        </p:style>
+        <p:txBody>
+          <a:bodyPr rtlCol="0" anchor="ctr"/>
+          <a:lstStyle/>
+          <a:p>
+            <a:r>
+              <a:rPr lang="en-US" sz="800" err="1">
+                <a:solidFill>
+                  <a:schemeClr val="bg1"/>
+                </a:solidFill>
+                <a:latin typeface="Arial" panose="020B0604020202020204" pitchFamily="34" charset="0"/>
+                <a:cs typeface="Arial" panose="020B0604020202020204" pitchFamily="34" charset="0"/>
+              </a:rPr>
+              <a:t>Control_View</a:t>
+            </a:r>
+            <a:r>
+              <a:rPr lang="en-US" sz="800">
+                <a:solidFill>
+                  <a:schemeClr val="bg1"/>
+                </a:solidFill>
+                <a:latin typeface="Arial" panose="020B0604020202020204" pitchFamily="34" charset="0"/>
+                <a:cs typeface="Arial" panose="020B0604020202020204" pitchFamily="34" charset="0"/>
+              </a:rPr>
+              <a:t>(self, parent) </a:t>
+            </a:r>
+          </a:p>
+        </p:txBody>
+      </p:sp>
+      <p:sp>
+        <p:nvSpPr>
+          <p:cNvPr id="17" name="Rectangle: Folded Corner 16">
+            <a:extLst>
+              <a:ext uri="{FF2B5EF4-FFF2-40B4-BE49-F238E27FC236}">
+                <a16:creationId xmlns:a16="http://schemas.microsoft.com/office/drawing/2014/main" id="{B7E277BC-FA7C-4166-8D1E-BF64E20ED41E}"/>
+              </a:ext>
+            </a:extLst>
+          </p:cNvPr>
+          <p:cNvSpPr/>
+          <p:nvPr/>
+        </p:nvSpPr>
+        <p:spPr>
+          <a:xfrm>
+            <a:off x="2807335" y="317404"/>
+            <a:ext cx="1771015" cy="304896"/>
+          </a:xfrm>
+          <a:prstGeom prst="foldedCorner">
+            <a:avLst/>
+          </a:prstGeom>
+          <a:solidFill>
+            <a:srgbClr val="FFFFCC"/>
+          </a:solidFill>
+          <a:ln w="9525" cap="flat" cmpd="sng" algn="ctr">
+            <a:solidFill>
+              <a:schemeClr val="dk1"/>
+            </a:solidFill>
+            <a:prstDash val="solid"/>
+            <a:round/>
+            <a:headEnd type="none" w="med" len="med"/>
+            <a:tailEnd type="none" w="med" len="med"/>
+          </a:ln>
+        </p:spPr>
+        <p:style>
+          <a:lnRef idx="0">
+            <a:scrgbClr r="0" g="0" b="0"/>
+          </a:lnRef>
+          <a:fillRef idx="0">
+            <a:scrgbClr r="0" g="0" b="0"/>
+          </a:fillRef>
+          <a:effectRef idx="0">
+            <a:scrgbClr r="0" g="0" b="0"/>
+          </a:effectRef>
+          <a:fontRef idx="minor">
+            <a:schemeClr val="dk1"/>
+          </a:fontRef>
+        </p:style>
+        <p:txBody>
+          <a:bodyPr rtlCol="0" anchor="ctr"/>
+          <a:lstStyle/>
+          <a:p>
+            <a:pPr marL="171450" indent="-171450">
+              <a:buFont typeface="Arial" panose="020B0604020202020204" pitchFamily="34" charset="0"/>
+              <a:buChar char="•"/>
+            </a:pPr>
+            <a:r>
+              <a:rPr lang="en-US" sz="800" b="1">
+                <a:solidFill>
+                  <a:schemeClr val="bg1"/>
+                </a:solidFill>
+                <a:latin typeface="Arial" panose="020B0604020202020204" pitchFamily="34" charset="0"/>
+                <a:cs typeface="Arial" panose="020B0604020202020204" pitchFamily="34" charset="0"/>
+              </a:rPr>
+              <a:t>parent</a:t>
+            </a:r>
+            <a:r>
+              <a:rPr lang="en-US" sz="800">
+                <a:solidFill>
+                  <a:schemeClr val="bg1"/>
+                </a:solidFill>
+                <a:latin typeface="Arial" panose="020B0604020202020204" pitchFamily="34" charset="0"/>
+                <a:cs typeface="Arial" panose="020B0604020202020204" pitchFamily="34" charset="0"/>
+              </a:rPr>
+              <a:t> − reference to app.py</a:t>
+            </a:r>
+          </a:p>
+        </p:txBody>
+      </p:sp>
+      <p:graphicFrame>
+        <p:nvGraphicFramePr>
+          <p:cNvPr id="19" name="Table 18">
+            <a:extLst>
+              <a:ext uri="{FF2B5EF4-FFF2-40B4-BE49-F238E27FC236}">
+                <a16:creationId xmlns:a16="http://schemas.microsoft.com/office/drawing/2014/main" id="{C2CD78FC-A6A9-45AD-972D-E6EBB5E21B61}"/>
+              </a:ext>
+            </a:extLst>
+          </p:cNvPr>
+          <p:cNvGraphicFramePr>
+            <a:graphicFrameLocks noGrp="1"/>
+          </p:cNvGraphicFramePr>
+          <p:nvPr/>
+        </p:nvGraphicFramePr>
+        <p:xfrm>
+          <a:off x="3153833" y="1325216"/>
+          <a:ext cx="4601633" cy="1973580"/>
+        </p:xfrm>
+        <a:graphic>
+          <a:graphicData uri="http://schemas.openxmlformats.org/drawingml/2006/table">
+            <a:tbl>
+              <a:tblPr>
+                <a:tableStyleId>{5C22544A-7EE6-4342-B048-85BDC9FD1C3A}</a:tableStyleId>
+              </a:tblPr>
+              <a:tblGrid>
+                <a:gridCol w="1075181">
+                  <a:extLst>
+                    <a:ext uri="{9D8B030D-6E8A-4147-A177-3AD203B41FA5}">
+                      <a16:colId xmlns:a16="http://schemas.microsoft.com/office/drawing/2014/main" val="1168899157"/>
+                    </a:ext>
+                  </a:extLst>
+                </a:gridCol>
+                <a:gridCol w="3526452">
+                  <a:extLst>
+                    <a:ext uri="{9D8B030D-6E8A-4147-A177-3AD203B41FA5}">
+                      <a16:colId xmlns:a16="http://schemas.microsoft.com/office/drawing/2014/main" val="862453715"/>
+                    </a:ext>
+                  </a:extLst>
+                </a:gridCol>
+              </a:tblGrid>
+              <a:tr h="184150">
+                <a:tc>
+                  <a:txBody>
+                    <a:bodyPr/>
+                    <a:lstStyle/>
+                    <a:p>
+                      <a:pPr algn="l" fontAlgn="t"/>
+                      <a:r>
+                        <a:rPr lang="en-US" sz="800" u="none" strike="noStrike">
+                          <a:effectLst/>
+                          <a:latin typeface="Arial" panose="020B0604020202020204" pitchFamily="34" charset="0"/>
+                          <a:cs typeface="Arial" panose="020B0604020202020204" pitchFamily="34" charset="0"/>
+                        </a:rPr>
+                        <a:t>Option</a:t>
+                      </a:r>
+                      <a:endParaRPr lang="en-US" sz="800" b="1" i="0" u="none" strike="noStrike">
+                        <a:solidFill>
+                          <a:srgbClr val="000000"/>
+                        </a:solidFill>
+                        <a:effectLst/>
+                        <a:latin typeface="Arial" panose="020B0604020202020204" pitchFamily="34" charset="0"/>
+                        <a:cs typeface="Arial" panose="020B0604020202020204" pitchFamily="34" charset="0"/>
+                      </a:endParaRPr>
+                    </a:p>
+                  </a:txBody>
+                  <a:tcPr marL="6350" marR="6350" marT="6350" marB="0"/>
+                </a:tc>
+                <a:tc>
+                  <a:txBody>
+                    <a:bodyPr/>
+                    <a:lstStyle/>
+                    <a:p>
+                      <a:pPr algn="l" fontAlgn="t"/>
+                      <a:r>
+                        <a:rPr lang="en-US" sz="800" u="none" strike="noStrike">
+                          <a:effectLst/>
+                          <a:latin typeface="Arial" panose="020B0604020202020204" pitchFamily="34" charset="0"/>
+                          <a:cs typeface="Arial" panose="020B0604020202020204" pitchFamily="34" charset="0"/>
+                        </a:rPr>
+                        <a:t>Description</a:t>
+                      </a:r>
+                      <a:endParaRPr lang="en-US" sz="800" b="1" i="0" u="none" strike="noStrike">
+                        <a:solidFill>
+                          <a:srgbClr val="000000"/>
+                        </a:solidFill>
+                        <a:effectLst/>
+                        <a:latin typeface="Arial" panose="020B0604020202020204" pitchFamily="34" charset="0"/>
+                        <a:cs typeface="Arial" panose="020B0604020202020204" pitchFamily="34" charset="0"/>
+                      </a:endParaRPr>
+                    </a:p>
+                  </a:txBody>
+                  <a:tcPr marL="6350" marR="6350" marT="6350" marB="0"/>
+                </a:tc>
+                <a:extLst>
+                  <a:ext uri="{0D108BD9-81ED-4DB2-BD59-A6C34878D82A}">
+                    <a16:rowId xmlns:a16="http://schemas.microsoft.com/office/drawing/2014/main" val="841674059"/>
+                  </a:ext>
+                </a:extLst>
+              </a:tr>
+              <a:tr h="184150">
+                <a:tc>
+                  <a:txBody>
+                    <a:bodyPr/>
+                    <a:lstStyle/>
+                    <a:p>
+                      <a:pPr algn="l" fontAlgn="t"/>
+                      <a:r>
+                        <a:rPr lang="en-US" sz="800" u="none" strike="noStrike">
+                          <a:effectLst/>
+                          <a:latin typeface="Arial" panose="020B0604020202020204" pitchFamily="34" charset="0"/>
+                          <a:cs typeface="Arial" panose="020B0604020202020204" pitchFamily="34" charset="0"/>
+                        </a:rPr>
+                        <a:t>bd</a:t>
+                      </a:r>
+                      <a:endParaRPr lang="en-US" sz="800" b="0" i="0" u="none" strike="noStrike">
+                        <a:solidFill>
+                          <a:srgbClr val="000000"/>
+                        </a:solidFill>
+                        <a:effectLst/>
+                        <a:latin typeface="Arial" panose="020B0604020202020204" pitchFamily="34" charset="0"/>
+                        <a:cs typeface="Arial" panose="020B0604020202020204" pitchFamily="34" charset="0"/>
+                      </a:endParaRPr>
+                    </a:p>
+                  </a:txBody>
+                  <a:tcPr marL="95250" marR="6350" marT="6350" marB="0"/>
+                </a:tc>
+                <a:tc>
+                  <a:txBody>
+                    <a:bodyPr/>
+                    <a:lstStyle/>
+                    <a:p>
+                      <a:pPr algn="l" fontAlgn="t"/>
+                      <a:r>
+                        <a:rPr lang="en-US" sz="800" u="none" strike="noStrike">
+                          <a:effectLst/>
+                          <a:latin typeface="Arial" panose="020B0604020202020204" pitchFamily="34" charset="0"/>
+                          <a:cs typeface="Arial" panose="020B0604020202020204" pitchFamily="34" charset="0"/>
+                        </a:rPr>
+                        <a:t>It represents the border width.</a:t>
+                      </a:r>
+                      <a:endParaRPr lang="en-US" sz="800" b="0" i="0" u="none" strike="noStrike">
+                        <a:solidFill>
+                          <a:srgbClr val="000000"/>
+                        </a:solidFill>
+                        <a:effectLst/>
+                        <a:latin typeface="Arial" panose="020B0604020202020204" pitchFamily="34" charset="0"/>
+                        <a:cs typeface="Arial" panose="020B0604020202020204" pitchFamily="34" charset="0"/>
+                      </a:endParaRPr>
+                    </a:p>
+                  </a:txBody>
+                  <a:tcPr marL="95250" marR="6350" marT="6350" marB="0"/>
+                </a:tc>
+                <a:extLst>
+                  <a:ext uri="{0D108BD9-81ED-4DB2-BD59-A6C34878D82A}">
+                    <a16:rowId xmlns:a16="http://schemas.microsoft.com/office/drawing/2014/main" val="1490105745"/>
+                  </a:ext>
+                </a:extLst>
+              </a:tr>
+              <a:tr h="184150">
+                <a:tc>
+                  <a:txBody>
+                    <a:bodyPr/>
+                    <a:lstStyle/>
+                    <a:p>
+                      <a:pPr algn="l" fontAlgn="t"/>
+                      <a:r>
+                        <a:rPr lang="en-US" sz="800" u="none" strike="noStrike">
+                          <a:effectLst/>
+                          <a:latin typeface="Arial" panose="020B0604020202020204" pitchFamily="34" charset="0"/>
+                          <a:cs typeface="Arial" panose="020B0604020202020204" pitchFamily="34" charset="0"/>
+                        </a:rPr>
+                        <a:t>bg</a:t>
+                      </a:r>
+                      <a:endParaRPr lang="en-US" sz="800" b="0" i="0" u="none" strike="noStrike">
+                        <a:solidFill>
+                          <a:srgbClr val="000000"/>
+                        </a:solidFill>
+                        <a:effectLst/>
+                        <a:latin typeface="Arial" panose="020B0604020202020204" pitchFamily="34" charset="0"/>
+                        <a:cs typeface="Arial" panose="020B0604020202020204" pitchFamily="34" charset="0"/>
+                      </a:endParaRPr>
+                    </a:p>
+                  </a:txBody>
+                  <a:tcPr marL="95250" marR="6350" marT="6350" marB="0"/>
+                </a:tc>
+                <a:tc>
+                  <a:txBody>
+                    <a:bodyPr/>
+                    <a:lstStyle/>
+                    <a:p>
+                      <a:pPr algn="l" fontAlgn="t"/>
+                      <a:r>
+                        <a:rPr lang="en-US" sz="800" u="none" strike="noStrike">
+                          <a:effectLst/>
+                          <a:latin typeface="Arial" panose="020B0604020202020204" pitchFamily="34" charset="0"/>
+                          <a:cs typeface="Arial" panose="020B0604020202020204" pitchFamily="34" charset="0"/>
+                        </a:rPr>
+                        <a:t>The background color of the widget.</a:t>
+                      </a:r>
+                      <a:endParaRPr lang="en-US" sz="800" b="0" i="0" u="none" strike="noStrike">
+                        <a:solidFill>
+                          <a:srgbClr val="000000"/>
+                        </a:solidFill>
+                        <a:effectLst/>
+                        <a:latin typeface="Arial" panose="020B0604020202020204" pitchFamily="34" charset="0"/>
+                        <a:cs typeface="Arial" panose="020B0604020202020204" pitchFamily="34" charset="0"/>
+                      </a:endParaRPr>
+                    </a:p>
+                  </a:txBody>
+                  <a:tcPr marL="95250" marR="6350" marT="6350" marB="0"/>
+                </a:tc>
+                <a:extLst>
+                  <a:ext uri="{0D108BD9-81ED-4DB2-BD59-A6C34878D82A}">
+                    <a16:rowId xmlns:a16="http://schemas.microsoft.com/office/drawing/2014/main" val="1509078411"/>
+                  </a:ext>
+                </a:extLst>
+              </a:tr>
+              <a:tr h="228600">
+                <a:tc>
+                  <a:txBody>
+                    <a:bodyPr/>
+                    <a:lstStyle/>
+                    <a:p>
+                      <a:pPr algn="l" fontAlgn="t"/>
+                      <a:r>
+                        <a:rPr lang="en-US" sz="800" u="none" strike="noStrike">
+                          <a:effectLst/>
+                          <a:latin typeface="Arial" panose="020B0604020202020204" pitchFamily="34" charset="0"/>
+                          <a:cs typeface="Arial" panose="020B0604020202020204" pitchFamily="34" charset="0"/>
+                        </a:rPr>
+                        <a:t>cursor</a:t>
+                      </a:r>
+                      <a:endParaRPr lang="en-US" sz="800" b="0" i="0" u="none" strike="noStrike">
+                        <a:solidFill>
+                          <a:srgbClr val="000000"/>
+                        </a:solidFill>
+                        <a:effectLst/>
+                        <a:latin typeface="Arial" panose="020B0604020202020204" pitchFamily="34" charset="0"/>
+                        <a:cs typeface="Arial" panose="020B0604020202020204" pitchFamily="34" charset="0"/>
+                      </a:endParaRPr>
+                    </a:p>
+                  </a:txBody>
+                  <a:tcPr marL="95250" marR="6350" marT="6350" marB="0"/>
+                </a:tc>
+                <a:tc>
+                  <a:txBody>
+                    <a:bodyPr/>
+                    <a:lstStyle/>
+                    <a:p>
+                      <a:pPr algn="l" fontAlgn="t"/>
+                      <a:r>
+                        <a:rPr lang="en-US" sz="800" u="none" strike="noStrike">
+                          <a:effectLst/>
+                          <a:latin typeface="Arial" panose="020B0604020202020204" pitchFamily="34" charset="0"/>
+                          <a:cs typeface="Arial" panose="020B0604020202020204" pitchFamily="34" charset="0"/>
+                        </a:rPr>
+                        <a:t>The mouse pointer is changed to the cursor type set to different values like an arrow, dot, etc.</a:t>
+                      </a:r>
+                      <a:endParaRPr lang="en-US" sz="800" b="0" i="0" u="none" strike="noStrike">
+                        <a:solidFill>
+                          <a:srgbClr val="000000"/>
+                        </a:solidFill>
+                        <a:effectLst/>
+                        <a:latin typeface="Arial" panose="020B0604020202020204" pitchFamily="34" charset="0"/>
+                        <a:cs typeface="Arial" panose="020B0604020202020204" pitchFamily="34" charset="0"/>
+                      </a:endParaRPr>
+                    </a:p>
+                  </a:txBody>
+                  <a:tcPr marL="95250" marR="6350" marT="6350" marB="0"/>
+                </a:tc>
+                <a:extLst>
+                  <a:ext uri="{0D108BD9-81ED-4DB2-BD59-A6C34878D82A}">
+                    <a16:rowId xmlns:a16="http://schemas.microsoft.com/office/drawing/2014/main" val="3823139174"/>
+                  </a:ext>
+                </a:extLst>
+              </a:tr>
+              <a:tr h="184150">
+                <a:tc>
+                  <a:txBody>
+                    <a:bodyPr/>
+                    <a:lstStyle/>
+                    <a:p>
+                      <a:pPr algn="l" fontAlgn="t"/>
+                      <a:r>
+                        <a:rPr lang="en-US" sz="800" u="none" strike="noStrike">
+                          <a:effectLst/>
+                          <a:latin typeface="Arial" panose="020B0604020202020204" pitchFamily="34" charset="0"/>
+                          <a:cs typeface="Arial" panose="020B0604020202020204" pitchFamily="34" charset="0"/>
+                        </a:rPr>
+                        <a:t>height</a:t>
+                      </a:r>
+                      <a:endParaRPr lang="en-US" sz="800" b="0" i="0" u="none" strike="noStrike">
+                        <a:solidFill>
+                          <a:srgbClr val="000000"/>
+                        </a:solidFill>
+                        <a:effectLst/>
+                        <a:latin typeface="Arial" panose="020B0604020202020204" pitchFamily="34" charset="0"/>
+                        <a:cs typeface="Arial" panose="020B0604020202020204" pitchFamily="34" charset="0"/>
+                      </a:endParaRPr>
+                    </a:p>
+                  </a:txBody>
+                  <a:tcPr marL="95250" marR="6350" marT="6350" marB="0"/>
+                </a:tc>
+                <a:tc>
+                  <a:txBody>
+                    <a:bodyPr/>
+                    <a:lstStyle/>
+                    <a:p>
+                      <a:pPr algn="l" fontAlgn="t"/>
+                      <a:r>
+                        <a:rPr lang="en-US" sz="800" u="none" strike="noStrike">
+                          <a:effectLst/>
+                          <a:latin typeface="Arial" panose="020B0604020202020204" pitchFamily="34" charset="0"/>
+                          <a:cs typeface="Arial" panose="020B0604020202020204" pitchFamily="34" charset="0"/>
+                        </a:rPr>
+                        <a:t>The height of the frame.</a:t>
+                      </a:r>
+                      <a:endParaRPr lang="en-US" sz="800" b="0" i="0" u="none" strike="noStrike">
+                        <a:solidFill>
+                          <a:srgbClr val="000000"/>
+                        </a:solidFill>
+                        <a:effectLst/>
+                        <a:latin typeface="Arial" panose="020B0604020202020204" pitchFamily="34" charset="0"/>
+                        <a:cs typeface="Arial" panose="020B0604020202020204" pitchFamily="34" charset="0"/>
+                      </a:endParaRPr>
+                    </a:p>
+                  </a:txBody>
+                  <a:tcPr marL="95250" marR="6350" marT="6350" marB="0"/>
+                </a:tc>
+                <a:extLst>
+                  <a:ext uri="{0D108BD9-81ED-4DB2-BD59-A6C34878D82A}">
+                    <a16:rowId xmlns:a16="http://schemas.microsoft.com/office/drawing/2014/main" val="3835006122"/>
+                  </a:ext>
+                </a:extLst>
+              </a:tr>
+              <a:tr h="184150">
+                <a:tc>
+                  <a:txBody>
+                    <a:bodyPr/>
+                    <a:lstStyle/>
+                    <a:p>
+                      <a:pPr algn="l" fontAlgn="t"/>
+                      <a:r>
+                        <a:rPr lang="en-US" sz="800" u="none" strike="noStrike">
+                          <a:effectLst/>
+                          <a:latin typeface="Arial" panose="020B0604020202020204" pitchFamily="34" charset="0"/>
+                          <a:cs typeface="Arial" panose="020B0604020202020204" pitchFamily="34" charset="0"/>
+                        </a:rPr>
+                        <a:t>highlightbackground</a:t>
+                      </a:r>
+                      <a:endParaRPr lang="en-US" sz="800" b="0" i="0" u="none" strike="noStrike">
+                        <a:solidFill>
+                          <a:srgbClr val="000000"/>
+                        </a:solidFill>
+                        <a:effectLst/>
+                        <a:latin typeface="Arial" panose="020B0604020202020204" pitchFamily="34" charset="0"/>
+                        <a:cs typeface="Arial" panose="020B0604020202020204" pitchFamily="34" charset="0"/>
+                      </a:endParaRPr>
+                    </a:p>
+                  </a:txBody>
+                  <a:tcPr marL="95250" marR="6350" marT="6350" marB="0"/>
+                </a:tc>
+                <a:tc>
+                  <a:txBody>
+                    <a:bodyPr/>
+                    <a:lstStyle/>
+                    <a:p>
+                      <a:pPr algn="l" fontAlgn="t"/>
+                      <a:r>
+                        <a:rPr lang="en-US" sz="800" u="none" strike="noStrike">
+                          <a:effectLst/>
+                          <a:latin typeface="Arial" panose="020B0604020202020204" pitchFamily="34" charset="0"/>
+                          <a:cs typeface="Arial" panose="020B0604020202020204" pitchFamily="34" charset="0"/>
+                        </a:rPr>
+                        <a:t>The color of the background color when it is under focus.</a:t>
+                      </a:r>
+                      <a:endParaRPr lang="en-US" sz="800" b="0" i="0" u="none" strike="noStrike">
+                        <a:solidFill>
+                          <a:srgbClr val="000000"/>
+                        </a:solidFill>
+                        <a:effectLst/>
+                        <a:latin typeface="Arial" panose="020B0604020202020204" pitchFamily="34" charset="0"/>
+                        <a:cs typeface="Arial" panose="020B0604020202020204" pitchFamily="34" charset="0"/>
+                      </a:endParaRPr>
+                    </a:p>
+                  </a:txBody>
+                  <a:tcPr marL="95250" marR="6350" marT="6350" marB="0"/>
+                </a:tc>
+                <a:extLst>
+                  <a:ext uri="{0D108BD9-81ED-4DB2-BD59-A6C34878D82A}">
+                    <a16:rowId xmlns:a16="http://schemas.microsoft.com/office/drawing/2014/main" val="1790758034"/>
+                  </a:ext>
+                </a:extLst>
+              </a:tr>
+              <a:tr h="184150">
+                <a:tc>
+                  <a:txBody>
+                    <a:bodyPr/>
+                    <a:lstStyle/>
+                    <a:p>
+                      <a:pPr algn="l" fontAlgn="t"/>
+                      <a:r>
+                        <a:rPr lang="en-US" sz="800" u="none" strike="noStrike">
+                          <a:effectLst/>
+                          <a:latin typeface="Arial" panose="020B0604020202020204" pitchFamily="34" charset="0"/>
+                          <a:cs typeface="Arial" panose="020B0604020202020204" pitchFamily="34" charset="0"/>
+                        </a:rPr>
+                        <a:t>highlightcolor</a:t>
+                      </a:r>
+                      <a:endParaRPr lang="en-US" sz="800" b="0" i="0" u="none" strike="noStrike">
+                        <a:solidFill>
+                          <a:srgbClr val="000000"/>
+                        </a:solidFill>
+                        <a:effectLst/>
+                        <a:latin typeface="Arial" panose="020B0604020202020204" pitchFamily="34" charset="0"/>
+                        <a:cs typeface="Arial" panose="020B0604020202020204" pitchFamily="34" charset="0"/>
+                      </a:endParaRPr>
+                    </a:p>
+                  </a:txBody>
+                  <a:tcPr marL="95250" marR="6350" marT="6350" marB="0"/>
+                </a:tc>
+                <a:tc>
+                  <a:txBody>
+                    <a:bodyPr/>
+                    <a:lstStyle/>
+                    <a:p>
+                      <a:pPr algn="l" fontAlgn="t"/>
+                      <a:r>
+                        <a:rPr lang="en-US" sz="800" u="none" strike="noStrike">
+                          <a:effectLst/>
+                          <a:latin typeface="Arial" panose="020B0604020202020204" pitchFamily="34" charset="0"/>
+                          <a:cs typeface="Arial" panose="020B0604020202020204" pitchFamily="34" charset="0"/>
+                        </a:rPr>
+                        <a:t>The text color when the widget is under focus.</a:t>
+                      </a:r>
+                      <a:endParaRPr lang="en-US" sz="800" b="0" i="0" u="none" strike="noStrike">
+                        <a:solidFill>
+                          <a:srgbClr val="000000"/>
+                        </a:solidFill>
+                        <a:effectLst/>
+                        <a:latin typeface="Arial" panose="020B0604020202020204" pitchFamily="34" charset="0"/>
+                        <a:cs typeface="Arial" panose="020B0604020202020204" pitchFamily="34" charset="0"/>
+                      </a:endParaRPr>
+                    </a:p>
+                  </a:txBody>
+                  <a:tcPr marL="95250" marR="6350" marT="6350" marB="0"/>
+                </a:tc>
+                <a:extLst>
+                  <a:ext uri="{0D108BD9-81ED-4DB2-BD59-A6C34878D82A}">
+                    <a16:rowId xmlns:a16="http://schemas.microsoft.com/office/drawing/2014/main" val="389858007"/>
+                  </a:ext>
+                </a:extLst>
+              </a:tr>
+              <a:tr h="228600">
+                <a:tc>
+                  <a:txBody>
+                    <a:bodyPr/>
+                    <a:lstStyle/>
+                    <a:p>
+                      <a:pPr algn="l" fontAlgn="t"/>
+                      <a:r>
+                        <a:rPr lang="en-US" sz="800" u="none" strike="noStrike">
+                          <a:effectLst/>
+                          <a:latin typeface="Arial" panose="020B0604020202020204" pitchFamily="34" charset="0"/>
+                          <a:cs typeface="Arial" panose="020B0604020202020204" pitchFamily="34" charset="0"/>
+                        </a:rPr>
+                        <a:t>highlightthickness</a:t>
+                      </a:r>
+                      <a:endParaRPr lang="en-US" sz="800" b="0" i="0" u="none" strike="noStrike">
+                        <a:solidFill>
+                          <a:srgbClr val="000000"/>
+                        </a:solidFill>
+                        <a:effectLst/>
+                        <a:latin typeface="Arial" panose="020B0604020202020204" pitchFamily="34" charset="0"/>
+                        <a:cs typeface="Arial" panose="020B0604020202020204" pitchFamily="34" charset="0"/>
+                      </a:endParaRPr>
+                    </a:p>
+                  </a:txBody>
+                  <a:tcPr marL="95250" marR="6350" marT="6350" marB="0"/>
+                </a:tc>
+                <a:tc>
+                  <a:txBody>
+                    <a:bodyPr/>
+                    <a:lstStyle/>
+                    <a:p>
+                      <a:pPr algn="l" fontAlgn="t"/>
+                      <a:r>
+                        <a:rPr lang="en-US" sz="800" u="none" strike="noStrike">
+                          <a:effectLst/>
+                          <a:latin typeface="Arial" panose="020B0604020202020204" pitchFamily="34" charset="0"/>
+                          <a:cs typeface="Arial" panose="020B0604020202020204" pitchFamily="34" charset="0"/>
+                        </a:rPr>
+                        <a:t>It specifies the thickness around the border when the widget is under the focus.</a:t>
+                      </a:r>
+                      <a:endParaRPr lang="en-US" sz="800" b="0" i="0" u="none" strike="noStrike">
+                        <a:solidFill>
+                          <a:srgbClr val="000000"/>
+                        </a:solidFill>
+                        <a:effectLst/>
+                        <a:latin typeface="Arial" panose="020B0604020202020204" pitchFamily="34" charset="0"/>
+                        <a:cs typeface="Arial" panose="020B0604020202020204" pitchFamily="34" charset="0"/>
+                      </a:endParaRPr>
+                    </a:p>
+                  </a:txBody>
+                  <a:tcPr marL="95250" marR="6350" marT="6350" marB="0"/>
+                </a:tc>
+                <a:extLst>
+                  <a:ext uri="{0D108BD9-81ED-4DB2-BD59-A6C34878D82A}">
+                    <a16:rowId xmlns:a16="http://schemas.microsoft.com/office/drawing/2014/main" val="3200100478"/>
+                  </a:ext>
+                </a:extLst>
+              </a:tr>
+              <a:tr h="184150">
+                <a:tc>
+                  <a:txBody>
+                    <a:bodyPr/>
+                    <a:lstStyle/>
+                    <a:p>
+                      <a:pPr algn="l" fontAlgn="t"/>
+                      <a:r>
+                        <a:rPr lang="en-US" sz="800" u="none" strike="noStrike">
+                          <a:effectLst/>
+                          <a:latin typeface="Arial" panose="020B0604020202020204" pitchFamily="34" charset="0"/>
+                          <a:cs typeface="Arial" panose="020B0604020202020204" pitchFamily="34" charset="0"/>
+                        </a:rPr>
+                        <a:t>relief</a:t>
+                      </a:r>
+                      <a:endParaRPr lang="en-US" sz="800" b="0" i="0" u="none" strike="noStrike">
+                        <a:solidFill>
+                          <a:srgbClr val="000000"/>
+                        </a:solidFill>
+                        <a:effectLst/>
+                        <a:latin typeface="Arial" panose="020B0604020202020204" pitchFamily="34" charset="0"/>
+                        <a:cs typeface="Arial" panose="020B0604020202020204" pitchFamily="34" charset="0"/>
+                      </a:endParaRPr>
+                    </a:p>
+                  </a:txBody>
+                  <a:tcPr marL="95250" marR="6350" marT="6350" marB="0"/>
+                </a:tc>
+                <a:tc>
+                  <a:txBody>
+                    <a:bodyPr/>
+                    <a:lstStyle/>
+                    <a:p>
+                      <a:pPr algn="l" fontAlgn="t"/>
+                      <a:r>
+                        <a:rPr lang="en-US" sz="800" u="none" strike="noStrike">
+                          <a:effectLst/>
+                          <a:latin typeface="Arial" panose="020B0604020202020204" pitchFamily="34" charset="0"/>
+                          <a:cs typeface="Arial" panose="020B0604020202020204" pitchFamily="34" charset="0"/>
+                        </a:rPr>
+                        <a:t>It specifies the type of the border. The default value if FLAT.</a:t>
+                      </a:r>
+                      <a:endParaRPr lang="en-US" sz="800" b="0" i="0" u="none" strike="noStrike">
+                        <a:solidFill>
+                          <a:srgbClr val="000000"/>
+                        </a:solidFill>
+                        <a:effectLst/>
+                        <a:latin typeface="Arial" panose="020B0604020202020204" pitchFamily="34" charset="0"/>
+                        <a:cs typeface="Arial" panose="020B0604020202020204" pitchFamily="34" charset="0"/>
+                      </a:endParaRPr>
+                    </a:p>
+                  </a:txBody>
+                  <a:tcPr marL="95250" marR="6350" marT="6350" marB="0"/>
+                </a:tc>
+                <a:extLst>
+                  <a:ext uri="{0D108BD9-81ED-4DB2-BD59-A6C34878D82A}">
+                    <a16:rowId xmlns:a16="http://schemas.microsoft.com/office/drawing/2014/main" val="3650554681"/>
+                  </a:ext>
+                </a:extLst>
+              </a:tr>
+              <a:tr h="184150">
+                <a:tc>
+                  <a:txBody>
+                    <a:bodyPr/>
+                    <a:lstStyle/>
+                    <a:p>
+                      <a:pPr algn="l" fontAlgn="t"/>
+                      <a:r>
+                        <a:rPr lang="en-US" sz="800" u="none" strike="noStrike">
+                          <a:effectLst/>
+                          <a:latin typeface="Arial" panose="020B0604020202020204" pitchFamily="34" charset="0"/>
+                          <a:cs typeface="Arial" panose="020B0604020202020204" pitchFamily="34" charset="0"/>
+                        </a:rPr>
+                        <a:t>width</a:t>
+                      </a:r>
+                      <a:endParaRPr lang="en-US" sz="800" b="0" i="0" u="none" strike="noStrike">
+                        <a:solidFill>
+                          <a:srgbClr val="000000"/>
+                        </a:solidFill>
+                        <a:effectLst/>
+                        <a:latin typeface="Arial" panose="020B0604020202020204" pitchFamily="34" charset="0"/>
+                        <a:cs typeface="Arial" panose="020B0604020202020204" pitchFamily="34" charset="0"/>
+                      </a:endParaRPr>
+                    </a:p>
+                  </a:txBody>
+                  <a:tcPr marL="95250" marR="6350" marT="6350" marB="0"/>
+                </a:tc>
+                <a:tc>
+                  <a:txBody>
+                    <a:bodyPr/>
+                    <a:lstStyle/>
+                    <a:p>
+                      <a:pPr algn="l" fontAlgn="t"/>
+                      <a:r>
+                        <a:rPr lang="en-US" sz="800" u="none" strike="noStrike">
+                          <a:effectLst/>
+                          <a:latin typeface="Arial" panose="020B0604020202020204" pitchFamily="34" charset="0"/>
+                          <a:cs typeface="Arial" panose="020B0604020202020204" pitchFamily="34" charset="0"/>
+                        </a:rPr>
+                        <a:t>It represents the width of the widget.</a:t>
+                      </a:r>
+                      <a:endParaRPr lang="en-US" sz="800" b="0" i="0" u="none" strike="noStrike">
+                        <a:solidFill>
+                          <a:srgbClr val="000000"/>
+                        </a:solidFill>
+                        <a:effectLst/>
+                        <a:latin typeface="Arial" panose="020B0604020202020204" pitchFamily="34" charset="0"/>
+                        <a:cs typeface="Arial" panose="020B0604020202020204" pitchFamily="34" charset="0"/>
+                      </a:endParaRPr>
+                    </a:p>
+                  </a:txBody>
+                  <a:tcPr marL="95250" marR="6350" marT="6350" marB="0"/>
+                </a:tc>
+                <a:extLst>
+                  <a:ext uri="{0D108BD9-81ED-4DB2-BD59-A6C34878D82A}">
+                    <a16:rowId xmlns:a16="http://schemas.microsoft.com/office/drawing/2014/main" val="3259486813"/>
+                  </a:ext>
+                </a:extLst>
+              </a:tr>
+            </a:tbl>
+          </a:graphicData>
+        </a:graphic>
+      </p:graphicFrame>
+      <p:sp>
+        <p:nvSpPr>
+          <p:cNvPr id="21" name="Rectangle 20">
+            <a:extLst>
+              <a:ext uri="{FF2B5EF4-FFF2-40B4-BE49-F238E27FC236}">
+                <a16:creationId xmlns:a16="http://schemas.microsoft.com/office/drawing/2014/main" id="{818FF1C3-9E3D-415B-8FDC-9F5063B226FE}"/>
+              </a:ext>
+            </a:extLst>
+          </p:cNvPr>
+          <p:cNvSpPr/>
+          <p:nvPr/>
+        </p:nvSpPr>
+        <p:spPr>
+          <a:xfrm>
+            <a:off x="352084" y="721751"/>
+            <a:ext cx="1934550" cy="802249"/>
+          </a:xfrm>
+          <a:prstGeom prst="rect">
+            <a:avLst/>
+          </a:prstGeom>
+          <a:noFill/>
+          <a:ln w="9525" cap="flat" cmpd="sng" algn="ctr">
+            <a:solidFill>
+              <a:schemeClr val="dk1"/>
+            </a:solidFill>
+            <a:prstDash val="solid"/>
+            <a:round/>
+            <a:headEnd type="none" w="med" len="med"/>
+            <a:tailEnd type="none" w="med" len="med"/>
+          </a:ln>
+        </p:spPr>
+        <p:style>
+          <a:lnRef idx="0">
+            <a:scrgbClr r="0" g="0" b="0"/>
+          </a:lnRef>
+          <a:fillRef idx="0">
+            <a:scrgbClr r="0" g="0" b="0"/>
+          </a:fillRef>
+          <a:effectRef idx="0">
+            <a:scrgbClr r="0" g="0" b="0"/>
+          </a:effectRef>
+          <a:fontRef idx="minor">
+            <a:schemeClr val="dk1"/>
+          </a:fontRef>
+        </p:style>
+        <p:txBody>
+          <a:bodyPr rtlCol="0" anchor="t"/>
+          <a:lstStyle/>
+          <a:p>
+            <a:r>
+              <a:rPr lang="en-US" sz="800">
+                <a:solidFill>
+                  <a:schemeClr val="bg1"/>
+                </a:solidFill>
+                <a:latin typeface="Arial" panose="020B0604020202020204" pitchFamily="34" charset="0"/>
+                <a:cs typeface="Arial" panose="020B0604020202020204" pitchFamily="34" charset="0"/>
+              </a:rPr>
+              <a:t>Properties:</a:t>
+            </a:r>
+          </a:p>
+          <a:p>
+            <a:r>
+              <a:rPr lang="en-US" sz="800" err="1">
+                <a:solidFill>
+                  <a:schemeClr val="bg1"/>
+                </a:solidFill>
+                <a:latin typeface="Arial" panose="020B0604020202020204" pitchFamily="34" charset="0"/>
+                <a:cs typeface="Arial" panose="020B0604020202020204" pitchFamily="34" charset="0"/>
+              </a:rPr>
+              <a:t>MVC_App</a:t>
+            </a:r>
+            <a:endParaRPr lang="en-US" sz="800">
+              <a:solidFill>
+                <a:schemeClr val="bg1"/>
+              </a:solidFill>
+              <a:latin typeface="Arial" panose="020B0604020202020204" pitchFamily="34" charset="0"/>
+              <a:cs typeface="Arial" panose="020B0604020202020204" pitchFamily="34" charset="0"/>
+            </a:endParaRPr>
+          </a:p>
+          <a:p>
+            <a:r>
+              <a:rPr lang="en-US" sz="800" err="1">
+                <a:solidFill>
+                  <a:schemeClr val="bg1"/>
+                </a:solidFill>
+                <a:latin typeface="Arial" panose="020B0604020202020204" pitchFamily="34" charset="0"/>
+                <a:cs typeface="Arial" panose="020B0604020202020204" pitchFamily="34" charset="0"/>
+              </a:rPr>
+              <a:t>OS_View</a:t>
+            </a:r>
+            <a:endParaRPr lang="en-US" sz="800">
+              <a:solidFill>
+                <a:schemeClr val="bg1"/>
+              </a:solidFill>
+              <a:latin typeface="Arial" panose="020B0604020202020204" pitchFamily="34" charset="0"/>
+              <a:cs typeface="Arial" panose="020B0604020202020204" pitchFamily="34" charset="0"/>
+            </a:endParaRPr>
+          </a:p>
+          <a:p>
+            <a:endParaRPr lang="en-US" sz="800">
+              <a:solidFill>
+                <a:schemeClr val="bg1"/>
+              </a:solidFill>
+              <a:latin typeface="Arial" panose="020B0604020202020204" pitchFamily="34" charset="0"/>
+              <a:cs typeface="Arial" panose="020B0604020202020204" pitchFamily="34" charset="0"/>
+            </a:endParaRPr>
+          </a:p>
+          <a:p>
+            <a:r>
+              <a:rPr lang="en-US" sz="800">
+                <a:solidFill>
+                  <a:schemeClr val="bg1"/>
+                </a:solidFill>
+                <a:latin typeface="Arial" panose="020B0604020202020204" pitchFamily="34" charset="0"/>
+                <a:cs typeface="Arial" panose="020B0604020202020204" pitchFamily="34" charset="0"/>
+              </a:rPr>
+              <a:t>Methods:</a:t>
+            </a:r>
+            <a:br>
+              <a:rPr lang="en-US" sz="800">
+                <a:solidFill>
+                  <a:schemeClr val="bg1"/>
+                </a:solidFill>
+                <a:latin typeface="Arial" panose="020B0604020202020204" pitchFamily="34" charset="0"/>
+                <a:cs typeface="Arial" panose="020B0604020202020204" pitchFamily="34" charset="0"/>
+              </a:rPr>
+            </a:br>
+            <a:r>
+              <a:rPr lang="en-US" sz="800">
+                <a:solidFill>
+                  <a:schemeClr val="bg1"/>
+                </a:solidFill>
+                <a:latin typeface="Arial" panose="020B0604020202020204" pitchFamily="34" charset="0"/>
+                <a:cs typeface="Arial" panose="020B0604020202020204" pitchFamily="34" charset="0"/>
+              </a:rPr>
+              <a:t>none</a:t>
+            </a:r>
+          </a:p>
+        </p:txBody>
+      </p:sp>
+    </p:spTree>
+    <p:extLst>
+      <p:ext uri="{BB962C8B-B14F-4D97-AF65-F5344CB8AC3E}">
+        <p14:creationId xmlns:p14="http://schemas.microsoft.com/office/powerpoint/2010/main" val="3371809264"/>
+      </p:ext>
+    </p:extLst>
+  </p:cSld>
+  <p:clrMapOvr>
+    <a:masterClrMapping/>
+  </p:clrMapOvr>
+</p:sld>
+</file>
+
+<file path=ppt/slides/slide11.xml><?xml version="1.0" encoding="utf-8"?>
+<p:sld xmlns:a="http://schemas.openxmlformats.org/drawingml/2006/main" xmlns:r="http://schemas.openxmlformats.org/officeDocument/2006/relationships" xmlns:p="http://schemas.openxmlformats.org/presentationml/2006/main">
+  <p:cSld>
+    <p:spTree>
+      <p:nvGrpSpPr>
+        <p:cNvPr id="1" name=""/>
+        <p:cNvGrpSpPr/>
+        <p:nvPr/>
+      </p:nvGrpSpPr>
+      <p:grpSpPr>
+        <a:xfrm>
+          <a:off x="0" y="0"/>
+          <a:ext cx="0" cy="0"/>
+          <a:chOff x="0" y="0"/>
+          <a:chExt cx="0" cy="0"/>
+        </a:xfrm>
+      </p:grpSpPr>
+      <p:sp>
+        <p:nvSpPr>
+          <p:cNvPr id="7" name="Text Placeholder 6">
+            <a:extLst>
+              <a:ext uri="{FF2B5EF4-FFF2-40B4-BE49-F238E27FC236}">
                 <a16:creationId xmlns:a16="http://schemas.microsoft.com/office/drawing/2014/main" id="{5F221F09-0513-41CE-A870-79373AFC45DF}"/>
               </a:ext>
             </a:extLst>
@@ -30522,7 +31680,7 @@
         <p:spPr>
           <a:xfrm>
             <a:off x="285408" y="469659"/>
-            <a:ext cx="5332225" cy="3924541"/>
+            <a:ext cx="3077551" cy="3924541"/>
           </a:xfrm>
           <a:prstGeom prst="rect">
             <a:avLst/>
@@ -30564,38 +31722,22 @@
                 <a:latin typeface="Arial" panose="020B0604020202020204" pitchFamily="34" charset="0"/>
                 <a:cs typeface="Arial" panose="020B0604020202020204" pitchFamily="34" charset="0"/>
               </a:rPr>
-              <a:t>import </a:t>
-            </a:r>
-            <a:r>
-              <a:rPr lang="en-US" sz="800" err="1">
+              <a:t>from  tkinter import * </a:t>
+            </a:r>
+          </a:p>
+          <a:p>
+            <a:r>
+              <a:rPr lang="en-US" sz="800">
                 <a:solidFill>
                   <a:schemeClr val="bg1"/>
                 </a:solidFill>
                 <a:latin typeface="Arial" panose="020B0604020202020204" pitchFamily="34" charset="0"/>
                 <a:cs typeface="Arial" panose="020B0604020202020204" pitchFamily="34" charset="0"/>
               </a:rPr>
-              <a:t>tkinter</a:t>
-            </a:r>
-            <a:r>
-              <a:rPr lang="en-US" sz="800">
-                <a:solidFill>
-                  <a:schemeClr val="bg1"/>
-                </a:solidFill>
-                <a:latin typeface="Arial" panose="020B0604020202020204" pitchFamily="34" charset="0"/>
-                <a:cs typeface="Arial" panose="020B0604020202020204" pitchFamily="34" charset="0"/>
-              </a:rPr>
-              <a:t> as </a:t>
-            </a:r>
-            <a:r>
-              <a:rPr lang="en-US" sz="800" err="1">
-                <a:solidFill>
-                  <a:schemeClr val="bg1"/>
-                </a:solidFill>
-                <a:latin typeface="Arial" panose="020B0604020202020204" pitchFamily="34" charset="0"/>
-                <a:cs typeface="Arial" panose="020B0604020202020204" pitchFamily="34" charset="0"/>
-              </a:rPr>
-              <a:t>i_tk</a:t>
-            </a:r>
+              <a:t>from SetupFiles.Views import Linux_View as Views</a:t>
+            </a:r>
+          </a:p>
+          <a:p>
             <a:endParaRPr lang="en-US" sz="800">
               <a:solidFill>
                 <a:schemeClr val="bg1"/>
@@ -30606,139 +31748,17 @@
           </a:p>
           <a:p>
             <a:r>
-              <a:rPr lang="en-US" sz="800" err="1">
+              <a:rPr lang="en-US" sz="800">
                 <a:solidFill>
                   <a:schemeClr val="bg1"/>
                 </a:solidFill>
                 <a:latin typeface="Arial" panose="020B0604020202020204" pitchFamily="34" charset="0"/>
                 <a:cs typeface="Arial" panose="020B0604020202020204" pitchFamily="34" charset="0"/>
               </a:rPr>
-              <a:t>app_main_Window</a:t>
-            </a:r>
-            <a:r>
-              <a:rPr lang="en-US" sz="800">
-                <a:solidFill>
-                  <a:schemeClr val="bg1"/>
-                </a:solidFill>
-                <a:latin typeface="Arial" panose="020B0604020202020204" pitchFamily="34" charset="0"/>
-                <a:cs typeface="Arial" panose="020B0604020202020204" pitchFamily="34" charset="0"/>
-              </a:rPr>
-              <a:t> = </a:t>
-            </a:r>
-            <a:r>
-              <a:rPr lang="en-US" sz="800" err="1">
-                <a:solidFill>
-                  <a:schemeClr val="bg1"/>
-                </a:solidFill>
-                <a:latin typeface="Arial" panose="020B0604020202020204" pitchFamily="34" charset="0"/>
-                <a:cs typeface="Arial" panose="020B0604020202020204" pitchFamily="34" charset="0"/>
-              </a:rPr>
-              <a:t>i_tk.Tk</a:t>
-            </a:r>
-            <a:r>
-              <a:rPr lang="en-US" sz="800">
-                <a:solidFill>
-                  <a:schemeClr val="bg1"/>
-                </a:solidFill>
-                <a:latin typeface="Arial" panose="020B0604020202020204" pitchFamily="34" charset="0"/>
-                <a:cs typeface="Arial" panose="020B0604020202020204" pitchFamily="34" charset="0"/>
-              </a:rPr>
-              <a:t> #tkinter Window</a:t>
-            </a:r>
-          </a:p>
-          <a:p>
-            <a:r>
-              <a:rPr lang="en-US" sz="800" err="1">
-                <a:solidFill>
-                  <a:schemeClr val="bg1"/>
-                </a:solidFill>
-                <a:latin typeface="Arial" panose="020B0604020202020204" pitchFamily="34" charset="0"/>
-                <a:cs typeface="Arial" panose="020B0604020202020204" pitchFamily="34" charset="0"/>
-              </a:rPr>
-              <a:t>app_sub_Window</a:t>
-            </a:r>
-            <a:r>
-              <a:rPr lang="en-US" sz="800">
-                <a:solidFill>
-                  <a:schemeClr val="bg1"/>
-                </a:solidFill>
-                <a:latin typeface="Arial" panose="020B0604020202020204" pitchFamily="34" charset="0"/>
-                <a:cs typeface="Arial" panose="020B0604020202020204" pitchFamily="34" charset="0"/>
-              </a:rPr>
-              <a:t> = </a:t>
-            </a:r>
-            <a:r>
-              <a:rPr lang="en-US" sz="800" err="1">
-                <a:solidFill>
-                  <a:schemeClr val="bg1"/>
-                </a:solidFill>
-                <a:latin typeface="Arial" panose="020B0604020202020204" pitchFamily="34" charset="0"/>
-                <a:cs typeface="Arial" panose="020B0604020202020204" pitchFamily="34" charset="0"/>
-              </a:rPr>
-              <a:t>i_tk.Tk</a:t>
-            </a:r>
-            <a:r>
-              <a:rPr lang="en-US" sz="800">
-                <a:solidFill>
-                  <a:schemeClr val="bg1"/>
-                </a:solidFill>
-                <a:latin typeface="Arial" panose="020B0604020202020204" pitchFamily="34" charset="0"/>
-                <a:cs typeface="Arial" panose="020B0604020202020204" pitchFamily="34" charset="0"/>
-              </a:rPr>
-              <a:t> #tkinter Window</a:t>
-            </a:r>
-          </a:p>
-          <a:p>
-            <a:r>
-              <a:rPr lang="en-US" sz="800" err="1">
-                <a:solidFill>
-                  <a:schemeClr val="bg1"/>
-                </a:solidFill>
-                <a:latin typeface="Arial" panose="020B0604020202020204" pitchFamily="34" charset="0"/>
-                <a:cs typeface="Arial" panose="020B0604020202020204" pitchFamily="34" charset="0"/>
-              </a:rPr>
-              <a:t>app_main_Menubar</a:t>
-            </a:r>
-            <a:r>
-              <a:rPr lang="en-US" sz="800">
-                <a:solidFill>
-                  <a:schemeClr val="bg1"/>
-                </a:solidFill>
-                <a:latin typeface="Arial" panose="020B0604020202020204" pitchFamily="34" charset="0"/>
-                <a:cs typeface="Arial" panose="020B0604020202020204" pitchFamily="34" charset="0"/>
-              </a:rPr>
-              <a:t> = </a:t>
-            </a:r>
-            <a:r>
-              <a:rPr lang="en-US" sz="800" err="1">
-                <a:solidFill>
-                  <a:schemeClr val="bg1"/>
-                </a:solidFill>
-                <a:latin typeface="Arial" panose="020B0604020202020204" pitchFamily="34" charset="0"/>
-                <a:cs typeface="Arial" panose="020B0604020202020204" pitchFamily="34" charset="0"/>
-              </a:rPr>
-              <a:t>i_tk.Menu</a:t>
-            </a:r>
-            <a:r>
-              <a:rPr lang="en-US" sz="800">
-                <a:solidFill>
-                  <a:schemeClr val="bg1"/>
-                </a:solidFill>
-                <a:latin typeface="Arial" panose="020B0604020202020204" pitchFamily="34" charset="0"/>
-                <a:cs typeface="Arial" panose="020B0604020202020204" pitchFamily="34" charset="0"/>
-              </a:rPr>
-              <a:t> #tkinter </a:t>
-            </a:r>
-            <a:r>
-              <a:rPr lang="en-US" sz="800" err="1">
-                <a:solidFill>
-                  <a:schemeClr val="bg1"/>
-                </a:solidFill>
-                <a:latin typeface="Arial" panose="020B0604020202020204" pitchFamily="34" charset="0"/>
-                <a:cs typeface="Arial" panose="020B0604020202020204" pitchFamily="34" charset="0"/>
-              </a:rPr>
-              <a:t>menubar</a:t>
-            </a:r>
+              <a:t>root = TK()</a:t>
+            </a:r>
+          </a:p>
+          <a:p>
             <a:endParaRPr lang="en-US" sz="800">
               <a:solidFill>
                 <a:schemeClr val="bg1"/>
@@ -30746,189 +31766,6 @@
               <a:latin typeface="Arial" panose="020B0604020202020204" pitchFamily="34" charset="0"/>
               <a:cs typeface="Arial" panose="020B0604020202020204" pitchFamily="34" charset="0"/>
             </a:endParaRPr>
-          </a:p>
-          <a:p>
-            <a:r>
-              <a:rPr lang="en-US" sz="800" err="1">
-                <a:solidFill>
-                  <a:schemeClr val="bg1"/>
-                </a:solidFill>
-                <a:latin typeface="Arial" panose="020B0604020202020204" pitchFamily="34" charset="0"/>
-                <a:cs typeface="Arial" panose="020B0604020202020204" pitchFamily="34" charset="0"/>
-              </a:rPr>
-              <a:t>app_sub_Frame</a:t>
-            </a:r>
-            <a:r>
-              <a:rPr lang="en-US" sz="800">
-                <a:solidFill>
-                  <a:schemeClr val="bg1"/>
-                </a:solidFill>
-                <a:latin typeface="Arial" panose="020B0604020202020204" pitchFamily="34" charset="0"/>
-                <a:cs typeface="Arial" panose="020B0604020202020204" pitchFamily="34" charset="0"/>
-              </a:rPr>
-              <a:t> = </a:t>
-            </a:r>
-            <a:r>
-              <a:rPr lang="en-US" sz="800" err="1">
-                <a:solidFill>
-                  <a:schemeClr val="bg1"/>
-                </a:solidFill>
-                <a:latin typeface="Arial" panose="020B0604020202020204" pitchFamily="34" charset="0"/>
-                <a:cs typeface="Arial" panose="020B0604020202020204" pitchFamily="34" charset="0"/>
-              </a:rPr>
-              <a:t>i_tk.Frame</a:t>
-            </a:r>
-            <a:r>
-              <a:rPr lang="en-US" sz="800">
-                <a:solidFill>
-                  <a:schemeClr val="bg1"/>
-                </a:solidFill>
-                <a:latin typeface="Arial" panose="020B0604020202020204" pitchFamily="34" charset="0"/>
-                <a:cs typeface="Arial" panose="020B0604020202020204" pitchFamily="34" charset="0"/>
-              </a:rPr>
-              <a:t>  #tkinter Frame</a:t>
-            </a:r>
-          </a:p>
-          <a:p>
-            <a:r>
-              <a:rPr lang="en-US" sz="800" err="1">
-                <a:solidFill>
-                  <a:schemeClr val="bg1"/>
-                </a:solidFill>
-                <a:latin typeface="Arial" panose="020B0604020202020204" pitchFamily="34" charset="0"/>
-                <a:cs typeface="Arial" panose="020B0604020202020204" pitchFamily="34" charset="0"/>
-              </a:rPr>
-              <a:t>Lbl</a:t>
-            </a:r>
-            <a:r>
-              <a:rPr lang="en-US" sz="800">
-                <a:solidFill>
-                  <a:schemeClr val="bg1"/>
-                </a:solidFill>
-                <a:latin typeface="Arial" panose="020B0604020202020204" pitchFamily="34" charset="0"/>
-                <a:cs typeface="Arial" panose="020B0604020202020204" pitchFamily="34" charset="0"/>
-              </a:rPr>
-              <a:t> = </a:t>
-            </a:r>
-            <a:r>
-              <a:rPr lang="en-US" sz="800" err="1">
-                <a:solidFill>
-                  <a:schemeClr val="bg1"/>
-                </a:solidFill>
-                <a:latin typeface="Arial" panose="020B0604020202020204" pitchFamily="34" charset="0"/>
-                <a:cs typeface="Arial" panose="020B0604020202020204" pitchFamily="34" charset="0"/>
-              </a:rPr>
-              <a:t>i_tk.Label</a:t>
-            </a:r>
-            <a:r>
-              <a:rPr lang="en-US" sz="800">
-                <a:solidFill>
-                  <a:schemeClr val="bg1"/>
-                </a:solidFill>
-                <a:latin typeface="Arial" panose="020B0604020202020204" pitchFamily="34" charset="0"/>
-                <a:cs typeface="Arial" panose="020B0604020202020204" pitchFamily="34" charset="0"/>
-              </a:rPr>
-              <a:t> #tkinter Label</a:t>
-            </a:r>
-          </a:p>
-          <a:p>
-            <a:r>
-              <a:rPr lang="en-US" sz="800" err="1">
-                <a:solidFill>
-                  <a:schemeClr val="bg1"/>
-                </a:solidFill>
-                <a:latin typeface="Arial" panose="020B0604020202020204" pitchFamily="34" charset="0"/>
-                <a:cs typeface="Arial" panose="020B0604020202020204" pitchFamily="34" charset="0"/>
-              </a:rPr>
-              <a:t>Btn</a:t>
-            </a:r>
-            <a:r>
-              <a:rPr lang="en-US" sz="800">
-                <a:solidFill>
-                  <a:schemeClr val="bg1"/>
-                </a:solidFill>
-                <a:latin typeface="Arial" panose="020B0604020202020204" pitchFamily="34" charset="0"/>
-                <a:cs typeface="Arial" panose="020B0604020202020204" pitchFamily="34" charset="0"/>
-              </a:rPr>
-              <a:t> = </a:t>
-            </a:r>
-            <a:r>
-              <a:rPr lang="en-US" sz="800" err="1">
-                <a:solidFill>
-                  <a:schemeClr val="bg1"/>
-                </a:solidFill>
-                <a:latin typeface="Arial" panose="020B0604020202020204" pitchFamily="34" charset="0"/>
-                <a:cs typeface="Arial" panose="020B0604020202020204" pitchFamily="34" charset="0"/>
-              </a:rPr>
-              <a:t>i_tk.Button</a:t>
-            </a:r>
-            <a:r>
-              <a:rPr lang="en-US" sz="800">
-                <a:solidFill>
-                  <a:schemeClr val="bg1"/>
-                </a:solidFill>
-                <a:latin typeface="Arial" panose="020B0604020202020204" pitchFamily="34" charset="0"/>
-                <a:cs typeface="Arial" panose="020B0604020202020204" pitchFamily="34" charset="0"/>
-              </a:rPr>
-              <a:t> #tkinter Button</a:t>
-            </a:r>
-          </a:p>
-          <a:p>
-            <a:endParaRPr lang="en-US" sz="800">
-              <a:solidFill>
-                <a:schemeClr val="bg1"/>
-              </a:solidFill>
-              <a:latin typeface="Arial" panose="020B0604020202020204" pitchFamily="34" charset="0"/>
-              <a:cs typeface="Arial" panose="020B0604020202020204" pitchFamily="34" charset="0"/>
-            </a:endParaRPr>
-          </a:p>
-          <a:p>
-            <a:r>
-              <a:rPr lang="en-US" sz="800">
-                <a:solidFill>
-                  <a:schemeClr val="bg1"/>
-                </a:solidFill>
-                <a:latin typeface="Arial" panose="020B0604020202020204" pitchFamily="34" charset="0"/>
-                <a:cs typeface="Arial" panose="020B0604020202020204" pitchFamily="34" charset="0"/>
-              </a:rPr>
-              <a:t>LARGE_FONT= ("Verdana", 12)</a:t>
-            </a:r>
-          </a:p>
-          <a:p>
-            <a:r>
-              <a:rPr lang="en-US" sz="800">
-                <a:solidFill>
-                  <a:schemeClr val="bg1"/>
-                </a:solidFill>
-                <a:latin typeface="Arial" panose="020B0604020202020204" pitchFamily="34" charset="0"/>
-                <a:cs typeface="Arial" panose="020B0604020202020204" pitchFamily="34" charset="0"/>
-              </a:rPr>
-              <a:t>###########################</a:t>
-            </a:r>
-          </a:p>
-          <a:p>
-            <a:r>
-              <a:rPr lang="en-US" sz="800">
-                <a:solidFill>
-                  <a:schemeClr val="bg1"/>
-                </a:solidFill>
-                <a:latin typeface="Arial" panose="020B0604020202020204" pitchFamily="34" charset="0"/>
-                <a:cs typeface="Arial" panose="020B0604020202020204" pitchFamily="34" charset="0"/>
-              </a:rPr>
-              <a:t>app = Win1(app_main_Window)</a:t>
-            </a:r>
-          </a:p>
-          <a:p>
-            <a:r>
-              <a:rPr lang="en-US" sz="800">
-                <a:solidFill>
-                  <a:schemeClr val="bg1"/>
-                </a:solidFill>
-                <a:latin typeface="Arial" panose="020B0604020202020204" pitchFamily="34" charset="0"/>
-                <a:cs typeface="Arial" panose="020B0604020202020204" pitchFamily="34" charset="0"/>
-              </a:rPr>
-              <a:t>app_main_Window.mainloop()</a:t>
-            </a:r>
           </a:p>
         </p:txBody>
       </p:sp>
@@ -30990,7 +31827,7 @@
                 <a:latin typeface="Arial" panose="020B0604020202020204" pitchFamily="34" charset="0"/>
                 <a:cs typeface="Arial" panose="020B0604020202020204" pitchFamily="34" charset="0"/>
               </a:rPr>
-              <a:t>&lt;&lt;View&gt;&gt;</a:t>
+              <a:t>&lt;&lt;View.py&gt;&gt;</a:t>
             </a:r>
           </a:p>
         </p:txBody>
@@ -31009,7 +31846,7 @@
         </p:nvSpPr>
         <p:spPr>
           <a:xfrm>
-            <a:off x="3278733" y="598457"/>
+            <a:off x="698093" y="1106648"/>
             <a:ext cx="1934551" cy="157162"/>
           </a:xfrm>
           <a:prstGeom prst="rect">
@@ -31052,27 +31889,7 @@
                 <a:latin typeface="Arial" panose="020B0604020202020204" pitchFamily="34" charset="0"/>
                 <a:cs typeface="Arial" panose="020B0604020202020204" pitchFamily="34" charset="0"/>
               </a:rPr>
-              <a:t>Win1(self, </a:t>
-            </a:r>
-            <a:r>
-              <a:rPr lang="en-US" sz="800" err="1">
-                <a:solidFill>
-                  <a:schemeClr val="bg1"/>
-                </a:solidFill>
-                <a:latin typeface="Arial" panose="020B0604020202020204" pitchFamily="34" charset="0"/>
-                <a:cs typeface="Arial" panose="020B0604020202020204" pitchFamily="34" charset="0"/>
-              </a:rPr>
-              <a:t>main_window</a:t>
-            </a:r>
-            <a:r>
-              <a:rPr lang="en-US" sz="800">
-                <a:solidFill>
-                  <a:schemeClr val="bg1"/>
-                </a:solidFill>
-                <a:latin typeface="Arial" panose="020B0604020202020204" pitchFamily="34" charset="0"/>
-                <a:cs typeface="Arial" panose="020B0604020202020204" pitchFamily="34" charset="0"/>
-              </a:rPr>
-              <a:t>) </a:t>
+              <a:t>&lt;&lt;Window_Manager(self, parent)&gt;&gt; </a:t>
             </a:r>
           </a:p>
         </p:txBody>
@@ -31091,8 +31908,8 @@
         </p:nvSpPr>
         <p:spPr>
           <a:xfrm>
-            <a:off x="6227869" y="469659"/>
-            <a:ext cx="2762885" cy="715570"/>
+            <a:off x="3586269" y="471958"/>
+            <a:ext cx="1498811" cy="556109"/>
           </a:xfrm>
           <a:prstGeom prst="foldedCorner">
             <a:avLst/>
@@ -31150,7 +31967,7 @@
                 <a:latin typeface="Arial" panose="020B0604020202020204" pitchFamily="34" charset="0"/>
                 <a:cs typeface="Arial" panose="020B0604020202020204" pitchFamily="34" charset="0"/>
               </a:rPr>
-              <a:t> − This represents the parent window.</a:t>
+              <a:t> − Window_Manager</a:t>
             </a:r>
           </a:p>
           <a:p>
@@ -31172,14 +31989,14 @@
               <a:buChar char="•"/>
             </a:pPr>
             <a:r>
-              <a:rPr lang="en-US" sz="800" b="1" err="1">
+              <a:rPr lang="en-US" sz="800" b="1">
                 <a:solidFill>
                   <a:schemeClr val="bg1"/>
                 </a:solidFill>
                 <a:latin typeface="Arial" panose="020B0604020202020204" pitchFamily="34" charset="0"/>
                 <a:cs typeface="Arial" panose="020B0604020202020204" pitchFamily="34" charset="0"/>
               </a:rPr>
-              <a:t>main_window</a:t>
+              <a:t>parent</a:t>
             </a:r>
             <a:r>
               <a:rPr lang="en-US" sz="800">
@@ -31189,27 +32006,7 @@
                 <a:latin typeface="Arial" panose="020B0604020202020204" pitchFamily="34" charset="0"/>
                 <a:cs typeface="Arial" panose="020B0604020202020204" pitchFamily="34" charset="0"/>
               </a:rPr>
-              <a:t> −Main </a:t>
-            </a:r>
-            <a:r>
-              <a:rPr lang="en-US" sz="800" err="1">
-                <a:solidFill>
-                  <a:schemeClr val="bg1"/>
-                </a:solidFill>
-                <a:latin typeface="Arial" panose="020B0604020202020204" pitchFamily="34" charset="0"/>
-                <a:cs typeface="Arial" panose="020B0604020202020204" pitchFamily="34" charset="0"/>
-              </a:rPr>
-              <a:t>Tkinter</a:t>
-            </a:r>
-            <a:r>
-              <a:rPr lang="en-US" sz="800">
-                <a:solidFill>
-                  <a:schemeClr val="bg1"/>
-                </a:solidFill>
-                <a:latin typeface="Arial" panose="020B0604020202020204" pitchFamily="34" charset="0"/>
-                <a:cs typeface="Arial" panose="020B0604020202020204" pitchFamily="34" charset="0"/>
-              </a:rPr>
-              <a:t> window</a:t>
+              <a:t> − Controller.py</a:t>
             </a:r>
           </a:p>
         </p:txBody>
@@ -31229,14 +32026,14 @@
           <p:nvPr>
             <p:extLst>
               <p:ext uri="{D42A27DB-BD31-4B8C-83A1-F6EECF244321}">
-                <p14:modId xmlns:p14="http://schemas.microsoft.com/office/powerpoint/2010/main" val="738960757"/>
+                <p14:modId xmlns:p14="http://schemas.microsoft.com/office/powerpoint/2010/main" val="1434511423"/>
               </p:ext>
             </p:extLst>
           </p:nvPr>
         </p:nvGraphicFramePr>
         <p:xfrm>
-          <a:off x="6574367" y="1477471"/>
-          <a:ext cx="4601633" cy="1973580"/>
+          <a:off x="3586269" y="1106648"/>
+          <a:ext cx="4601633" cy="2051678"/>
         </p:xfrm>
         <a:graphic>
           <a:graphicData uri="http://schemas.openxmlformats.org/drawingml/2006/table">
@@ -31273,7 +32070,7 @@
                           <a:latin typeface="Arial" panose="020B0604020202020204" pitchFamily="34" charset="0"/>
                           <a:cs typeface="Arial" panose="020B0604020202020204" pitchFamily="34" charset="0"/>
                         </a:rPr>
-                        <a:t>Option</a:t>
+                        <a:t>Property</a:t>
                       </a:r>
                       <a:endParaRPr lang="en-US" sz="800" b="1" i="0" u="none" strike="noStrike">
                         <a:solidFill>
@@ -31325,14 +32122,61 @@
                     <a:bodyPr/>
                     <a:lstStyle/>
                     <a:p>
-                      <a:pPr algn="l" fontAlgn="t"/>
-                      <a:r>
-                        <a:rPr lang="en-US" sz="800" u="none" strike="noStrike">
-                          <a:effectLst/>
+                      <a:r>
+                        <a:rPr lang="en-US" sz="800">
+                          <a:solidFill>
+                            <a:schemeClr val="bg1"/>
+                          </a:solidFill>
                           <a:latin typeface="Arial" panose="020B0604020202020204" pitchFamily="34" charset="0"/>
                           <a:cs typeface="Arial" panose="020B0604020202020204" pitchFamily="34" charset="0"/>
                         </a:rPr>
-                        <a:t>bd</a:t>
+                        <a:t>MVC_App</a:t>
+                      </a:r>
+                    </a:p>
+                  </a:txBody>
+                  <a:tcPr marL="95250" marR="6350" marT="6350" marB="0"/>
+                </a:tc>
+                <a:tc>
+                  <a:txBody>
+                    <a:bodyPr/>
+                    <a:lstStyle/>
+                    <a:p>
+                      <a:pPr algn="l" fontAlgn="t"/>
+                      <a:r>
+                        <a:rPr lang="en-US" sz="800" b="0" i="0" u="none" strike="noStrike">
+                          <a:solidFill>
+                            <a:srgbClr val="000000"/>
+                          </a:solidFill>
+                          <a:effectLst/>
+                          <a:latin typeface="Arial" panose="020B0604020202020204" pitchFamily="34" charset="0"/>
+                          <a:cs typeface="Arial" panose="020B0604020202020204" pitchFamily="34" charset="0"/>
+                        </a:rPr>
+                        <a:t>App.py</a:t>
+                      </a:r>
+                    </a:p>
+                  </a:txBody>
+                  <a:tcPr marL="95250" marR="6350" marT="6350" marB="0"/>
+                </a:tc>
+                <a:extLst>
+                  <a:ext uri="{0D108BD9-81ED-4DB2-BD59-A6C34878D82A}">
+                    <a16:rowId xmlns:a16="http://schemas.microsoft.com/office/drawing/2014/main" val="1490105745"/>
+                  </a:ext>
+                </a:extLst>
+              </a:tr>
+              <a:tr h="184150">
+                <a:tc>
+                  <a:txBody>
+                    <a:bodyPr/>
+                    <a:lstStyle/>
+                    <a:p>
+                      <a:pPr algn="l" fontAlgn="t"/>
+                      <a:r>
+                        <a:rPr lang="en-US" sz="800" u="none" strike="noStrike">
+                          <a:effectLst/>
+                          <a:latin typeface="Arial" panose="020B0604020202020204" pitchFamily="34" charset="0"/>
+                          <a:cs typeface="Arial" panose="020B0604020202020204" pitchFamily="34" charset="0"/>
+                        </a:rPr>
+                        <a:t>App_Name</a:t>
                       </a:r>
                       <a:endParaRPr lang="en-US" sz="800" b="0" i="0" u="none" strike="noStrike">
                         <a:solidFill>
@@ -31358,7 +32202,7 @@
                           <a:latin typeface="Arial" panose="020B0604020202020204" pitchFamily="34" charset="0"/>
                           <a:cs typeface="Arial" panose="020B0604020202020204" pitchFamily="34" charset="0"/>
                         </a:rPr>
-                        <a:t>It represents the border width.</a:t>
+                        <a:t>“Window_Manager”</a:t>
                       </a:r>
                       <a:endParaRPr lang="en-US" sz="800" b="0" i="0" u="none" strike="noStrike">
                         <a:solidFill>
@@ -31374,11 +32218,11 @@
                 </a:tc>
                 <a:extLst>
                   <a:ext uri="{0D108BD9-81ED-4DB2-BD59-A6C34878D82A}">
-                    <a16:rowId xmlns:a16="http://schemas.microsoft.com/office/drawing/2014/main" val="1490105745"/>
+                    <a16:rowId xmlns:a16="http://schemas.microsoft.com/office/drawing/2014/main" val="1509078411"/>
                   </a:ext>
                 </a:extLst>
               </a:tr>
-              <a:tr h="184150">
+              <a:tr h="228600">
                 <a:tc>
                   <a:txBody>
                     <a:bodyPr/>
@@ -31386,12 +32230,33 @@
                     <a:p>
                       <a:pPr algn="l" fontAlgn="t"/>
                       <a:r>
-                        <a:rPr lang="en-US" sz="800" u="none" strike="noStrike">
+                        <a:rPr lang="en-US" sz="800" b="0" i="0" u="none" strike="noStrike">
+                          <a:solidFill>
+                            <a:srgbClr val="000000"/>
+                          </a:solidFill>
                           <a:effectLst/>
                           <a:latin typeface="Arial" panose="020B0604020202020204" pitchFamily="34" charset="0"/>
                           <a:cs typeface="Arial" panose="020B0604020202020204" pitchFamily="34" charset="0"/>
                         </a:rPr>
-                        <a:t>bg</a:t>
+                        <a:t>main_window</a:t>
+                      </a:r>
+                    </a:p>
+                  </a:txBody>
+                  <a:tcPr marL="95250" marR="6350" marT="6350" marB="0"/>
+                </a:tc>
+                <a:tc>
+                  <a:txBody>
+                    <a:bodyPr/>
+                    <a:lstStyle/>
+                    <a:p>
+                      <a:pPr algn="l" fontAlgn="t"/>
+                      <a:r>
+                        <a:rPr lang="en-US" sz="800" u="none" strike="noStrike">
+                          <a:effectLst/>
+                          <a:latin typeface="Arial" panose="020B0604020202020204" pitchFamily="34" charset="0"/>
+                          <a:cs typeface="Arial" panose="020B0604020202020204" pitchFamily="34" charset="0"/>
+                        </a:rPr>
+                        <a:t>root = Tk()</a:t>
                       </a:r>
                       <a:endParaRPr lang="en-US" sz="800" b="0" i="0" u="none" strike="noStrike">
                         <a:solidFill>
@@ -31405,6 +32270,13 @@
                   </a:txBody>
                   <a:tcPr marL="95250" marR="6350" marT="6350" marB="0"/>
                 </a:tc>
+                <a:extLst>
+                  <a:ext uri="{0D108BD9-81ED-4DB2-BD59-A6C34878D82A}">
+                    <a16:rowId xmlns:a16="http://schemas.microsoft.com/office/drawing/2014/main" val="3823139174"/>
+                  </a:ext>
+                </a:extLst>
+              </a:tr>
+              <a:tr h="184150">
                 <a:tc>
                   <a:txBody>
                     <a:bodyPr/>
@@ -31412,12 +32284,14 @@
                     <a:p>
                       <a:pPr algn="l" fontAlgn="t"/>
                       <a:r>
-                        <a:rPr lang="en-US" sz="800" u="none" strike="noStrike">
-                          <a:effectLst/>
+                        <a:rPr lang="en-US" sz="800">
+                          <a:solidFill>
+                            <a:schemeClr val="bg1"/>
+                          </a:solidFill>
                           <a:latin typeface="Arial" panose="020B0604020202020204" pitchFamily="34" charset="0"/>
                           <a:cs typeface="Arial" panose="020B0604020202020204" pitchFamily="34" charset="0"/>
                         </a:rPr>
-                        <a:t>The background color of the widget.</a:t>
+                        <a:t>LARGE_FONT</a:t>
                       </a:r>
                       <a:endParaRPr lang="en-US" sz="800" b="0" i="0" u="none" strike="noStrike">
                         <a:solidFill>
@@ -31431,13 +32305,32 @@
                   </a:txBody>
                   <a:tcPr marL="95250" marR="6350" marT="6350" marB="0"/>
                 </a:tc>
+                <a:tc>
+                  <a:txBody>
+                    <a:bodyPr/>
+                    <a:lstStyle/>
+                    <a:p>
+                      <a:r>
+                        <a:rPr lang="en-US" sz="800">
+                          <a:solidFill>
+                            <a:schemeClr val="bg1"/>
+                          </a:solidFill>
+                          <a:latin typeface="Arial" panose="020B0604020202020204" pitchFamily="34" charset="0"/>
+                          <a:cs typeface="Arial" panose="020B0604020202020204" pitchFamily="34" charset="0"/>
+                        </a:rPr>
+                        <a:t>("Verdana", 12)</a:t>
+                      </a:r>
+                    </a:p>
+                  </a:txBody>
+                  <a:tcPr marL="95250" marR="6350" marT="6350" marB="0"/>
+                </a:tc>
                 <a:extLst>
                   <a:ext uri="{0D108BD9-81ED-4DB2-BD59-A6C34878D82A}">
-                    <a16:rowId xmlns:a16="http://schemas.microsoft.com/office/drawing/2014/main" val="1509078411"/>
+                    <a16:rowId xmlns:a16="http://schemas.microsoft.com/office/drawing/2014/main" val="3835006122"/>
                   </a:ext>
                 </a:extLst>
               </a:tr>
-              <a:tr h="228600">
+              <a:tr h="184150">
                 <a:tc>
                   <a:txBody>
                     <a:bodyPr/>
@@ -31450,7 +32343,7 @@
                           <a:latin typeface="Arial" panose="020B0604020202020204" pitchFamily="34" charset="0"/>
                           <a:cs typeface="Arial" panose="020B0604020202020204" pitchFamily="34" charset="0"/>
                         </a:rPr>
-                        <a:t>cursor</a:t>
+                        <a:t>frame</a:t>
                       </a:r>
                       <a:endParaRPr lang="en-US" sz="800" b="0" i="0" u="none" strike="noStrike">
                         <a:solidFill>
@@ -31476,7 +32369,7 @@
                           <a:latin typeface="Arial" panose="020B0604020202020204" pitchFamily="34" charset="0"/>
                           <a:cs typeface="Arial" panose="020B0604020202020204" pitchFamily="34" charset="0"/>
                         </a:rPr>
-                        <a:t>The mouse pointer is changed to the cursor type set to different values like an arrow, dot, etc.</a:t>
+                        <a:t>Tkinter.Frame</a:t>
                       </a:r>
                       <a:endParaRPr lang="en-US" sz="800" b="0" i="0" u="none" strike="noStrike">
                         <a:solidFill>
@@ -31492,7 +32385,7 @@
                 </a:tc>
                 <a:extLst>
                   <a:ext uri="{0D108BD9-81ED-4DB2-BD59-A6C34878D82A}">
-                    <a16:rowId xmlns:a16="http://schemas.microsoft.com/office/drawing/2014/main" val="3823139174"/>
+                    <a16:rowId xmlns:a16="http://schemas.microsoft.com/office/drawing/2014/main" val="1790758034"/>
                   </a:ext>
                 </a:extLst>
               </a:tr>
@@ -31509,7 +32402,7 @@
                           <a:latin typeface="Arial" panose="020B0604020202020204" pitchFamily="34" charset="0"/>
                           <a:cs typeface="Arial" panose="020B0604020202020204" pitchFamily="34" charset="0"/>
                         </a:rPr>
-                        <a:t>height</a:t>
+                        <a:t>app_window</a:t>
                       </a:r>
                       <a:endParaRPr lang="en-US" sz="800" b="0" i="0" u="none" strike="noStrike">
                         <a:solidFill>
@@ -31528,14 +32421,30 @@
                     <a:bodyPr/>
                     <a:lstStyle/>
                     <a:p>
-                      <a:pPr algn="l" fontAlgn="t"/>
+                      <a:pPr marL="0" marR="0" lvl="0" indent="0" algn="l" defTabSz="914400" rtl="0" eaLnBrk="1" fontAlgn="t" latinLnBrk="0" hangingPunct="1">
+                        <a:lnSpc>
+                          <a:spcPct val="100000"/>
+                        </a:lnSpc>
+                        <a:spcBef>
+                          <a:spcPts val="0"/>
+                        </a:spcBef>
+                        <a:spcAft>
+                          <a:spcPts val="0"/>
+                        </a:spcAft>
+                        <a:buClrTx/>
+                        <a:buSzTx/>
+                        <a:buFontTx/>
+                        <a:buNone/>
+                        <a:tabLst/>
+                        <a:defRPr/>
+                      </a:pPr>
                       <a:r>
                         <a:rPr lang="en-US" sz="800" u="none" strike="noStrike">
                           <a:effectLst/>
                           <a:latin typeface="Arial" panose="020B0604020202020204" pitchFamily="34" charset="0"/>
                           <a:cs typeface="Arial" panose="020B0604020202020204" pitchFamily="34" charset="0"/>
                         </a:rPr>
-                        <a:t>The height of the frame.</a:t>
+                        <a:t>Linux_View.Win1</a:t>
                       </a:r>
                       <a:endParaRPr lang="en-US" sz="800" b="0" i="0" u="none" strike="noStrike">
                         <a:solidFill>
@@ -31551,11 +32460,11 @@
                 </a:tc>
                 <a:extLst>
                   <a:ext uri="{0D108BD9-81ED-4DB2-BD59-A6C34878D82A}">
-                    <a16:rowId xmlns:a16="http://schemas.microsoft.com/office/drawing/2014/main" val="3835006122"/>
+                    <a16:rowId xmlns:a16="http://schemas.microsoft.com/office/drawing/2014/main" val="389858007"/>
                   </a:ext>
                 </a:extLst>
               </a:tr>
-              <a:tr h="184150">
+              <a:tr h="165728">
                 <a:tc>
                   <a:txBody>
                     <a:bodyPr/>
@@ -31568,7 +32477,7 @@
                           <a:latin typeface="Arial" panose="020B0604020202020204" pitchFamily="34" charset="0"/>
                           <a:cs typeface="Arial" panose="020B0604020202020204" pitchFamily="34" charset="0"/>
                         </a:rPr>
-                        <a:t>highlightbackground</a:t>
+                        <a:t>menubar</a:t>
                       </a:r>
                       <a:endParaRPr lang="en-US" sz="800" b="0" i="0" u="none" strike="noStrike">
                         <a:solidFill>
@@ -31594,7 +32503,7 @@
                           <a:latin typeface="Arial" panose="020B0604020202020204" pitchFamily="34" charset="0"/>
                           <a:cs typeface="Arial" panose="020B0604020202020204" pitchFamily="34" charset="0"/>
                         </a:rPr>
-                        <a:t>The color of the background color when it is under focus.</a:t>
+                        <a:t>Tkinter.Menu()</a:t>
                       </a:r>
                       <a:endParaRPr lang="en-US" sz="800" b="0" i="0" u="none" strike="noStrike">
                         <a:solidFill>
@@ -31610,7 +32519,7 @@
                 </a:tc>
                 <a:extLst>
                   <a:ext uri="{0D108BD9-81ED-4DB2-BD59-A6C34878D82A}">
-                    <a16:rowId xmlns:a16="http://schemas.microsoft.com/office/drawing/2014/main" val="1790758034"/>
+                    <a16:rowId xmlns:a16="http://schemas.microsoft.com/office/drawing/2014/main" val="3200100478"/>
                   </a:ext>
                 </a:extLst>
               </a:tr>
@@ -31627,7 +32536,7 @@
                           <a:latin typeface="Arial" panose="020B0604020202020204" pitchFamily="34" charset="0"/>
                           <a:cs typeface="Arial" panose="020B0604020202020204" pitchFamily="34" charset="0"/>
                         </a:rPr>
-                        <a:t>highlightcolor</a:t>
+                        <a:t>file</a:t>
                       </a:r>
                       <a:endParaRPr lang="en-US" sz="800" b="0" i="0" u="none" strike="noStrike">
                         <a:solidFill>
@@ -31653,7 +32562,7 @@
                           <a:latin typeface="Arial" panose="020B0604020202020204" pitchFamily="34" charset="0"/>
                           <a:cs typeface="Arial" panose="020B0604020202020204" pitchFamily="34" charset="0"/>
                         </a:rPr>
-                        <a:t>The text color when the widget is under focus.</a:t>
+                        <a:t>Tkinter.Menu(menubar, tearoff=0)</a:t>
                       </a:r>
                       <a:endParaRPr lang="en-US" sz="800" b="0" i="0" u="none" strike="noStrike">
                         <a:solidFill>
@@ -31669,11 +32578,11 @@
                 </a:tc>
                 <a:extLst>
                   <a:ext uri="{0D108BD9-81ED-4DB2-BD59-A6C34878D82A}">
-                    <a16:rowId xmlns:a16="http://schemas.microsoft.com/office/drawing/2014/main" val="389858007"/>
+                    <a16:rowId xmlns:a16="http://schemas.microsoft.com/office/drawing/2014/main" val="3650554681"/>
                   </a:ext>
                 </a:extLst>
               </a:tr>
-              <a:tr h="228600">
+              <a:tr h="184150">
                 <a:tc>
                   <a:txBody>
                     <a:bodyPr/>
@@ -31686,7 +32595,7 @@
                           <a:latin typeface="Arial" panose="020B0604020202020204" pitchFamily="34" charset="0"/>
                           <a:cs typeface="Arial" panose="020B0604020202020204" pitchFamily="34" charset="0"/>
                         </a:rPr>
-                        <a:t>highlightthickness</a:t>
+                        <a:t>edit</a:t>
                       </a:r>
                       <a:endParaRPr lang="en-US" sz="800" b="0" i="0" u="none" strike="noStrike">
                         <a:solidFill>
@@ -31712,7 +32621,7 @@
                           <a:latin typeface="Arial" panose="020B0604020202020204" pitchFamily="34" charset="0"/>
                           <a:cs typeface="Arial" panose="020B0604020202020204" pitchFamily="34" charset="0"/>
                         </a:rPr>
-                        <a:t>It specifies the thickness around the border when the widget is under the focus.</a:t>
+                        <a:t>Tkinter.Menu(menubar, tearoff=0)</a:t>
                       </a:r>
                       <a:endParaRPr lang="en-US" sz="800" b="0" i="0" u="none" strike="noStrike">
                         <a:solidFill>
@@ -31728,7 +32637,7 @@
                 </a:tc>
                 <a:extLst>
                   <a:ext uri="{0D108BD9-81ED-4DB2-BD59-A6C34878D82A}">
-                    <a16:rowId xmlns:a16="http://schemas.microsoft.com/office/drawing/2014/main" val="3200100478"/>
+                    <a16:rowId xmlns:a16="http://schemas.microsoft.com/office/drawing/2014/main" val="3259486813"/>
                   </a:ext>
                 </a:extLst>
               </a:tr>
@@ -31740,12 +32649,49 @@
                     <a:p>
                       <a:pPr algn="l" fontAlgn="t"/>
                       <a:r>
-                        <a:rPr lang="en-US" sz="800" u="none" strike="noStrike">
+                        <a:rPr lang="en-US" sz="800" b="0" i="0" u="none" strike="noStrike">
+                          <a:solidFill>
+                            <a:srgbClr val="000000"/>
+                          </a:solidFill>
                           <a:effectLst/>
                           <a:latin typeface="Arial" panose="020B0604020202020204" pitchFamily="34" charset="0"/>
                           <a:cs typeface="Arial" panose="020B0604020202020204" pitchFamily="34" charset="0"/>
                         </a:rPr>
-                        <a:t>relief</a:t>
+                        <a:t>help</a:t>
+                      </a:r>
+                    </a:p>
+                  </a:txBody>
+                  <a:tcPr marL="95250" marR="6350" marT="6350" marB="0"/>
+                </a:tc>
+                <a:tc>
+                  <a:txBody>
+                    <a:bodyPr/>
+                    <a:lstStyle/>
+                    <a:p>
+                      <a:pPr marL="0" marR="0" lvl="0" indent="0" algn="l" defTabSz="914400" rtl="0" eaLnBrk="1" fontAlgn="t" latinLnBrk="0" hangingPunct="1">
+                        <a:lnSpc>
+                          <a:spcPct val="100000"/>
+                        </a:lnSpc>
+                        <a:spcBef>
+                          <a:spcPts val="0"/>
+                        </a:spcBef>
+                        <a:spcAft>
+                          <a:spcPts val="0"/>
+                        </a:spcAft>
+                        <a:buClrTx/>
+                        <a:buSzTx/>
+                        <a:buFontTx/>
+                        <a:buNone/>
+                        <a:tabLst/>
+                        <a:defRPr/>
+                      </a:pPr>
+                      <a:r>
+                        <a:rPr lang="en-US" sz="800" u="none" strike="noStrike">
+                          <a:effectLst/>
+                          <a:latin typeface="Arial" panose="020B0604020202020204" pitchFamily="34" charset="0"/>
+                          <a:cs typeface="Arial" panose="020B0604020202020204" pitchFamily="34" charset="0"/>
+                        </a:rPr>
+                        <a:t>Tkinter.Menu(menubar, tearoff=0)</a:t>
                       </a:r>
                       <a:endParaRPr lang="en-US" sz="800" b="0" i="0" u="none" strike="noStrike">
                         <a:solidFill>
@@ -31759,94 +32705,9 @@
                   </a:txBody>
                   <a:tcPr marL="95250" marR="6350" marT="6350" marB="0"/>
                 </a:tc>
-                <a:tc>
-                  <a:txBody>
-                    <a:bodyPr/>
-                    <a:lstStyle/>
-                    <a:p>
-                      <a:pPr algn="l" fontAlgn="t"/>
-                      <a:r>
-                        <a:rPr lang="en-US" sz="800" u="none" strike="noStrike">
-                          <a:effectLst/>
-                          <a:latin typeface="Arial" panose="020B0604020202020204" pitchFamily="34" charset="0"/>
-                          <a:cs typeface="Arial" panose="020B0604020202020204" pitchFamily="34" charset="0"/>
-                        </a:rPr>
-                        <a:t>It specifies the type of the border. The default value if FLAT.</a:t>
-                      </a:r>
-                      <a:endParaRPr lang="en-US" sz="800" b="0" i="0" u="none" strike="noStrike">
-                        <a:solidFill>
-                          <a:srgbClr val="000000"/>
-                        </a:solidFill>
-                        <a:effectLst/>
-                        <a:latin typeface="Arial" panose="020B0604020202020204" pitchFamily="34" charset="0"/>
-                        <a:cs typeface="Arial" panose="020B0604020202020204" pitchFamily="34" charset="0"/>
-                      </a:endParaRPr>
-                    </a:p>
-                  </a:txBody>
-                  <a:tcPr marL="95250" marR="6350" marT="6350" marB="0"/>
-                </a:tc>
                 <a:extLst>
                   <a:ext uri="{0D108BD9-81ED-4DB2-BD59-A6C34878D82A}">
-                    <a16:rowId xmlns:a16="http://schemas.microsoft.com/office/drawing/2014/main" val="3650554681"/>
-                  </a:ext>
-                </a:extLst>
-              </a:tr>
-              <a:tr h="184150">
-                <a:tc>
-                  <a:txBody>
-                    <a:bodyPr/>
-                    <a:lstStyle/>
-                    <a:p>
-                      <a:pPr algn="l" fontAlgn="t"/>
-                      <a:r>
-                        <a:rPr lang="en-US" sz="800" u="none" strike="noStrike">
-                          <a:effectLst/>
-                          <a:latin typeface="Arial" panose="020B0604020202020204" pitchFamily="34" charset="0"/>
-                          <a:cs typeface="Arial" panose="020B0604020202020204" pitchFamily="34" charset="0"/>
-                        </a:rPr>
-                        <a:t>width</a:t>
-                      </a:r>
-                      <a:endParaRPr lang="en-US" sz="800" b="0" i="0" u="none" strike="noStrike">
-                        <a:solidFill>
-                          <a:srgbClr val="000000"/>
-                        </a:solidFill>
-                        <a:effectLst/>
-                        <a:latin typeface="Arial" panose="020B0604020202020204" pitchFamily="34" charset="0"/>
-                        <a:cs typeface="Arial" panose="020B0604020202020204" pitchFamily="34" charset="0"/>
-                      </a:endParaRPr>
-                    </a:p>
-                  </a:txBody>
-                  <a:tcPr marL="95250" marR="6350" marT="6350" marB="0"/>
-                </a:tc>
-                <a:tc>
-                  <a:txBody>
-                    <a:bodyPr/>
-                    <a:lstStyle/>
-                    <a:p>
-                      <a:pPr algn="l" fontAlgn="t"/>
-                      <a:r>
-                        <a:rPr lang="en-US" sz="800" u="none" strike="noStrike">
-                          <a:effectLst/>
-                          <a:latin typeface="Arial" panose="020B0604020202020204" pitchFamily="34" charset="0"/>
-                          <a:cs typeface="Arial" panose="020B0604020202020204" pitchFamily="34" charset="0"/>
-                        </a:rPr>
-                        <a:t>It represents the width of the widget.</a:t>
-                      </a:r>
-                      <a:endParaRPr lang="en-US" sz="800" b="0" i="0" u="none" strike="noStrike">
-                        <a:solidFill>
-                          <a:srgbClr val="000000"/>
-                        </a:solidFill>
-                        <a:effectLst/>
-                        <a:latin typeface="Arial" panose="020B0604020202020204" pitchFamily="34" charset="0"/>
-                        <a:cs typeface="Arial" panose="020B0604020202020204" pitchFamily="34" charset="0"/>
-                      </a:endParaRPr>
-                    </a:p>
-                  </a:txBody>
-                  <a:tcPr marL="95250" marR="6350" marT="6350" marB="0"/>
-                </a:tc>
-                <a:extLst>
-                  <a:ext uri="{0D108BD9-81ED-4DB2-BD59-A6C34878D82A}">
-                    <a16:rowId xmlns:a16="http://schemas.microsoft.com/office/drawing/2014/main" val="3259486813"/>
+                    <a16:rowId xmlns:a16="http://schemas.microsoft.com/office/drawing/2014/main" val="1006412589"/>
                   </a:ext>
                 </a:extLst>
               </a:tr>
@@ -31868,8 +32729,8 @@
         </p:nvSpPr>
         <p:spPr>
           <a:xfrm>
-            <a:off x="3278734" y="755618"/>
-            <a:ext cx="1934550" cy="999099"/>
+            <a:off x="698094" y="1263809"/>
+            <a:ext cx="1934550" cy="2513012"/>
           </a:xfrm>
           <a:prstGeom prst="rect">
             <a:avLst/>
@@ -31911,12 +32772,57 @@
                 <a:latin typeface="Arial" panose="020B0604020202020204" pitchFamily="34" charset="0"/>
                 <a:cs typeface="Arial" panose="020B0604020202020204" pitchFamily="34" charset="0"/>
               </a:rPr>
+              <a:t>global root</a:t>
+            </a:r>
+          </a:p>
+          <a:p>
+            <a:br>
+              <a:rPr lang="en-US" sz="800">
+                <a:solidFill>
+                  <a:schemeClr val="bg1"/>
+                </a:solidFill>
+                <a:latin typeface="Arial" panose="020B0604020202020204" pitchFamily="34" charset="0"/>
+                <a:cs typeface="Arial" panose="020B0604020202020204" pitchFamily="34" charset="0"/>
+              </a:rPr>
+            </a:br>
+            <a:r>
+              <a:rPr lang="en-US" sz="800">
+                <a:solidFill>
+                  <a:schemeClr val="bg1"/>
+                </a:solidFill>
+                <a:latin typeface="Arial" panose="020B0604020202020204" pitchFamily="34" charset="0"/>
+                <a:cs typeface="Arial" panose="020B0604020202020204" pitchFamily="34" charset="0"/>
+              </a:rPr>
               <a:t>Properties:</a:t>
             </a:r>
           </a:p>
           <a:p>
             <a:r>
-              <a:rPr lang="en-US" sz="800" err="1">
+              <a:rPr lang="en-US" sz="800">
+                <a:solidFill>
+                  <a:schemeClr val="bg1"/>
+                </a:solidFill>
+                <a:latin typeface="Arial" panose="020B0604020202020204" pitchFamily="34" charset="0"/>
+                <a:cs typeface="Arial" panose="020B0604020202020204" pitchFamily="34" charset="0"/>
+              </a:rPr>
+              <a:t>MVC_App</a:t>
+            </a:r>
+          </a:p>
+          <a:p>
+            <a:r>
+              <a:rPr lang="en-US" sz="800">
+                <a:solidFill>
+                  <a:schemeClr val="bg1"/>
+                </a:solidFill>
+                <a:latin typeface="Arial" panose="020B0604020202020204" pitchFamily="34" charset="0"/>
+                <a:cs typeface="Arial" panose="020B0604020202020204" pitchFamily="34" charset="0"/>
+              </a:rPr>
+              <a:t>App_Name</a:t>
+            </a:r>
+          </a:p>
+          <a:p>
+            <a:r>
+              <a:rPr lang="en-US" sz="800">
                 <a:solidFill>
                   <a:schemeClr val="bg1"/>
                 </a:solidFill>
@@ -31925,6 +32831,92 @@
               </a:rPr>
               <a:t>main_window</a:t>
             </a:r>
+          </a:p>
+          <a:p>
+            <a:r>
+              <a:rPr lang="en-US" sz="800">
+                <a:solidFill>
+                  <a:schemeClr val="bg1"/>
+                </a:solidFill>
+                <a:latin typeface="Arial" panose="020B0604020202020204" pitchFamily="34" charset="0"/>
+                <a:cs typeface="Arial" panose="020B0604020202020204" pitchFamily="34" charset="0"/>
+              </a:rPr>
+              <a:t>LARGE_FONT= ("Verdana", 12)</a:t>
+            </a:r>
+          </a:p>
+          <a:p>
+            <a:r>
+              <a:rPr lang="en-US" sz="800">
+                <a:solidFill>
+                  <a:schemeClr val="bg1"/>
+                </a:solidFill>
+                <a:latin typeface="Arial" panose="020B0604020202020204" pitchFamily="34" charset="0"/>
+                <a:cs typeface="Arial" panose="020B0604020202020204" pitchFamily="34" charset="0"/>
+              </a:rPr>
+              <a:t>frame</a:t>
+            </a:r>
+          </a:p>
+          <a:p>
+            <a:r>
+              <a:rPr lang="en-US" sz="800">
+                <a:solidFill>
+                  <a:schemeClr val="bg1"/>
+                </a:solidFill>
+                <a:latin typeface="Arial" panose="020B0604020202020204" pitchFamily="34" charset="0"/>
+                <a:cs typeface="Arial" panose="020B0604020202020204" pitchFamily="34" charset="0"/>
+              </a:rPr>
+              <a:t>app_window</a:t>
+            </a:r>
+          </a:p>
+          <a:p>
+            <a:r>
+              <a:rPr lang="en-US" sz="800">
+                <a:solidFill>
+                  <a:schemeClr val="bg1"/>
+                </a:solidFill>
+                <a:latin typeface="Arial" panose="020B0604020202020204" pitchFamily="34" charset="0"/>
+                <a:cs typeface="Arial" panose="020B0604020202020204" pitchFamily="34" charset="0"/>
+              </a:rPr>
+              <a:t>menubar</a:t>
+            </a:r>
+          </a:p>
+          <a:p>
+            <a:r>
+              <a:rPr lang="en-US" sz="800">
+                <a:solidFill>
+                  <a:schemeClr val="bg1"/>
+                </a:solidFill>
+                <a:latin typeface="Arial" panose="020B0604020202020204" pitchFamily="34" charset="0"/>
+                <a:cs typeface="Arial" panose="020B0604020202020204" pitchFamily="34" charset="0"/>
+              </a:rPr>
+              <a:t>file</a:t>
+            </a:r>
+          </a:p>
+          <a:p>
+            <a:r>
+              <a:rPr lang="en-US" sz="800">
+                <a:solidFill>
+                  <a:schemeClr val="bg1"/>
+                </a:solidFill>
+                <a:latin typeface="Arial" panose="020B0604020202020204" pitchFamily="34" charset="0"/>
+                <a:cs typeface="Arial" panose="020B0604020202020204" pitchFamily="34" charset="0"/>
+              </a:rPr>
+              <a:t>edit</a:t>
+            </a:r>
+          </a:p>
+          <a:p>
+            <a:r>
+              <a:rPr lang="en-US" sz="800">
+                <a:solidFill>
+                  <a:schemeClr val="bg1"/>
+                </a:solidFill>
+                <a:latin typeface="Arial" panose="020B0604020202020204" pitchFamily="34" charset="0"/>
+                <a:cs typeface="Arial" panose="020B0604020202020204" pitchFamily="34" charset="0"/>
+              </a:rPr>
+              <a:t>help</a:t>
+            </a:r>
+          </a:p>
+          <a:p>
             <a:endParaRPr lang="en-US" sz="800">
               <a:solidFill>
                 <a:schemeClr val="bg1"/>
@@ -31942,27 +32934,6 @@
                 <a:latin typeface="Arial" panose="020B0604020202020204" pitchFamily="34" charset="0"/>
                 <a:cs typeface="Arial" panose="020B0604020202020204" pitchFamily="34" charset="0"/>
               </a:rPr>
-              <a:t>frame</a:t>
-            </a:r>
-          </a:p>
-          <a:p>
-            <a:endParaRPr lang="en-US" sz="800">
-              <a:solidFill>
-                <a:schemeClr val="bg1"/>
-              </a:solidFill>
-              <a:latin typeface="Arial" panose="020B0604020202020204" pitchFamily="34" charset="0"/>
-              <a:cs typeface="Arial" panose="020B0604020202020204" pitchFamily="34" charset="0"/>
-            </a:endParaRPr>
-          </a:p>
-          <a:p>
-            <a:r>
-              <a:rPr lang="en-US" sz="800">
-                <a:solidFill>
-                  <a:schemeClr val="bg1"/>
-                </a:solidFill>
-                <a:latin typeface="Arial" panose="020B0604020202020204" pitchFamily="34" charset="0"/>
-                <a:cs typeface="Arial" panose="020B0604020202020204" pitchFamily="34" charset="0"/>
-              </a:rPr>
               <a:t>Methods:</a:t>
             </a:r>
             <a:br>
@@ -31975,15 +32946,17 @@
               </a:rPr>
             </a:br>
             <a:r>
-              <a:rPr lang="en-US" sz="800" err="1">
+              <a:rPr lang="en-US" sz="800">
                 <a:solidFill>
                   <a:schemeClr val="bg1"/>
                 </a:solidFill>
                 <a:latin typeface="Arial" panose="020B0604020202020204" pitchFamily="34" charset="0"/>
                 <a:cs typeface="Arial" panose="020B0604020202020204" pitchFamily="34" charset="0"/>
               </a:rPr>
-              <a:t>show_widgets</a:t>
-            </a:r>
+              <a:t>create_button(_class, **kwLayout)</a:t>
+            </a:r>
+          </a:p>
+          <a:p>
             <a:r>
               <a:rPr lang="en-US" sz="800">
                 <a:solidFill>
@@ -31992,7 +32965,27 @@
                 <a:latin typeface="Arial" panose="020B0604020202020204" pitchFamily="34" charset="0"/>
                 <a:cs typeface="Arial" panose="020B0604020202020204" pitchFamily="34" charset="0"/>
               </a:rPr>
-              <a:t>(self, text, _class)</a:t>
+              <a:t>show</a:t>
+            </a:r>
+            <a:r>
+              <a:rPr lang="en-US" sz="800" err="1">
+                <a:solidFill>
+                  <a:schemeClr val="bg1"/>
+                </a:solidFill>
+                <a:latin typeface="Arial" panose="020B0604020202020204" pitchFamily="34" charset="0"/>
+                <a:cs typeface="Arial" panose="020B0604020202020204" pitchFamily="34" charset="0"/>
+              </a:rPr>
+              <a:t>_widgets</a:t>
+            </a:r>
+            <a:r>
+              <a:rPr lang="en-US" sz="800">
+                <a:solidFill>
+                  <a:schemeClr val="bg1"/>
+                </a:solidFill>
+                <a:latin typeface="Arial" panose="020B0604020202020204" pitchFamily="34" charset="0"/>
+                <a:cs typeface="Arial" panose="020B0604020202020204" pitchFamily="34" charset="0"/>
+              </a:rPr>
+              <a:t>()</a:t>
             </a:r>
           </a:p>
           <a:p>
@@ -32014,59 +33007,9 @@
                 <a:latin typeface="Arial" panose="020B0604020202020204" pitchFamily="34" charset="0"/>
                 <a:cs typeface="Arial" panose="020B0604020202020204" pitchFamily="34" charset="0"/>
               </a:rPr>
-              <a:t>(self, _class)</a:t>
-            </a:r>
-          </a:p>
-        </p:txBody>
-      </p:sp>
-      <p:sp>
-        <p:nvSpPr>
-          <p:cNvPr id="2" name="Rectangle 1">
-            <a:extLst>
-              <a:ext uri="{FF2B5EF4-FFF2-40B4-BE49-F238E27FC236}">
-                <a16:creationId xmlns:a16="http://schemas.microsoft.com/office/drawing/2014/main" id="{CBF02BCE-87D3-43B6-AAB1-E03CF3A507D4}"/>
-              </a:ext>
-            </a:extLst>
-          </p:cNvPr>
-          <p:cNvSpPr/>
-          <p:nvPr/>
-        </p:nvSpPr>
-        <p:spPr>
-          <a:xfrm>
-            <a:off x="3273017" y="1839088"/>
-            <a:ext cx="1934551" cy="157162"/>
-          </a:xfrm>
-          <a:prstGeom prst="rect">
-            <a:avLst/>
-          </a:prstGeom>
-          <a:noFill/>
-          <a:ln w="9525" cap="flat" cmpd="sng" algn="ctr">
-            <a:solidFill>
-              <a:schemeClr val="dk1"/>
-            </a:solidFill>
-            <a:prstDash val="solid"/>
-            <a:round/>
-            <a:headEnd type="none" w="med" len="med"/>
-            <a:tailEnd type="none" w="med" len="med"/>
-          </a:ln>
-        </p:spPr>
-        <p:style>
-          <a:lnRef idx="0">
-            <a:scrgbClr r="0" g="0" b="0"/>
-          </a:lnRef>
-          <a:fillRef idx="0">
-            <a:scrgbClr r="0" g="0" b="0"/>
-          </a:fillRef>
-          <a:effectRef idx="0">
-            <a:scrgbClr r="0" g="0" b="0"/>
-          </a:effectRef>
-          <a:fontRef idx="minor">
-            <a:schemeClr val="dk1"/>
-          </a:fontRef>
-        </p:style>
-        <p:txBody>
-          <a:bodyPr rtlCol="0" anchor="ctr"/>
-          <a:lstStyle/>
+              <a:t>(_class)</a:t>
+            </a:r>
+          </a:p>
           <a:p>
             <a:r>
               <a:rPr lang="en-US" sz="800">
@@ -32076,448 +33019,19 @@
                 <a:latin typeface="Arial" panose="020B0604020202020204" pitchFamily="34" charset="0"/>
                 <a:cs typeface="Arial" panose="020B0604020202020204" pitchFamily="34" charset="0"/>
               </a:rPr>
-              <a:t>Win2(self, </a:t>
-            </a:r>
-            <a:r>
-              <a:rPr lang="en-US" sz="800" err="1">
+              <a:t>create_menubars()</a:t>
+            </a:r>
+          </a:p>
+          <a:p>
+            <a:r>
+              <a:rPr lang="en-US" sz="800">
                 <a:solidFill>
                   <a:schemeClr val="bg1"/>
                 </a:solidFill>
                 <a:latin typeface="Arial" panose="020B0604020202020204" pitchFamily="34" charset="0"/>
                 <a:cs typeface="Arial" panose="020B0604020202020204" pitchFamily="34" charset="0"/>
               </a:rPr>
-              <a:t>main_window</a:t>
-            </a:r>
-            <a:r>
-              <a:rPr lang="en-US" sz="800">
-                <a:solidFill>
-                  <a:schemeClr val="bg1"/>
-                </a:solidFill>
-                <a:latin typeface="Arial" panose="020B0604020202020204" pitchFamily="34" charset="0"/>
-                <a:cs typeface="Arial" panose="020B0604020202020204" pitchFamily="34" charset="0"/>
-              </a:rPr>
-              <a:t>) </a:t>
-            </a:r>
-          </a:p>
-        </p:txBody>
-      </p:sp>
-      <p:sp>
-        <p:nvSpPr>
-          <p:cNvPr id="3" name="Rectangle 2">
-            <a:extLst>
-              <a:ext uri="{FF2B5EF4-FFF2-40B4-BE49-F238E27FC236}">
-                <a16:creationId xmlns:a16="http://schemas.microsoft.com/office/drawing/2014/main" id="{AE22BF57-C712-4017-8D88-B6BC4E72FCB3}"/>
-              </a:ext>
-            </a:extLst>
-          </p:cNvPr>
-          <p:cNvSpPr/>
-          <p:nvPr/>
-        </p:nvSpPr>
-        <p:spPr>
-          <a:xfrm>
-            <a:off x="3273018" y="1996249"/>
-            <a:ext cx="1934550" cy="999099"/>
-          </a:xfrm>
-          <a:prstGeom prst="rect">
-            <a:avLst/>
-          </a:prstGeom>
-          <a:noFill/>
-          <a:ln w="9525" cap="flat" cmpd="sng" algn="ctr">
-            <a:solidFill>
-              <a:schemeClr val="dk1"/>
-            </a:solidFill>
-            <a:prstDash val="solid"/>
-            <a:round/>
-            <a:headEnd type="none" w="med" len="med"/>
-            <a:tailEnd type="none" w="med" len="med"/>
-          </a:ln>
-        </p:spPr>
-        <p:style>
-          <a:lnRef idx="0">
-            <a:scrgbClr r="0" g="0" b="0"/>
-          </a:lnRef>
-          <a:fillRef idx="0">
-            <a:scrgbClr r="0" g="0" b="0"/>
-          </a:fillRef>
-          <a:effectRef idx="0">
-            <a:scrgbClr r="0" g="0" b="0"/>
-          </a:effectRef>
-          <a:fontRef idx="minor">
-            <a:schemeClr val="dk1"/>
-          </a:fontRef>
-        </p:style>
-        <p:txBody>
-          <a:bodyPr rtlCol="0" anchor="t"/>
-          <a:lstStyle/>
-          <a:p>
-            <a:r>
-              <a:rPr lang="en-US" sz="800">
-                <a:solidFill>
-                  <a:schemeClr val="bg1"/>
-                </a:solidFill>
-                <a:latin typeface="Arial" panose="020B0604020202020204" pitchFamily="34" charset="0"/>
-                <a:cs typeface="Arial" panose="020B0604020202020204" pitchFamily="34" charset="0"/>
-              </a:rPr>
-              <a:t>Properties:</a:t>
-            </a:r>
-          </a:p>
-          <a:p>
-            <a:r>
-              <a:rPr lang="en-US" sz="800" err="1">
-                <a:solidFill>
-                  <a:schemeClr val="bg1"/>
-                </a:solidFill>
-                <a:latin typeface="Arial" panose="020B0604020202020204" pitchFamily="34" charset="0"/>
-                <a:cs typeface="Arial" panose="020B0604020202020204" pitchFamily="34" charset="0"/>
-              </a:rPr>
-              <a:t>main_window</a:t>
-            </a:r>
-            <a:endParaRPr lang="en-US" sz="800">
-              <a:solidFill>
-                <a:schemeClr val="bg1"/>
-              </a:solidFill>
-              <a:latin typeface="Arial" panose="020B0604020202020204" pitchFamily="34" charset="0"/>
-              <a:cs typeface="Arial" panose="020B0604020202020204" pitchFamily="34" charset="0"/>
-            </a:endParaRPr>
-          </a:p>
-          <a:p>
-            <a:r>
-              <a:rPr lang="en-US" sz="800">
-                <a:solidFill>
-                  <a:schemeClr val="bg1"/>
-                </a:solidFill>
-                <a:latin typeface="Arial" panose="020B0604020202020204" pitchFamily="34" charset="0"/>
-                <a:cs typeface="Arial" panose="020B0604020202020204" pitchFamily="34" charset="0"/>
-              </a:rPr>
-              <a:t>frame</a:t>
-            </a:r>
-          </a:p>
-          <a:p>
-            <a:endParaRPr lang="en-US" sz="800">
-              <a:solidFill>
-                <a:schemeClr val="bg1"/>
-              </a:solidFill>
-              <a:latin typeface="Arial" panose="020B0604020202020204" pitchFamily="34" charset="0"/>
-              <a:cs typeface="Arial" panose="020B0604020202020204" pitchFamily="34" charset="0"/>
-            </a:endParaRPr>
-          </a:p>
-          <a:p>
-            <a:r>
-              <a:rPr lang="en-US" sz="800">
-                <a:solidFill>
-                  <a:schemeClr val="bg1"/>
-                </a:solidFill>
-                <a:latin typeface="Arial" panose="020B0604020202020204" pitchFamily="34" charset="0"/>
-                <a:cs typeface="Arial" panose="020B0604020202020204" pitchFamily="34" charset="0"/>
-              </a:rPr>
-              <a:t>Methods:</a:t>
-            </a:r>
-            <a:br>
-              <a:rPr lang="en-US" sz="800">
-                <a:solidFill>
-                  <a:schemeClr val="bg1"/>
-                </a:solidFill>
-                <a:latin typeface="Arial" panose="020B0604020202020204" pitchFamily="34" charset="0"/>
-                <a:cs typeface="Arial" panose="020B0604020202020204" pitchFamily="34" charset="0"/>
-              </a:rPr>
-            </a:br>
-            <a:r>
-              <a:rPr lang="en-US" sz="800" err="1">
-                <a:solidFill>
-                  <a:schemeClr val="bg1"/>
-                </a:solidFill>
-                <a:latin typeface="Arial" panose="020B0604020202020204" pitchFamily="34" charset="0"/>
-                <a:cs typeface="Arial" panose="020B0604020202020204" pitchFamily="34" charset="0"/>
-              </a:rPr>
-              <a:t>show_widgets</a:t>
-            </a:r>
-            <a:r>
-              <a:rPr lang="en-US" sz="800">
-                <a:solidFill>
-                  <a:schemeClr val="bg1"/>
-                </a:solidFill>
-                <a:latin typeface="Arial" panose="020B0604020202020204" pitchFamily="34" charset="0"/>
-                <a:cs typeface="Arial" panose="020B0604020202020204" pitchFamily="34" charset="0"/>
-              </a:rPr>
-              <a:t>(self)</a:t>
-            </a:r>
-          </a:p>
-          <a:p>
-            <a:r>
-              <a:rPr lang="en-US" sz="800" err="1">
-                <a:solidFill>
-                  <a:schemeClr val="bg1"/>
-                </a:solidFill>
-                <a:latin typeface="Arial" panose="020B0604020202020204" pitchFamily="34" charset="0"/>
-                <a:cs typeface="Arial" panose="020B0604020202020204" pitchFamily="34" charset="0"/>
-              </a:rPr>
-              <a:t>close_window</a:t>
-            </a:r>
-            <a:r>
-              <a:rPr lang="en-US" sz="800">
-                <a:solidFill>
-                  <a:schemeClr val="bg1"/>
-                </a:solidFill>
-                <a:latin typeface="Arial" panose="020B0604020202020204" pitchFamily="34" charset="0"/>
-                <a:cs typeface="Arial" panose="020B0604020202020204" pitchFamily="34" charset="0"/>
-              </a:rPr>
-              <a:t>(self)</a:t>
-            </a:r>
-          </a:p>
-          <a:p>
-            <a:endParaRPr lang="en-US" sz="800">
-              <a:solidFill>
-                <a:schemeClr val="bg1"/>
-              </a:solidFill>
-              <a:latin typeface="Arial" panose="020B0604020202020204" pitchFamily="34" charset="0"/>
-              <a:cs typeface="Arial" panose="020B0604020202020204" pitchFamily="34" charset="0"/>
-            </a:endParaRPr>
-          </a:p>
-        </p:txBody>
-      </p:sp>
-      <p:sp>
-        <p:nvSpPr>
-          <p:cNvPr id="4" name="Rectangle 3">
-            <a:extLst>
-              <a:ext uri="{FF2B5EF4-FFF2-40B4-BE49-F238E27FC236}">
-                <a16:creationId xmlns:a16="http://schemas.microsoft.com/office/drawing/2014/main" id="{B82FED13-7B4E-4D54-87DB-A1256C64F8F9}"/>
-              </a:ext>
-            </a:extLst>
-          </p:cNvPr>
-          <p:cNvSpPr/>
-          <p:nvPr/>
-        </p:nvSpPr>
-        <p:spPr>
-          <a:xfrm>
-            <a:off x="3273016" y="3090271"/>
-            <a:ext cx="1934551" cy="157162"/>
-          </a:xfrm>
-          <a:prstGeom prst="rect">
-            <a:avLst/>
-          </a:prstGeom>
-          <a:noFill/>
-          <a:ln w="9525" cap="flat" cmpd="sng" algn="ctr">
-            <a:solidFill>
-              <a:schemeClr val="dk1"/>
-            </a:solidFill>
-            <a:prstDash val="solid"/>
-            <a:round/>
-            <a:headEnd type="none" w="med" len="med"/>
-            <a:tailEnd type="none" w="med" len="med"/>
-          </a:ln>
-        </p:spPr>
-        <p:style>
-          <a:lnRef idx="0">
-            <a:scrgbClr r="0" g="0" b="0"/>
-          </a:lnRef>
-          <a:fillRef idx="0">
-            <a:scrgbClr r="0" g="0" b="0"/>
-          </a:fillRef>
-          <a:effectRef idx="0">
-            <a:scrgbClr r="0" g="0" b="0"/>
-          </a:effectRef>
-          <a:fontRef idx="minor">
-            <a:schemeClr val="dk1"/>
-          </a:fontRef>
-        </p:style>
-        <p:txBody>
-          <a:bodyPr rtlCol="0" anchor="ctr"/>
-          <a:lstStyle/>
-          <a:p>
-            <a:r>
-              <a:rPr lang="en-US" sz="800">
-                <a:solidFill>
-                  <a:schemeClr val="bg1"/>
-                </a:solidFill>
-                <a:latin typeface="Arial" panose="020B0604020202020204" pitchFamily="34" charset="0"/>
-                <a:cs typeface="Arial" panose="020B0604020202020204" pitchFamily="34" charset="0"/>
-              </a:rPr>
-              <a:t>Win3(self, </a:t>
-            </a:r>
-            <a:r>
-              <a:rPr lang="en-US" sz="800" err="1">
-                <a:solidFill>
-                  <a:schemeClr val="bg1"/>
-                </a:solidFill>
-                <a:latin typeface="Arial" panose="020B0604020202020204" pitchFamily="34" charset="0"/>
-                <a:cs typeface="Arial" panose="020B0604020202020204" pitchFamily="34" charset="0"/>
-              </a:rPr>
-              <a:t>main_window</a:t>
-            </a:r>
-            <a:r>
-              <a:rPr lang="en-US" sz="800">
-                <a:solidFill>
-                  <a:schemeClr val="bg1"/>
-                </a:solidFill>
-                <a:latin typeface="Arial" panose="020B0604020202020204" pitchFamily="34" charset="0"/>
-                <a:cs typeface="Arial" panose="020B0604020202020204" pitchFamily="34" charset="0"/>
-              </a:rPr>
-              <a:t>) </a:t>
-            </a:r>
-          </a:p>
-        </p:txBody>
-      </p:sp>
-      <p:sp>
-        <p:nvSpPr>
-          <p:cNvPr id="5" name="Rectangle 4">
-            <a:extLst>
-              <a:ext uri="{FF2B5EF4-FFF2-40B4-BE49-F238E27FC236}">
-                <a16:creationId xmlns:a16="http://schemas.microsoft.com/office/drawing/2014/main" id="{7967F3BE-6436-450B-9399-EFD5D176AC91}"/>
-              </a:ext>
-            </a:extLst>
-          </p:cNvPr>
-          <p:cNvSpPr/>
-          <p:nvPr/>
-        </p:nvSpPr>
-        <p:spPr>
-          <a:xfrm>
-            <a:off x="3273017" y="3247432"/>
-            <a:ext cx="1934550" cy="999099"/>
-          </a:xfrm>
-          <a:prstGeom prst="rect">
-            <a:avLst/>
-          </a:prstGeom>
-          <a:noFill/>
-          <a:ln w="9525" cap="flat" cmpd="sng" algn="ctr">
-            <a:solidFill>
-              <a:schemeClr val="dk1"/>
-            </a:solidFill>
-            <a:prstDash val="solid"/>
-            <a:round/>
-            <a:headEnd type="none" w="med" len="med"/>
-            <a:tailEnd type="none" w="med" len="med"/>
-          </a:ln>
-        </p:spPr>
-        <p:style>
-          <a:lnRef idx="0">
-            <a:scrgbClr r="0" g="0" b="0"/>
-          </a:lnRef>
-          <a:fillRef idx="0">
-            <a:scrgbClr r="0" g="0" b="0"/>
-          </a:fillRef>
-          <a:effectRef idx="0">
-            <a:scrgbClr r="0" g="0" b="0"/>
-          </a:effectRef>
-          <a:fontRef idx="minor">
-            <a:schemeClr val="dk1"/>
-          </a:fontRef>
-        </p:style>
-        <p:txBody>
-          <a:bodyPr rtlCol="0" anchor="t"/>
-          <a:lstStyle/>
-          <a:p>
-            <a:r>
-              <a:rPr lang="en-US" sz="800">
-                <a:solidFill>
-                  <a:schemeClr val="bg1"/>
-                </a:solidFill>
-                <a:latin typeface="Arial" panose="020B0604020202020204" pitchFamily="34" charset="0"/>
-                <a:cs typeface="Arial" panose="020B0604020202020204" pitchFamily="34" charset="0"/>
-              </a:rPr>
-              <a:t>Properties:</a:t>
-            </a:r>
-          </a:p>
-          <a:p>
-            <a:r>
-              <a:rPr lang="en-US" sz="800" err="1">
-                <a:solidFill>
-                  <a:schemeClr val="bg1"/>
-                </a:solidFill>
-                <a:latin typeface="Arial" panose="020B0604020202020204" pitchFamily="34" charset="0"/>
-                <a:cs typeface="Arial" panose="020B0604020202020204" pitchFamily="34" charset="0"/>
-              </a:rPr>
-              <a:t>main_window</a:t>
-            </a:r>
-            <a:endParaRPr lang="en-US" sz="800">
-              <a:solidFill>
-                <a:schemeClr val="bg1"/>
-              </a:solidFill>
-              <a:latin typeface="Arial" panose="020B0604020202020204" pitchFamily="34" charset="0"/>
-              <a:cs typeface="Arial" panose="020B0604020202020204" pitchFamily="34" charset="0"/>
-            </a:endParaRPr>
-          </a:p>
-          <a:p>
-            <a:r>
-              <a:rPr lang="en-US" sz="800">
-                <a:solidFill>
-                  <a:schemeClr val="bg1"/>
-                </a:solidFill>
-                <a:latin typeface="Arial" panose="020B0604020202020204" pitchFamily="34" charset="0"/>
-                <a:cs typeface="Arial" panose="020B0604020202020204" pitchFamily="34" charset="0"/>
-              </a:rPr>
-              <a:t>frame</a:t>
-            </a:r>
-          </a:p>
-          <a:p>
-            <a:endParaRPr lang="en-US" sz="800">
-              <a:solidFill>
-                <a:schemeClr val="bg1"/>
-              </a:solidFill>
-              <a:latin typeface="Arial" panose="020B0604020202020204" pitchFamily="34" charset="0"/>
-              <a:cs typeface="Arial" panose="020B0604020202020204" pitchFamily="34" charset="0"/>
-            </a:endParaRPr>
-          </a:p>
-          <a:p>
-            <a:r>
-              <a:rPr lang="en-US" sz="800">
-                <a:solidFill>
-                  <a:schemeClr val="bg1"/>
-                </a:solidFill>
-                <a:latin typeface="Arial" panose="020B0604020202020204" pitchFamily="34" charset="0"/>
-                <a:cs typeface="Arial" panose="020B0604020202020204" pitchFamily="34" charset="0"/>
-              </a:rPr>
-              <a:t>Methods:</a:t>
-            </a:r>
-            <a:br>
-              <a:rPr lang="en-US" sz="800">
-                <a:solidFill>
-                  <a:schemeClr val="bg1"/>
-                </a:solidFill>
-                <a:latin typeface="Arial" panose="020B0604020202020204" pitchFamily="34" charset="0"/>
-                <a:cs typeface="Arial" panose="020B0604020202020204" pitchFamily="34" charset="0"/>
-              </a:rPr>
-            </a:br>
-            <a:r>
-              <a:rPr lang="en-US" sz="800" err="1">
-                <a:solidFill>
-                  <a:schemeClr val="bg1"/>
-                </a:solidFill>
-                <a:latin typeface="Arial" panose="020B0604020202020204" pitchFamily="34" charset="0"/>
-                <a:cs typeface="Arial" panose="020B0604020202020204" pitchFamily="34" charset="0"/>
-              </a:rPr>
-              <a:t>show_widgets</a:t>
-            </a:r>
-            <a:r>
-              <a:rPr lang="en-US" sz="800">
-                <a:solidFill>
-                  <a:schemeClr val="bg1"/>
-                </a:solidFill>
-                <a:latin typeface="Arial" panose="020B0604020202020204" pitchFamily="34" charset="0"/>
-                <a:cs typeface="Arial" panose="020B0604020202020204" pitchFamily="34" charset="0"/>
-              </a:rPr>
-              <a:t>(self, text, _class)</a:t>
-            </a:r>
-          </a:p>
-          <a:p>
-            <a:r>
-              <a:rPr lang="en-US" sz="800" err="1">
-                <a:solidFill>
-                  <a:schemeClr val="bg1"/>
-                </a:solidFill>
-                <a:latin typeface="Arial" panose="020B0604020202020204" pitchFamily="34" charset="0"/>
-                <a:cs typeface="Arial" panose="020B0604020202020204" pitchFamily="34" charset="0"/>
-              </a:rPr>
-              <a:t>new_window</a:t>
-            </a:r>
-            <a:r>
-              <a:rPr lang="en-US" sz="800">
-                <a:solidFill>
-                  <a:schemeClr val="bg1"/>
-                </a:solidFill>
-                <a:latin typeface="Arial" panose="020B0604020202020204" pitchFamily="34" charset="0"/>
-                <a:cs typeface="Arial" panose="020B0604020202020204" pitchFamily="34" charset="0"/>
-              </a:rPr>
-              <a:t>(self, _class)</a:t>
+              <a:t>mainloop()</a:t>
             </a:r>
           </a:p>
         </p:txBody>
@@ -32647,8 +33161,8 @@
         </p:nvSpPr>
         <p:spPr>
           <a:xfrm>
-            <a:off x="285409" y="469659"/>
-            <a:ext cx="2165691" cy="1942315"/>
+            <a:off x="285408" y="469660"/>
+            <a:ext cx="8834738" cy="3084574"/>
           </a:xfrm>
           <a:prstGeom prst="rect">
             <a:avLst/>
@@ -32679,8 +33193,44 @@
           </a:fontRef>
         </p:style>
         <p:txBody>
-          <a:bodyPr rtlCol="0" anchor="ctr"/>
+          <a:bodyPr rtlCol="0" anchor="t"/>
           <a:lstStyle/>
+          <a:p>
+            <a:r>
+              <a:rPr lang="en-US" sz="800">
+                <a:solidFill>
+                  <a:schemeClr val="bg1"/>
+                </a:solidFill>
+                <a:latin typeface="Arial" panose="020B0604020202020204" pitchFamily="34" charset="0"/>
+                <a:cs typeface="Arial" panose="020B0604020202020204" pitchFamily="34" charset="0"/>
+              </a:rPr>
+              <a:t>from  tkinter import *</a:t>
+            </a:r>
+          </a:p>
+          <a:p>
+            <a:r>
+              <a:rPr lang="en-US" sz="800">
+                <a:solidFill>
+                  <a:schemeClr val="bg1"/>
+                </a:solidFill>
+                <a:latin typeface="Arial" panose="020B0604020202020204" pitchFamily="34" charset="0"/>
+                <a:cs typeface="Arial" panose="020B0604020202020204" pitchFamily="34" charset="0"/>
+              </a:rPr>
+              <a:t>Properties</a:t>
+            </a:r>
+          </a:p>
+          <a:p>
+            <a:r>
+              <a:rPr lang="en-US" sz="800">
+                <a:solidFill>
+                  <a:schemeClr val="bg1"/>
+                </a:solidFill>
+                <a:latin typeface="Arial" panose="020B0604020202020204" pitchFamily="34" charset="0"/>
+                <a:cs typeface="Arial" panose="020B0604020202020204" pitchFamily="34" charset="0"/>
+              </a:rPr>
+              <a:t>none</a:t>
+            </a:r>
+          </a:p>
           <a:p>
             <a:endParaRPr lang="en-US" sz="800">
               <a:solidFill>
@@ -32689,6 +33239,132 @@
               <a:latin typeface="Arial" panose="020B0604020202020204" pitchFamily="34" charset="0"/>
               <a:cs typeface="Arial" panose="020B0604020202020204" pitchFamily="34" charset="0"/>
             </a:endParaRPr>
+          </a:p>
+          <a:p>
+            <a:r>
+              <a:rPr lang="en-US" sz="800">
+                <a:solidFill>
+                  <a:schemeClr val="bg1"/>
+                </a:solidFill>
+                <a:latin typeface="Arial" panose="020B0604020202020204" pitchFamily="34" charset="0"/>
+                <a:cs typeface="Arial" panose="020B0604020202020204" pitchFamily="34" charset="0"/>
+              </a:rPr>
+              <a:t>Methods:</a:t>
+            </a:r>
+          </a:p>
+          <a:p>
+            <a:r>
+              <a:rPr lang="en-US" sz="800">
+                <a:solidFill>
+                  <a:schemeClr val="bg1"/>
+                </a:solidFill>
+                <a:latin typeface="Arial" panose="020B0604020202020204" pitchFamily="34" charset="0"/>
+                <a:cs typeface="Arial" panose="020B0604020202020204" pitchFamily="34" charset="0"/>
+              </a:rPr>
+              <a:t>get_win(win_manager, _class)</a:t>
+            </a:r>
+          </a:p>
+          <a:p>
+            <a:r>
+              <a:rPr lang="en-US" sz="800">
+                <a:solidFill>
+                  <a:schemeClr val="bg1"/>
+                </a:solidFill>
+                <a:latin typeface="Arial" panose="020B0604020202020204" pitchFamily="34" charset="0"/>
+                <a:cs typeface="Arial" panose="020B0604020202020204" pitchFamily="34" charset="0"/>
+              </a:rPr>
+              <a:t>new_window(win, _class)</a:t>
+            </a:r>
+          </a:p>
+          <a:p>
+            <a:endParaRPr lang="en-US" sz="800">
+              <a:solidFill>
+                <a:schemeClr val="bg1"/>
+              </a:solidFill>
+              <a:latin typeface="Arial" panose="020B0604020202020204" pitchFamily="34" charset="0"/>
+              <a:cs typeface="Arial" panose="020B0604020202020204" pitchFamily="34" charset="0"/>
+            </a:endParaRPr>
+          </a:p>
+          <a:p>
+            <a:r>
+              <a:rPr lang="en-US" sz="800">
+                <a:solidFill>
+                  <a:schemeClr val="bg1"/>
+                </a:solidFill>
+                <a:latin typeface="Arial" panose="020B0604020202020204" pitchFamily="34" charset="0"/>
+                <a:cs typeface="Arial" panose="020B0604020202020204" pitchFamily="34" charset="0"/>
+              </a:rPr>
+              <a:t>create_button(win_, _class, **kwLayout)</a:t>
+            </a:r>
+          </a:p>
+          <a:p>
+            <a:endParaRPr lang="en-US" sz="800">
+              <a:solidFill>
+                <a:schemeClr val="bg1"/>
+              </a:solidFill>
+              <a:latin typeface="Arial" panose="020B0604020202020204" pitchFamily="34" charset="0"/>
+              <a:cs typeface="Arial" panose="020B0604020202020204" pitchFamily="34" charset="0"/>
+            </a:endParaRPr>
+          </a:p>
+          <a:p>
+            <a:r>
+              <a:rPr lang="en-US" sz="800">
+                <a:solidFill>
+                  <a:schemeClr val="bg1"/>
+                </a:solidFill>
+                <a:latin typeface="Arial" panose="020B0604020202020204" pitchFamily="34" charset="0"/>
+                <a:cs typeface="Arial" panose="020B0604020202020204" pitchFamily="34" charset="0"/>
+              </a:rPr>
+              <a:t>close_window(win_)</a:t>
+            </a:r>
+          </a:p>
+          <a:p>
+            <a:r>
+              <a:rPr lang="en-US" sz="800">
+                <a:solidFill>
+                  <a:schemeClr val="bg1"/>
+                </a:solidFill>
+                <a:latin typeface="Arial" panose="020B0604020202020204" pitchFamily="34" charset="0"/>
+                <a:cs typeface="Arial" panose="020B0604020202020204" pitchFamily="34" charset="0"/>
+              </a:rPr>
+              <a:t>next_window(win_)</a:t>
+            </a:r>
+          </a:p>
+          <a:p>
+            <a:r>
+              <a:rPr lang="en-US" sz="800">
+                <a:solidFill>
+                  <a:schemeClr val="bg1"/>
+                </a:solidFill>
+                <a:latin typeface="Arial" panose="020B0604020202020204" pitchFamily="34" charset="0"/>
+                <a:cs typeface="Arial" panose="020B0604020202020204" pitchFamily="34" charset="0"/>
+              </a:rPr>
+              <a:t>create_default_menubars(win_)</a:t>
+            </a:r>
+          </a:p>
+          <a:p>
+            <a:r>
+              <a:rPr lang="en-US" sz="800">
+                <a:solidFill>
+                  <a:schemeClr val="bg1"/>
+                </a:solidFill>
+                <a:latin typeface="Arial" panose="020B0604020202020204" pitchFamily="34" charset="0"/>
+                <a:cs typeface="Arial" panose="020B0604020202020204" pitchFamily="34" charset="0"/>
+              </a:rPr>
+              <a:t>show_default_widgets(win_)</a:t>
+            </a:r>
+          </a:p>
+          <a:p>
+            <a:r>
+              <a:rPr lang="en-US" sz="800">
+                <a:solidFill>
+                  <a:schemeClr val="bg1"/>
+                </a:solidFill>
+                <a:latin typeface="Arial" panose="020B0604020202020204" pitchFamily="34" charset="0"/>
+                <a:cs typeface="Arial" panose="020B0604020202020204" pitchFamily="34" charset="0"/>
+              </a:rPr>
+              <a:t> </a:t>
+            </a:r>
           </a:p>
         </p:txBody>
       </p:sp>
@@ -32750,7 +33426,7 @@
                 <a:latin typeface="Arial" panose="020B0604020202020204" pitchFamily="34" charset="0"/>
                 <a:cs typeface="Arial" panose="020B0604020202020204" pitchFamily="34" charset="0"/>
               </a:rPr>
-              <a:t>&lt;&lt;Controller&gt;&gt;</a:t>
+              <a:t>&lt;&lt;Linux_View.py&gt;&gt;</a:t>
             </a:r>
           </a:p>
         </p:txBody>
@@ -32769,7 +33445,7 @@
         </p:nvSpPr>
         <p:spPr>
           <a:xfrm>
-            <a:off x="352083" y="564590"/>
+            <a:off x="2529442" y="682828"/>
             <a:ext cx="1934551" cy="157162"/>
           </a:xfrm>
           <a:prstGeom prst="rect">
@@ -32805,24 +33481,14 @@
           <a:lstStyle/>
           <a:p>
             <a:r>
-              <a:rPr lang="en-US" sz="800" err="1">
+              <a:rPr lang="en-US" sz="800">
                 <a:solidFill>
                   <a:schemeClr val="bg1"/>
                 </a:solidFill>
                 <a:latin typeface="Arial" panose="020B0604020202020204" pitchFamily="34" charset="0"/>
                 <a:cs typeface="Arial" panose="020B0604020202020204" pitchFamily="34" charset="0"/>
               </a:rPr>
-              <a:t>Control_View</a:t>
-            </a:r>
-            <a:r>
-              <a:rPr lang="en-US" sz="800">
-                <a:solidFill>
-                  <a:schemeClr val="bg1"/>
-                </a:solidFill>
-                <a:latin typeface="Arial" panose="020B0604020202020204" pitchFamily="34" charset="0"/>
-                <a:cs typeface="Arial" panose="020B0604020202020204" pitchFamily="34" charset="0"/>
-              </a:rPr>
-              <a:t>(self, parent) </a:t>
+              <a:t>Win1(self, win_manager) </a:t>
             </a:r>
           </a:p>
         </p:txBody>
@@ -32841,8 +33507,8 @@
         </p:nvSpPr>
         <p:spPr>
           <a:xfrm>
-            <a:off x="2807335" y="317404"/>
-            <a:ext cx="1771015" cy="304896"/>
+            <a:off x="2529442" y="2684240"/>
+            <a:ext cx="1934551" cy="341743"/>
           </a:xfrm>
           <a:prstGeom prst="foldedCorner">
             <a:avLst/>
@@ -32890,7 +33556,7 @@
                 <a:latin typeface="Arial" panose="020B0604020202020204" pitchFamily="34" charset="0"/>
                 <a:cs typeface="Arial" panose="020B0604020202020204" pitchFamily="34" charset="0"/>
               </a:rPr>
-              <a:t>parent</a:t>
+              <a:t>self</a:t>
             </a:r>
             <a:r>
               <a:rPr lang="en-US" sz="800">
@@ -32900,7 +33566,33 @@
                 <a:latin typeface="Arial" panose="020B0604020202020204" pitchFamily="34" charset="0"/>
                 <a:cs typeface="Arial" panose="020B0604020202020204" pitchFamily="34" charset="0"/>
               </a:rPr>
-              <a:t> − reference to app.py</a:t>
+              <a:t> − This represents Win#.</a:t>
+            </a:r>
+          </a:p>
+          <a:p>
+            <a:pPr marL="171450" indent="-171450">
+              <a:buFont typeface="Arial" panose="020B0604020202020204" pitchFamily="34" charset="0"/>
+              <a:buChar char="•"/>
+            </a:pPr>
+            <a:r>
+              <a:rPr lang="en-US" sz="800" b="1">
+                <a:solidFill>
+                  <a:schemeClr val="bg1"/>
+                </a:solidFill>
+                <a:latin typeface="Arial" panose="020B0604020202020204" pitchFamily="34" charset="0"/>
+                <a:cs typeface="Arial" panose="020B0604020202020204" pitchFamily="34" charset="0"/>
+              </a:rPr>
+              <a:t>win_manager </a:t>
+            </a:r>
+            <a:r>
+              <a:rPr lang="en-US" sz="800">
+                <a:solidFill>
+                  <a:schemeClr val="bg1"/>
+                </a:solidFill>
+                <a:latin typeface="Arial" panose="020B0604020202020204" pitchFamily="34" charset="0"/>
+                <a:cs typeface="Arial" panose="020B0604020202020204" pitchFamily="34" charset="0"/>
+              </a:rPr>
+              <a:t>−View window</a:t>
             </a:r>
           </a:p>
         </p:txBody>
@@ -32917,11 +33609,17 @@
           <p:cNvGraphicFramePr>
             <a:graphicFrameLocks noGrp="1"/>
           </p:cNvGraphicFramePr>
-          <p:nvPr/>
+          <p:nvPr>
+            <p:extLst>
+              <p:ext uri="{D42A27DB-BD31-4B8C-83A1-F6EECF244321}">
+                <p14:modId xmlns:p14="http://schemas.microsoft.com/office/powerpoint/2010/main" val="2136829894"/>
+              </p:ext>
+            </p:extLst>
+          </p:nvPr>
         </p:nvGraphicFramePr>
         <p:xfrm>
-          <a:off x="3153833" y="1325216"/>
-          <a:ext cx="4601633" cy="1973580"/>
+          <a:off x="3866685" y="3682124"/>
+          <a:ext cx="2971438" cy="2114550"/>
         </p:xfrm>
         <a:graphic>
           <a:graphicData uri="http://schemas.openxmlformats.org/drawingml/2006/table">
@@ -32930,14 +33628,14 @@
                 <a:tableStyleId>{5C22544A-7EE6-4342-B048-85BDC9FD1C3A}</a:tableStyleId>
               </a:tblPr>
               <a:tblGrid>
-                <a:gridCol w="1075181">
+                <a:gridCol w="943854">
                   <a:extLst>
                     <a:ext uri="{9D8B030D-6E8A-4147-A177-3AD203B41FA5}">
                       <a16:colId xmlns:a16="http://schemas.microsoft.com/office/drawing/2014/main" val="1168899157"/>
                     </a:ext>
                   </a:extLst>
                 </a:gridCol>
-                <a:gridCol w="3526452">
+                <a:gridCol w="2027584">
                   <a:extLst>
                     <a:ext uri="{9D8B030D-6E8A-4147-A177-3AD203B41FA5}">
                       <a16:colId xmlns:a16="http://schemas.microsoft.com/office/drawing/2014/main" val="862453715"/>
@@ -32958,7 +33656,7 @@
                           <a:latin typeface="Arial" panose="020B0604020202020204" pitchFamily="34" charset="0"/>
                           <a:cs typeface="Arial" panose="020B0604020202020204" pitchFamily="34" charset="0"/>
                         </a:rPr>
-                        <a:t>Option</a:t>
+                        <a:t>Property</a:t>
                       </a:r>
                       <a:endParaRPr lang="en-US" sz="800" b="1" i="0" u="none" strike="noStrike">
                         <a:solidFill>
@@ -33017,7 +33715,7 @@
                           <a:latin typeface="Arial" panose="020B0604020202020204" pitchFamily="34" charset="0"/>
                           <a:cs typeface="Arial" panose="020B0604020202020204" pitchFamily="34" charset="0"/>
                         </a:rPr>
-                        <a:t>bd</a:t>
+                        <a:t>win_manager</a:t>
                       </a:r>
                       <a:endParaRPr lang="en-US" sz="800" b="0" i="0" u="none" strike="noStrike">
                         <a:solidFill>
@@ -33043,7 +33741,7 @@
                           <a:latin typeface="Arial" panose="020B0604020202020204" pitchFamily="34" charset="0"/>
                           <a:cs typeface="Arial" panose="020B0604020202020204" pitchFamily="34" charset="0"/>
                         </a:rPr>
-                        <a:t>It represents the border width.</a:t>
+                        <a:t>View.Window_Manager</a:t>
                       </a:r>
                       <a:endParaRPr lang="en-US" sz="800" b="0" i="0" u="none" strike="noStrike">
                         <a:solidFill>
@@ -33076,7 +33774,7 @@
                           <a:latin typeface="Arial" panose="020B0604020202020204" pitchFamily="34" charset="0"/>
                           <a:cs typeface="Arial" panose="020B0604020202020204" pitchFamily="34" charset="0"/>
                         </a:rPr>
-                        <a:t>bg</a:t>
+                        <a:t>App_Name</a:t>
                       </a:r>
                       <a:endParaRPr lang="en-US" sz="800" b="0" i="0" u="none" strike="noStrike">
                         <a:solidFill>
@@ -33102,7 +33800,7 @@
                           <a:latin typeface="Arial" panose="020B0604020202020204" pitchFamily="34" charset="0"/>
                           <a:cs typeface="Arial" panose="020B0604020202020204" pitchFamily="34" charset="0"/>
                         </a:rPr>
-                        <a:t>The background color of the widget.</a:t>
+                        <a:t>“Win1”</a:t>
                       </a:r>
                       <a:endParaRPr lang="en-US" sz="800" b="0" i="0" u="none" strike="noStrike">
                         <a:solidFill>
@@ -33122,7 +33820,7 @@
                   </a:ext>
                 </a:extLst>
               </a:tr>
-              <a:tr h="228600">
+              <a:tr h="184150">
                 <a:tc>
                   <a:txBody>
                     <a:bodyPr/>
@@ -33130,12 +33828,98 @@
                     <a:p>
                       <a:pPr algn="l" fontAlgn="t"/>
                       <a:r>
-                        <a:rPr lang="en-US" sz="800" u="none" strike="noStrike">
+                        <a:rPr lang="en-US" sz="800" b="0" i="0" u="none" strike="noStrike">
+                          <a:solidFill>
+                            <a:srgbClr val="000000"/>
+                          </a:solidFill>
                           <a:effectLst/>
                           <a:latin typeface="Arial" panose="020B0604020202020204" pitchFamily="34" charset="0"/>
                           <a:cs typeface="Arial" panose="020B0604020202020204" pitchFamily="34" charset="0"/>
                         </a:rPr>
-                        <a:t>cursor</a:t>
+                        <a:t>MVC_App</a:t>
+                      </a:r>
+                    </a:p>
+                  </a:txBody>
+                  <a:tcPr marL="95250" marR="6350" marT="6350" marB="0"/>
+                </a:tc>
+                <a:tc>
+                  <a:txBody>
+                    <a:bodyPr/>
+                    <a:lstStyle/>
+                    <a:p>
+                      <a:pPr algn="l" fontAlgn="t"/>
+                      <a:r>
+                        <a:rPr lang="en-US" sz="800" b="0" i="0" u="none" strike="noStrike">
+                          <a:solidFill>
+                            <a:srgbClr val="000000"/>
+                          </a:solidFill>
+                          <a:effectLst/>
+                          <a:latin typeface="Arial" panose="020B0604020202020204" pitchFamily="34" charset="0"/>
+                          <a:cs typeface="Arial" panose="020B0604020202020204" pitchFamily="34" charset="0"/>
+                        </a:rPr>
+                        <a:t>App</a:t>
+                      </a:r>
+                    </a:p>
+                  </a:txBody>
+                  <a:tcPr marL="95250" marR="6350" marT="6350" marB="0"/>
+                </a:tc>
+                <a:extLst>
+                  <a:ext uri="{0D108BD9-81ED-4DB2-BD59-A6C34878D82A}">
+                    <a16:rowId xmlns:a16="http://schemas.microsoft.com/office/drawing/2014/main" val="376044827"/>
+                  </a:ext>
+                </a:extLst>
+              </a:tr>
+              <a:tr h="228600">
+                <a:tc>
+                  <a:txBody>
+                    <a:bodyPr/>
+                    <a:lstStyle/>
+                    <a:p>
+                      <a:pPr algn="l" fontAlgn="t"/>
+                      <a:r>
+                        <a:rPr lang="en-US" sz="800" b="0" i="0" u="none" strike="noStrike">
+                          <a:solidFill>
+                            <a:srgbClr val="000000"/>
+                          </a:solidFill>
+                          <a:effectLst/>
+                          <a:latin typeface="Arial" panose="020B0604020202020204" pitchFamily="34" charset="0"/>
+                          <a:cs typeface="Arial" panose="020B0604020202020204" pitchFamily="34" charset="0"/>
+                        </a:rPr>
+                        <a:t>main_window</a:t>
+                      </a:r>
+                    </a:p>
+                  </a:txBody>
+                  <a:tcPr marL="95250" marR="6350" marT="6350" marB="0"/>
+                </a:tc>
+                <a:tc>
+                  <a:txBody>
+                    <a:bodyPr/>
+                    <a:lstStyle/>
+                    <a:p>
+                      <a:pPr marL="0" marR="0" lvl="0" indent="0" algn="l" defTabSz="914400" rtl="0" eaLnBrk="1" fontAlgn="t" latinLnBrk="0" hangingPunct="1">
+                        <a:lnSpc>
+                          <a:spcPct val="100000"/>
+                        </a:lnSpc>
+                        <a:spcBef>
+                          <a:spcPts val="0"/>
+                        </a:spcBef>
+                        <a:spcAft>
+                          <a:spcPts val="0"/>
+                        </a:spcAft>
+                        <a:buClrTx/>
+                        <a:buSzTx/>
+                        <a:buFontTx/>
+                        <a:buNone/>
+                        <a:tabLst/>
+                        <a:defRPr/>
+                      </a:pPr>
+                      <a:r>
+                        <a:rPr lang="en-US" sz="800" u="none" strike="noStrike">
+                          <a:effectLst/>
+                          <a:latin typeface="Arial" panose="020B0604020202020204" pitchFamily="34" charset="0"/>
+                          <a:cs typeface="Arial" panose="020B0604020202020204" pitchFamily="34" charset="0"/>
+                        </a:rPr>
+                        <a:t>View.Window_Manager</a:t>
                       </a:r>
                       <a:endParaRPr lang="en-US" sz="800" b="0" i="0" u="none" strike="noStrike">
                         <a:solidFill>
@@ -33149,6 +33933,13 @@
                   </a:txBody>
                   <a:tcPr marL="95250" marR="6350" marT="6350" marB="0"/>
                 </a:tc>
+                <a:extLst>
+                  <a:ext uri="{0D108BD9-81ED-4DB2-BD59-A6C34878D82A}">
+                    <a16:rowId xmlns:a16="http://schemas.microsoft.com/office/drawing/2014/main" val="3823139174"/>
+                  </a:ext>
+                </a:extLst>
+              </a:tr>
+              <a:tr h="184150">
                 <a:tc>
                   <a:txBody>
                     <a:bodyPr/>
@@ -33156,13 +33947,54 @@
                     <a:p>
                       <a:pPr algn="l" fontAlgn="t"/>
                       <a:r>
-                        <a:rPr lang="en-US" sz="800" u="none" strike="noStrike">
+                        <a:rPr lang="en-US" sz="800" b="0" i="0" u="none" strike="noStrike">
+                          <a:solidFill>
+                            <a:srgbClr val="000000"/>
+                          </a:solidFill>
                           <a:effectLst/>
                           <a:latin typeface="Arial" panose="020B0604020202020204" pitchFamily="34" charset="0"/>
                           <a:cs typeface="Arial" panose="020B0604020202020204" pitchFamily="34" charset="0"/>
                         </a:rPr>
-                        <a:t>The mouse pointer is changed to the cursor type set to different values like an arrow, dot, etc.</a:t>
-                      </a:r>
+                        <a:t>frame</a:t>
+                      </a:r>
+                    </a:p>
+                  </a:txBody>
+                  <a:tcPr marL="95250" marR="6350" marT="6350" marB="0"/>
+                </a:tc>
+                <a:tc>
+                  <a:txBody>
+                    <a:bodyPr/>
+                    <a:lstStyle/>
+                    <a:p>
+                      <a:pPr algn="l" fontAlgn="t"/>
+                      <a:r>
+                        <a:rPr lang="en-US" sz="800" b="0" i="0" u="none" strike="noStrike">
+                          <a:solidFill>
+                            <a:srgbClr val="000000"/>
+                          </a:solidFill>
+                          <a:effectLst/>
+                          <a:latin typeface="Arial" panose="020B0604020202020204" pitchFamily="34" charset="0"/>
+                          <a:cs typeface="Arial" panose="020B0604020202020204" pitchFamily="34" charset="0"/>
+                        </a:rPr>
+                        <a:t>tkinter.Frame()</a:t>
+                      </a:r>
+                    </a:p>
+                  </a:txBody>
+                  <a:tcPr marL="95250" marR="6350" marT="6350" marB="0"/>
+                </a:tc>
+                <a:extLst>
+                  <a:ext uri="{0D108BD9-81ED-4DB2-BD59-A6C34878D82A}">
+                    <a16:rowId xmlns:a16="http://schemas.microsoft.com/office/drawing/2014/main" val="3835006122"/>
+                  </a:ext>
+                </a:extLst>
+              </a:tr>
+              <a:tr h="184150">
+                <a:tc>
+                  <a:txBody>
+                    <a:bodyPr/>
+                    <a:lstStyle/>
+                    <a:p>
+                      <a:pPr algn="l" fontAlgn="t"/>
                       <a:endParaRPr lang="en-US" sz="800" b="0" i="0" u="none" strike="noStrike">
                         <a:solidFill>
                           <a:srgbClr val="000000"/>
@@ -33175,27 +34007,12 @@
                   </a:txBody>
                   <a:tcPr marL="95250" marR="6350" marT="6350" marB="0"/>
                 </a:tc>
-                <a:extLst>
-                  <a:ext uri="{0D108BD9-81ED-4DB2-BD59-A6C34878D82A}">
-                    <a16:rowId xmlns:a16="http://schemas.microsoft.com/office/drawing/2014/main" val="3823139174"/>
-                  </a:ext>
-                </a:extLst>
-              </a:tr>
-              <a:tr h="184150">
                 <a:tc>
                   <a:txBody>
                     <a:bodyPr/>
                     <a:lstStyle/>
                     <a:p>
                       <a:pPr algn="l" fontAlgn="t"/>
-                      <a:r>
-                        <a:rPr lang="en-US" sz="800" u="none" strike="noStrike">
-                          <a:effectLst/>
-                          <a:latin typeface="Arial" panose="020B0604020202020204" pitchFamily="34" charset="0"/>
-                          <a:cs typeface="Arial" panose="020B0604020202020204" pitchFamily="34" charset="0"/>
-                        </a:rPr>
-                        <a:t>height</a:t>
-                      </a:r>
                       <a:endParaRPr lang="en-US" sz="800" b="0" i="0" u="none" strike="noStrike">
                         <a:solidFill>
                           <a:srgbClr val="000000"/>
@@ -33208,20 +34025,19 @@
                   </a:txBody>
                   <a:tcPr marL="95250" marR="6350" marT="6350" marB="0"/>
                 </a:tc>
+                <a:extLst>
+                  <a:ext uri="{0D108BD9-81ED-4DB2-BD59-A6C34878D82A}">
+                    <a16:rowId xmlns:a16="http://schemas.microsoft.com/office/drawing/2014/main" val="1790758034"/>
+                  </a:ext>
+                </a:extLst>
+              </a:tr>
+              <a:tr h="184150">
                 <a:tc>
                   <a:txBody>
                     <a:bodyPr/>
                     <a:lstStyle/>
                     <a:p>
                       <a:pPr algn="l" fontAlgn="t"/>
-                      <a:r>
-                        <a:rPr lang="en-US" sz="800" u="none" strike="noStrike">
-                          <a:effectLst/>
-                          <a:latin typeface="Arial" panose="020B0604020202020204" pitchFamily="34" charset="0"/>
-                          <a:cs typeface="Arial" panose="020B0604020202020204" pitchFamily="34" charset="0"/>
-                        </a:rPr>
-                        <a:t>The height of the frame.</a:t>
-                      </a:r>
                       <a:endParaRPr lang="en-US" sz="800" b="0" i="0" u="none" strike="noStrike">
                         <a:solidFill>
                           <a:srgbClr val="000000"/>
@@ -33234,27 +34050,12 @@
                   </a:txBody>
                   <a:tcPr marL="95250" marR="6350" marT="6350" marB="0"/>
                 </a:tc>
-                <a:extLst>
-                  <a:ext uri="{0D108BD9-81ED-4DB2-BD59-A6C34878D82A}">
-                    <a16:rowId xmlns:a16="http://schemas.microsoft.com/office/drawing/2014/main" val="3835006122"/>
-                  </a:ext>
-                </a:extLst>
-              </a:tr>
-              <a:tr h="184150">
                 <a:tc>
                   <a:txBody>
                     <a:bodyPr/>
                     <a:lstStyle/>
                     <a:p>
                       <a:pPr algn="l" fontAlgn="t"/>
-                      <a:r>
-                        <a:rPr lang="en-US" sz="800" u="none" strike="noStrike">
-                          <a:effectLst/>
-                          <a:latin typeface="Arial" panose="020B0604020202020204" pitchFamily="34" charset="0"/>
-                          <a:cs typeface="Arial" panose="020B0604020202020204" pitchFamily="34" charset="0"/>
-                        </a:rPr>
-                        <a:t>highlightbackground</a:t>
-                      </a:r>
                       <a:endParaRPr lang="en-US" sz="800" b="0" i="0" u="none" strike="noStrike">
                         <a:solidFill>
                           <a:srgbClr val="000000"/>
@@ -33267,20 +34068,19 @@
                   </a:txBody>
                   <a:tcPr marL="95250" marR="6350" marT="6350" marB="0"/>
                 </a:tc>
+                <a:extLst>
+                  <a:ext uri="{0D108BD9-81ED-4DB2-BD59-A6C34878D82A}">
+                    <a16:rowId xmlns:a16="http://schemas.microsoft.com/office/drawing/2014/main" val="389858007"/>
+                  </a:ext>
+                </a:extLst>
+              </a:tr>
+              <a:tr h="228600">
                 <a:tc>
                   <a:txBody>
                     <a:bodyPr/>
                     <a:lstStyle/>
                     <a:p>
                       <a:pPr algn="l" fontAlgn="t"/>
-                      <a:r>
-                        <a:rPr lang="en-US" sz="800" u="none" strike="noStrike">
-                          <a:effectLst/>
-                          <a:latin typeface="Arial" panose="020B0604020202020204" pitchFamily="34" charset="0"/>
-                          <a:cs typeface="Arial" panose="020B0604020202020204" pitchFamily="34" charset="0"/>
-                        </a:rPr>
-                        <a:t>The color of the background color when it is under focus.</a:t>
-                      </a:r>
                       <a:endParaRPr lang="en-US" sz="800" b="0" i="0" u="none" strike="noStrike">
                         <a:solidFill>
                           <a:srgbClr val="000000"/>
@@ -33293,27 +34093,12 @@
                   </a:txBody>
                   <a:tcPr marL="95250" marR="6350" marT="6350" marB="0"/>
                 </a:tc>
-                <a:extLst>
-                  <a:ext uri="{0D108BD9-81ED-4DB2-BD59-A6C34878D82A}">
-                    <a16:rowId xmlns:a16="http://schemas.microsoft.com/office/drawing/2014/main" val="1790758034"/>
-                  </a:ext>
-                </a:extLst>
-              </a:tr>
-              <a:tr h="184150">
                 <a:tc>
                   <a:txBody>
                     <a:bodyPr/>
                     <a:lstStyle/>
                     <a:p>
                       <a:pPr algn="l" fontAlgn="t"/>
-                      <a:r>
-                        <a:rPr lang="en-US" sz="800" u="none" strike="noStrike">
-                          <a:effectLst/>
-                          <a:latin typeface="Arial" panose="020B0604020202020204" pitchFamily="34" charset="0"/>
-                          <a:cs typeface="Arial" panose="020B0604020202020204" pitchFamily="34" charset="0"/>
-                        </a:rPr>
-                        <a:t>highlightcolor</a:t>
-                      </a:r>
                       <a:endParaRPr lang="en-US" sz="800" b="0" i="0" u="none" strike="noStrike">
                         <a:solidFill>
                           <a:srgbClr val="000000"/>
@@ -33326,20 +34111,19 @@
                   </a:txBody>
                   <a:tcPr marL="95250" marR="6350" marT="6350" marB="0"/>
                 </a:tc>
+                <a:extLst>
+                  <a:ext uri="{0D108BD9-81ED-4DB2-BD59-A6C34878D82A}">
+                    <a16:rowId xmlns:a16="http://schemas.microsoft.com/office/drawing/2014/main" val="3200100478"/>
+                  </a:ext>
+                </a:extLst>
+              </a:tr>
+              <a:tr h="184150">
                 <a:tc>
                   <a:txBody>
                     <a:bodyPr/>
                     <a:lstStyle/>
                     <a:p>
                       <a:pPr algn="l" fontAlgn="t"/>
-                      <a:r>
-                        <a:rPr lang="en-US" sz="800" u="none" strike="noStrike">
-                          <a:effectLst/>
-                          <a:latin typeface="Arial" panose="020B0604020202020204" pitchFamily="34" charset="0"/>
-                          <a:cs typeface="Arial" panose="020B0604020202020204" pitchFamily="34" charset="0"/>
-                        </a:rPr>
-                        <a:t>The text color when the widget is under focus.</a:t>
-                      </a:r>
                       <a:endParaRPr lang="en-US" sz="800" b="0" i="0" u="none" strike="noStrike">
                         <a:solidFill>
                           <a:srgbClr val="000000"/>
@@ -33352,27 +34136,12 @@
                   </a:txBody>
                   <a:tcPr marL="95250" marR="6350" marT="6350" marB="0"/>
                 </a:tc>
-                <a:extLst>
-                  <a:ext uri="{0D108BD9-81ED-4DB2-BD59-A6C34878D82A}">
-                    <a16:rowId xmlns:a16="http://schemas.microsoft.com/office/drawing/2014/main" val="389858007"/>
-                  </a:ext>
-                </a:extLst>
-              </a:tr>
-              <a:tr h="228600">
                 <a:tc>
                   <a:txBody>
                     <a:bodyPr/>
                     <a:lstStyle/>
                     <a:p>
                       <a:pPr algn="l" fontAlgn="t"/>
-                      <a:r>
-                        <a:rPr lang="en-US" sz="800" u="none" strike="noStrike">
-                          <a:effectLst/>
-                          <a:latin typeface="Arial" panose="020B0604020202020204" pitchFamily="34" charset="0"/>
-                          <a:cs typeface="Arial" panose="020B0604020202020204" pitchFamily="34" charset="0"/>
-                        </a:rPr>
-                        <a:t>highlightthickness</a:t>
-                      </a:r>
                       <a:endParaRPr lang="en-US" sz="800" b="0" i="0" u="none" strike="noStrike">
                         <a:solidFill>
                           <a:srgbClr val="000000"/>
@@ -33385,20 +34154,19 @@
                   </a:txBody>
                   <a:tcPr marL="95250" marR="6350" marT="6350" marB="0"/>
                 </a:tc>
+                <a:extLst>
+                  <a:ext uri="{0D108BD9-81ED-4DB2-BD59-A6C34878D82A}">
+                    <a16:rowId xmlns:a16="http://schemas.microsoft.com/office/drawing/2014/main" val="3650554681"/>
+                  </a:ext>
+                </a:extLst>
+              </a:tr>
+              <a:tr h="184150">
                 <a:tc>
                   <a:txBody>
                     <a:bodyPr/>
                     <a:lstStyle/>
                     <a:p>
                       <a:pPr algn="l" fontAlgn="t"/>
-                      <a:r>
-                        <a:rPr lang="en-US" sz="800" u="none" strike="noStrike">
-                          <a:effectLst/>
-                          <a:latin typeface="Arial" panose="020B0604020202020204" pitchFamily="34" charset="0"/>
-                          <a:cs typeface="Arial" panose="020B0604020202020204" pitchFamily="34" charset="0"/>
-                        </a:rPr>
-                        <a:t>It specifies the thickness around the border when the widget is under the focus.</a:t>
-                      </a:r>
                       <a:endParaRPr lang="en-US" sz="800" b="0" i="0" u="none" strike="noStrike">
                         <a:solidFill>
                           <a:srgbClr val="000000"/>
@@ -33411,112 +34179,12 @@
                   </a:txBody>
                   <a:tcPr marL="95250" marR="6350" marT="6350" marB="0"/>
                 </a:tc>
-                <a:extLst>
-                  <a:ext uri="{0D108BD9-81ED-4DB2-BD59-A6C34878D82A}">
-                    <a16:rowId xmlns:a16="http://schemas.microsoft.com/office/drawing/2014/main" val="3200100478"/>
-                  </a:ext>
-                </a:extLst>
-              </a:tr>
-              <a:tr h="184150">
                 <a:tc>
                   <a:txBody>
                     <a:bodyPr/>
                     <a:lstStyle/>
                     <a:p>
                       <a:pPr algn="l" fontAlgn="t"/>
-                      <a:r>
-                        <a:rPr lang="en-US" sz="800" u="none" strike="noStrike">
-                          <a:effectLst/>
-                          <a:latin typeface="Arial" panose="020B0604020202020204" pitchFamily="34" charset="0"/>
-                          <a:cs typeface="Arial" panose="020B0604020202020204" pitchFamily="34" charset="0"/>
-                        </a:rPr>
-                        <a:t>relief</a:t>
-                      </a:r>
-                      <a:endParaRPr lang="en-US" sz="800" b="0" i="0" u="none" strike="noStrike">
-                        <a:solidFill>
-                          <a:srgbClr val="000000"/>
-                        </a:solidFill>
-                        <a:effectLst/>
-                        <a:latin typeface="Arial" panose="020B0604020202020204" pitchFamily="34" charset="0"/>
-                        <a:cs typeface="Arial" panose="020B0604020202020204" pitchFamily="34" charset="0"/>
-                      </a:endParaRPr>
-                    </a:p>
-                  </a:txBody>
-                  <a:tcPr marL="95250" marR="6350" marT="6350" marB="0"/>
-                </a:tc>
-                <a:tc>
-                  <a:txBody>
-                    <a:bodyPr/>
-                    <a:lstStyle/>
-                    <a:p>
-                      <a:pPr algn="l" fontAlgn="t"/>
-                      <a:r>
-                        <a:rPr lang="en-US" sz="800" u="none" strike="noStrike">
-                          <a:effectLst/>
-                          <a:latin typeface="Arial" panose="020B0604020202020204" pitchFamily="34" charset="0"/>
-                          <a:cs typeface="Arial" panose="020B0604020202020204" pitchFamily="34" charset="0"/>
-                        </a:rPr>
-                        <a:t>It specifies the type of the border. The default value if FLAT.</a:t>
-                      </a:r>
-                      <a:endParaRPr lang="en-US" sz="800" b="0" i="0" u="none" strike="noStrike">
-                        <a:solidFill>
-                          <a:srgbClr val="000000"/>
-                        </a:solidFill>
-                        <a:effectLst/>
-                        <a:latin typeface="Arial" panose="020B0604020202020204" pitchFamily="34" charset="0"/>
-                        <a:cs typeface="Arial" panose="020B0604020202020204" pitchFamily="34" charset="0"/>
-                      </a:endParaRPr>
-                    </a:p>
-                  </a:txBody>
-                  <a:tcPr marL="95250" marR="6350" marT="6350" marB="0"/>
-                </a:tc>
-                <a:extLst>
-                  <a:ext uri="{0D108BD9-81ED-4DB2-BD59-A6C34878D82A}">
-                    <a16:rowId xmlns:a16="http://schemas.microsoft.com/office/drawing/2014/main" val="3650554681"/>
-                  </a:ext>
-                </a:extLst>
-              </a:tr>
-              <a:tr h="184150">
-                <a:tc>
-                  <a:txBody>
-                    <a:bodyPr/>
-                    <a:lstStyle/>
-                    <a:p>
-                      <a:pPr algn="l" fontAlgn="t"/>
-                      <a:r>
-                        <a:rPr lang="en-US" sz="800" u="none" strike="noStrike">
-                          <a:effectLst/>
-                          <a:latin typeface="Arial" panose="020B0604020202020204" pitchFamily="34" charset="0"/>
-                          <a:cs typeface="Arial" panose="020B0604020202020204" pitchFamily="34" charset="0"/>
-                        </a:rPr>
-                        <a:t>width</a:t>
-                      </a:r>
-                      <a:endParaRPr lang="en-US" sz="800" b="0" i="0" u="none" strike="noStrike">
-                        <a:solidFill>
-                          <a:srgbClr val="000000"/>
-                        </a:solidFill>
-                        <a:effectLst/>
-                        <a:latin typeface="Arial" panose="020B0604020202020204" pitchFamily="34" charset="0"/>
-                        <a:cs typeface="Arial" panose="020B0604020202020204" pitchFamily="34" charset="0"/>
-                      </a:endParaRPr>
-                    </a:p>
-                  </a:txBody>
-                  <a:tcPr marL="95250" marR="6350" marT="6350" marB="0"/>
-                </a:tc>
-                <a:tc>
-                  <a:txBody>
-                    <a:bodyPr/>
-                    <a:lstStyle/>
-                    <a:p>
-                      <a:pPr algn="l" fontAlgn="t"/>
-                      <a:r>
-                        <a:rPr lang="en-US" sz="800" u="none" strike="noStrike">
-                          <a:effectLst/>
-                          <a:latin typeface="Arial" panose="020B0604020202020204" pitchFamily="34" charset="0"/>
-                          <a:cs typeface="Arial" panose="020B0604020202020204" pitchFamily="34" charset="0"/>
-                        </a:rPr>
-                        <a:t>It represents the width of the widget.</a:t>
-                      </a:r>
                       <a:endParaRPr lang="en-US" sz="800" b="0" i="0" u="none" strike="noStrike">
                         <a:solidFill>
                           <a:srgbClr val="000000"/>
@@ -33553,8 +34221,8 @@
         </p:nvSpPr>
         <p:spPr>
           <a:xfrm>
-            <a:off x="352084" y="721751"/>
-            <a:ext cx="1934550" cy="802249"/>
+            <a:off x="2529443" y="839989"/>
+            <a:ext cx="1934550" cy="1537451"/>
           </a:xfrm>
           <a:prstGeom prst="rect">
             <a:avLst/>
@@ -33601,7 +34269,31 @@
           </a:p>
           <a:p>
             <a:r>
-              <a:rPr lang="en-US" sz="800" err="1">
+              <a:rPr lang="en-US" sz="800">
+                <a:solidFill>
+                  <a:schemeClr val="bg1"/>
+                </a:solidFill>
+                <a:latin typeface="Arial" panose="020B0604020202020204" pitchFamily="34" charset="0"/>
+                <a:cs typeface="Arial" panose="020B0604020202020204" pitchFamily="34" charset="0"/>
+              </a:rPr>
+              <a:t>win_manager</a:t>
+            </a:r>
+          </a:p>
+          <a:p>
+            <a:r>
+              <a:rPr lang="en-US" sz="800">
+                <a:solidFill>
+                  <a:schemeClr val="bg1"/>
+                </a:solidFill>
+                <a:latin typeface="Arial" panose="020B0604020202020204" pitchFamily="34" charset="0"/>
+                <a:cs typeface="Arial" panose="020B0604020202020204" pitchFamily="34" charset="0"/>
+              </a:rPr>
+              <a:t>App_Name</a:t>
+            </a:r>
+          </a:p>
+          <a:p>
+            <a:r>
+              <a:rPr lang="en-US" sz="800">
                 <a:solidFill>
                   <a:schemeClr val="bg1"/>
                 </a:solidFill>
@@ -33609,6 +34301,40 @@
                 <a:cs typeface="Arial" panose="020B0604020202020204" pitchFamily="34" charset="0"/>
               </a:rPr>
               <a:t>MVC_App</a:t>
+            </a:r>
+          </a:p>
+          <a:p>
+            <a:r>
+              <a:rPr lang="en-US" sz="800">
+                <a:solidFill>
+                  <a:schemeClr val="bg1"/>
+                </a:solidFill>
+                <a:latin typeface="Arial" panose="020B0604020202020204" pitchFamily="34" charset="0"/>
+                <a:cs typeface="Arial" panose="020B0604020202020204" pitchFamily="34" charset="0"/>
+              </a:rPr>
+              <a:t>tkint</a:t>
+            </a:r>
+          </a:p>
+          <a:p>
+            <a:r>
+              <a:rPr lang="en-US" sz="800">
+                <a:solidFill>
+                  <a:schemeClr val="bg1"/>
+                </a:solidFill>
+                <a:latin typeface="Arial" panose="020B0604020202020204" pitchFamily="34" charset="0"/>
+                <a:cs typeface="Arial" panose="020B0604020202020204" pitchFamily="34" charset="0"/>
+              </a:rPr>
+              <a:t>app_</a:t>
+            </a:r>
+            <a:r>
+              <a:rPr lang="en-US" sz="800" err="1">
+                <a:solidFill>
+                  <a:schemeClr val="bg1"/>
+                </a:solidFill>
+                <a:latin typeface="Arial" panose="020B0604020202020204" pitchFamily="34" charset="0"/>
+                <a:cs typeface="Arial" panose="020B0604020202020204" pitchFamily="34" charset="0"/>
+              </a:rPr>
+              <a:t>window</a:t>
             </a:r>
             <a:endParaRPr lang="en-US" sz="800">
               <a:solidFill>
@@ -33620,15 +34346,17 @@
           </a:p>
           <a:p>
             <a:r>
-              <a:rPr lang="en-US" sz="800" err="1">
+              <a:rPr lang="en-US" sz="800">
                 <a:solidFill>
                   <a:schemeClr val="bg1"/>
                 </a:solidFill>
                 <a:latin typeface="Arial" panose="020B0604020202020204" pitchFamily="34" charset="0"/>
                 <a:cs typeface="Arial" panose="020B0604020202020204" pitchFamily="34" charset="0"/>
               </a:rPr>
-              <a:t>OS_View</a:t>
-            </a:r>
+              <a:t>frame</a:t>
+            </a:r>
+          </a:p>
+          <a:p>
             <a:endParaRPr lang="en-US" sz="800">
               <a:solidFill>
                 <a:schemeClr val="bg1"/>
@@ -33638,6 +34366,25 @@
             </a:endParaRPr>
           </a:p>
           <a:p>
+            <a:r>
+              <a:rPr lang="en-US" sz="800">
+                <a:solidFill>
+                  <a:schemeClr val="bg1"/>
+                </a:solidFill>
+                <a:latin typeface="Arial" panose="020B0604020202020204" pitchFamily="34" charset="0"/>
+                <a:cs typeface="Arial" panose="020B0604020202020204" pitchFamily="34" charset="0"/>
+              </a:rPr>
+              <a:t>Methods:</a:t>
+            </a:r>
+            <a:br>
+              <a:rPr lang="en-US" sz="800">
+                <a:solidFill>
+                  <a:schemeClr val="bg1"/>
+                </a:solidFill>
+                <a:latin typeface="Arial" panose="020B0604020202020204" pitchFamily="34" charset="0"/>
+                <a:cs typeface="Arial" panose="020B0604020202020204" pitchFamily="34" charset="0"/>
+              </a:rPr>
+            </a:br>
             <a:endParaRPr lang="en-US" sz="800">
               <a:solidFill>
                 <a:schemeClr val="bg1"/>
@@ -33646,6 +34393,339 @@
               <a:cs typeface="Arial" panose="020B0604020202020204" pitchFamily="34" charset="0"/>
             </a:endParaRPr>
           </a:p>
+        </p:txBody>
+      </p:sp>
+      <p:sp>
+        <p:nvSpPr>
+          <p:cNvPr id="6" name="Rectangle 5">
+            <a:extLst>
+              <a:ext uri="{FF2B5EF4-FFF2-40B4-BE49-F238E27FC236}">
+                <a16:creationId xmlns:a16="http://schemas.microsoft.com/office/drawing/2014/main" id="{D26F5631-C8B3-4B90-90F8-9BA34C356CBE}"/>
+              </a:ext>
+            </a:extLst>
+          </p:cNvPr>
+          <p:cNvSpPr/>
+          <p:nvPr/>
+        </p:nvSpPr>
+        <p:spPr>
+          <a:xfrm>
+            <a:off x="4535809" y="682828"/>
+            <a:ext cx="1934551" cy="157162"/>
+          </a:xfrm>
+          <a:prstGeom prst="rect">
+            <a:avLst/>
+          </a:prstGeom>
+          <a:noFill/>
+          <a:ln w="9525" cap="flat" cmpd="sng" algn="ctr">
+            <a:solidFill>
+              <a:schemeClr val="dk1"/>
+            </a:solidFill>
+            <a:prstDash val="solid"/>
+            <a:round/>
+            <a:headEnd type="none" w="med" len="med"/>
+            <a:tailEnd type="none" w="med" len="med"/>
+          </a:ln>
+        </p:spPr>
+        <p:style>
+          <a:lnRef idx="0">
+            <a:scrgbClr r="0" g="0" b="0"/>
+          </a:lnRef>
+          <a:fillRef idx="0">
+            <a:scrgbClr r="0" g="0" b="0"/>
+          </a:fillRef>
+          <a:effectRef idx="0">
+            <a:scrgbClr r="0" g="0" b="0"/>
+          </a:effectRef>
+          <a:fontRef idx="minor">
+            <a:schemeClr val="dk1"/>
+          </a:fontRef>
+        </p:style>
+        <p:txBody>
+          <a:bodyPr rtlCol="0" anchor="ctr"/>
+          <a:lstStyle/>
+          <a:p>
+            <a:r>
+              <a:rPr lang="en-US" sz="800">
+                <a:solidFill>
+                  <a:schemeClr val="bg1"/>
+                </a:solidFill>
+                <a:latin typeface="Arial" panose="020B0604020202020204" pitchFamily="34" charset="0"/>
+                <a:cs typeface="Arial" panose="020B0604020202020204" pitchFamily="34" charset="0"/>
+              </a:rPr>
+              <a:t>Win2(self, win_manager) </a:t>
+            </a:r>
+          </a:p>
+        </p:txBody>
+      </p:sp>
+      <p:sp>
+        <p:nvSpPr>
+          <p:cNvPr id="10" name="Rectangle: Folded Corner 9">
+            <a:extLst>
+              <a:ext uri="{FF2B5EF4-FFF2-40B4-BE49-F238E27FC236}">
+                <a16:creationId xmlns:a16="http://schemas.microsoft.com/office/drawing/2014/main" id="{74AC1483-E6FA-4DB4-BB7D-40C0CCF5B8B8}"/>
+              </a:ext>
+            </a:extLst>
+          </p:cNvPr>
+          <p:cNvSpPr/>
+          <p:nvPr/>
+        </p:nvSpPr>
+        <p:spPr>
+          <a:xfrm>
+            <a:off x="4535809" y="2684240"/>
+            <a:ext cx="1934551" cy="341743"/>
+          </a:xfrm>
+          <a:prstGeom prst="foldedCorner">
+            <a:avLst/>
+          </a:prstGeom>
+          <a:solidFill>
+            <a:srgbClr val="FFFFCC"/>
+          </a:solidFill>
+          <a:ln w="9525" cap="flat" cmpd="sng" algn="ctr">
+            <a:solidFill>
+              <a:schemeClr val="dk1"/>
+            </a:solidFill>
+            <a:prstDash val="solid"/>
+            <a:round/>
+            <a:headEnd type="none" w="med" len="med"/>
+            <a:tailEnd type="none" w="med" len="med"/>
+          </a:ln>
+        </p:spPr>
+        <p:style>
+          <a:lnRef idx="0">
+            <a:scrgbClr r="0" g="0" b="0"/>
+          </a:lnRef>
+          <a:fillRef idx="0">
+            <a:scrgbClr r="0" g="0" b="0"/>
+          </a:fillRef>
+          <a:effectRef idx="0">
+            <a:scrgbClr r="0" g="0" b="0"/>
+          </a:effectRef>
+          <a:fontRef idx="minor">
+            <a:schemeClr val="dk1"/>
+          </a:fontRef>
+        </p:style>
+        <p:txBody>
+          <a:bodyPr rtlCol="0" anchor="ctr"/>
+          <a:lstStyle/>
+          <a:p>
+            <a:pPr marL="171450" indent="-171450">
+              <a:buFont typeface="Arial" panose="020B0604020202020204" pitchFamily="34" charset="0"/>
+              <a:buChar char="•"/>
+            </a:pPr>
+            <a:r>
+              <a:rPr lang="en-US" sz="800" b="1">
+                <a:solidFill>
+                  <a:schemeClr val="bg1"/>
+                </a:solidFill>
+                <a:latin typeface="Arial" panose="020B0604020202020204" pitchFamily="34" charset="0"/>
+                <a:cs typeface="Arial" panose="020B0604020202020204" pitchFamily="34" charset="0"/>
+              </a:rPr>
+              <a:t>self</a:t>
+            </a:r>
+            <a:r>
+              <a:rPr lang="en-US" sz="800">
+                <a:solidFill>
+                  <a:schemeClr val="bg1"/>
+                </a:solidFill>
+                <a:latin typeface="Arial" panose="020B0604020202020204" pitchFamily="34" charset="0"/>
+                <a:cs typeface="Arial" panose="020B0604020202020204" pitchFamily="34" charset="0"/>
+              </a:rPr>
+              <a:t> − This represents Win#.</a:t>
+            </a:r>
+          </a:p>
+          <a:p>
+            <a:pPr marL="171450" indent="-171450">
+              <a:buFont typeface="Arial" panose="020B0604020202020204" pitchFamily="34" charset="0"/>
+              <a:buChar char="•"/>
+            </a:pPr>
+            <a:r>
+              <a:rPr lang="en-US" sz="800" b="1">
+                <a:solidFill>
+                  <a:schemeClr val="bg1"/>
+                </a:solidFill>
+                <a:latin typeface="Arial" panose="020B0604020202020204" pitchFamily="34" charset="0"/>
+                <a:cs typeface="Arial" panose="020B0604020202020204" pitchFamily="34" charset="0"/>
+              </a:rPr>
+              <a:t>win_manager </a:t>
+            </a:r>
+            <a:r>
+              <a:rPr lang="en-US" sz="800">
+                <a:solidFill>
+                  <a:schemeClr val="bg1"/>
+                </a:solidFill>
+                <a:latin typeface="Arial" panose="020B0604020202020204" pitchFamily="34" charset="0"/>
+                <a:cs typeface="Arial" panose="020B0604020202020204" pitchFamily="34" charset="0"/>
+              </a:rPr>
+              <a:t>−View window</a:t>
+            </a:r>
+          </a:p>
+        </p:txBody>
+      </p:sp>
+      <p:sp>
+        <p:nvSpPr>
+          <p:cNvPr id="12" name="Rectangle 11">
+            <a:extLst>
+              <a:ext uri="{FF2B5EF4-FFF2-40B4-BE49-F238E27FC236}">
+                <a16:creationId xmlns:a16="http://schemas.microsoft.com/office/drawing/2014/main" id="{582B56E8-76A1-425E-B49A-8A21324FE8D4}"/>
+              </a:ext>
+            </a:extLst>
+          </p:cNvPr>
+          <p:cNvSpPr/>
+          <p:nvPr/>
+        </p:nvSpPr>
+        <p:spPr>
+          <a:xfrm>
+            <a:off x="4535810" y="839989"/>
+            <a:ext cx="1934550" cy="1760088"/>
+          </a:xfrm>
+          <a:prstGeom prst="rect">
+            <a:avLst/>
+          </a:prstGeom>
+          <a:noFill/>
+          <a:ln w="9525" cap="flat" cmpd="sng" algn="ctr">
+            <a:solidFill>
+              <a:schemeClr val="dk1"/>
+            </a:solidFill>
+            <a:prstDash val="solid"/>
+            <a:round/>
+            <a:headEnd type="none" w="med" len="med"/>
+            <a:tailEnd type="none" w="med" len="med"/>
+          </a:ln>
+        </p:spPr>
+        <p:style>
+          <a:lnRef idx="0">
+            <a:scrgbClr r="0" g="0" b="0"/>
+          </a:lnRef>
+          <a:fillRef idx="0">
+            <a:scrgbClr r="0" g="0" b="0"/>
+          </a:fillRef>
+          <a:effectRef idx="0">
+            <a:scrgbClr r="0" g="0" b="0"/>
+          </a:effectRef>
+          <a:fontRef idx="minor">
+            <a:schemeClr val="dk1"/>
+          </a:fontRef>
+        </p:style>
+        <p:txBody>
+          <a:bodyPr rtlCol="0" anchor="t"/>
+          <a:lstStyle/>
+          <a:p>
+            <a:r>
+              <a:rPr lang="en-US" sz="800">
+                <a:solidFill>
+                  <a:schemeClr val="bg1"/>
+                </a:solidFill>
+                <a:latin typeface="Arial" panose="020B0604020202020204" pitchFamily="34" charset="0"/>
+                <a:cs typeface="Arial" panose="020B0604020202020204" pitchFamily="34" charset="0"/>
+              </a:rPr>
+              <a:t>Properties:</a:t>
+            </a:r>
+          </a:p>
+          <a:p>
+            <a:r>
+              <a:rPr lang="en-US" sz="800">
+                <a:solidFill>
+                  <a:schemeClr val="bg1"/>
+                </a:solidFill>
+                <a:latin typeface="Arial" panose="020B0604020202020204" pitchFamily="34" charset="0"/>
+                <a:cs typeface="Arial" panose="020B0604020202020204" pitchFamily="34" charset="0"/>
+              </a:rPr>
+              <a:t>win_manager</a:t>
+            </a:r>
+          </a:p>
+          <a:p>
+            <a:r>
+              <a:rPr lang="en-US" sz="800">
+                <a:solidFill>
+                  <a:schemeClr val="bg1"/>
+                </a:solidFill>
+                <a:latin typeface="Arial" panose="020B0604020202020204" pitchFamily="34" charset="0"/>
+                <a:cs typeface="Arial" panose="020B0604020202020204" pitchFamily="34" charset="0"/>
+              </a:rPr>
+              <a:t>App_Name</a:t>
+            </a:r>
+          </a:p>
+          <a:p>
+            <a:r>
+              <a:rPr lang="en-US" sz="800">
+                <a:solidFill>
+                  <a:schemeClr val="bg1"/>
+                </a:solidFill>
+                <a:latin typeface="Arial" panose="020B0604020202020204" pitchFamily="34" charset="0"/>
+                <a:cs typeface="Arial" panose="020B0604020202020204" pitchFamily="34" charset="0"/>
+              </a:rPr>
+              <a:t>MVC_App</a:t>
+            </a:r>
+          </a:p>
+          <a:p>
+            <a:r>
+              <a:rPr lang="en-US" sz="800">
+                <a:solidFill>
+                  <a:schemeClr val="bg1"/>
+                </a:solidFill>
+                <a:latin typeface="Arial" panose="020B0604020202020204" pitchFamily="34" charset="0"/>
+                <a:cs typeface="Arial" panose="020B0604020202020204" pitchFamily="34" charset="0"/>
+              </a:rPr>
+              <a:t>tkint</a:t>
+            </a:r>
+          </a:p>
+          <a:p>
+            <a:r>
+              <a:rPr lang="en-US" sz="800">
+                <a:solidFill>
+                  <a:schemeClr val="bg1"/>
+                </a:solidFill>
+                <a:latin typeface="Arial" panose="020B0604020202020204" pitchFamily="34" charset="0"/>
+                <a:cs typeface="Arial" panose="020B0604020202020204" pitchFamily="34" charset="0"/>
+              </a:rPr>
+              <a:t>app_window</a:t>
+            </a:r>
+          </a:p>
+          <a:p>
+            <a:r>
+              <a:rPr lang="en-US" sz="800">
+                <a:solidFill>
+                  <a:schemeClr val="bg1"/>
+                </a:solidFill>
+                <a:latin typeface="Arial" panose="020B0604020202020204" pitchFamily="34" charset="0"/>
+                <a:cs typeface="Arial" panose="020B0604020202020204" pitchFamily="34" charset="0"/>
+              </a:rPr>
+              <a:t>OS_Info</a:t>
+            </a:r>
+          </a:p>
+          <a:p>
+            <a:r>
+              <a:rPr lang="en-US" sz="800">
+                <a:solidFill>
+                  <a:schemeClr val="bg1"/>
+                </a:solidFill>
+                <a:latin typeface="Arial" panose="020B0604020202020204" pitchFamily="34" charset="0"/>
+                <a:cs typeface="Arial" panose="020B0604020202020204" pitchFamily="34" charset="0"/>
+              </a:rPr>
+              <a:t>quit_button</a:t>
+            </a:r>
+          </a:p>
+          <a:p>
+            <a:r>
+              <a:rPr lang="en-US" sz="800">
+                <a:solidFill>
+                  <a:schemeClr val="bg1"/>
+                </a:solidFill>
+                <a:latin typeface="Arial" panose="020B0604020202020204" pitchFamily="34" charset="0"/>
+                <a:cs typeface="Arial" panose="020B0604020202020204" pitchFamily="34" charset="0"/>
+              </a:rPr>
+              <a:t>label_PRETTY_NAME</a:t>
+            </a:r>
+          </a:p>
+          <a:p>
+            <a:endParaRPr lang="en-US" sz="800">
+              <a:solidFill>
+                <a:schemeClr val="bg1"/>
+              </a:solidFill>
+              <a:latin typeface="Arial" panose="020B0604020202020204" pitchFamily="34" charset="0"/>
+              <a:cs typeface="Arial" panose="020B0604020202020204" pitchFamily="34" charset="0"/>
+            </a:endParaRPr>
+          </a:p>
           <a:p>
             <a:r>
               <a:rPr lang="en-US" sz="800">
@@ -33674,15 +34754,406 @@
                 <a:latin typeface="Arial" panose="020B0604020202020204" pitchFamily="34" charset="0"/>
                 <a:cs typeface="Arial" panose="020B0604020202020204" pitchFamily="34" charset="0"/>
               </a:rPr>
-              <a:t>none</a:t>
-            </a:r>
+              <a:t>show_widgets()</a:t>
+            </a:r>
+          </a:p>
+          <a:p>
+            <a:endParaRPr lang="en-US" sz="800">
+              <a:solidFill>
+                <a:schemeClr val="bg1"/>
+              </a:solidFill>
+              <a:latin typeface="Arial" panose="020B0604020202020204" pitchFamily="34" charset="0"/>
+              <a:cs typeface="Arial" panose="020B0604020202020204" pitchFamily="34" charset="0"/>
+            </a:endParaRPr>
+          </a:p>
+          <a:p>
+            <a:endParaRPr lang="en-US" sz="800">
+              <a:solidFill>
+                <a:schemeClr val="bg1"/>
+              </a:solidFill>
+              <a:latin typeface="Arial" panose="020B0604020202020204" pitchFamily="34" charset="0"/>
+              <a:cs typeface="Arial" panose="020B0604020202020204" pitchFamily="34" charset="0"/>
+            </a:endParaRPr>
+          </a:p>
+          <a:p>
+            <a:endParaRPr lang="en-US" sz="800">
+              <a:solidFill>
+                <a:schemeClr val="bg1"/>
+              </a:solidFill>
+              <a:latin typeface="Arial" panose="020B0604020202020204" pitchFamily="34" charset="0"/>
+              <a:cs typeface="Arial" panose="020B0604020202020204" pitchFamily="34" charset="0"/>
+            </a:endParaRPr>
+          </a:p>
+        </p:txBody>
+      </p:sp>
+      <p:sp>
+        <p:nvSpPr>
+          <p:cNvPr id="14" name="Rectangle 13">
+            <a:extLst>
+              <a:ext uri="{FF2B5EF4-FFF2-40B4-BE49-F238E27FC236}">
+                <a16:creationId xmlns:a16="http://schemas.microsoft.com/office/drawing/2014/main" id="{28CCF1F5-3A75-4EEE-A0D2-A5F06AA1D773}"/>
+              </a:ext>
+            </a:extLst>
+          </p:cNvPr>
+          <p:cNvSpPr/>
+          <p:nvPr/>
+        </p:nvSpPr>
+        <p:spPr>
+          <a:xfrm>
+            <a:off x="6534225" y="682828"/>
+            <a:ext cx="1934551" cy="157162"/>
+          </a:xfrm>
+          <a:prstGeom prst="rect">
+            <a:avLst/>
+          </a:prstGeom>
+          <a:noFill/>
+          <a:ln w="9525" cap="flat" cmpd="sng" algn="ctr">
+            <a:solidFill>
+              <a:schemeClr val="dk1"/>
+            </a:solidFill>
+            <a:prstDash val="solid"/>
+            <a:round/>
+            <a:headEnd type="none" w="med" len="med"/>
+            <a:tailEnd type="none" w="med" len="med"/>
+          </a:ln>
+        </p:spPr>
+        <p:style>
+          <a:lnRef idx="0">
+            <a:scrgbClr r="0" g="0" b="0"/>
+          </a:lnRef>
+          <a:fillRef idx="0">
+            <a:scrgbClr r="0" g="0" b="0"/>
+          </a:fillRef>
+          <a:effectRef idx="0">
+            <a:scrgbClr r="0" g="0" b="0"/>
+          </a:effectRef>
+          <a:fontRef idx="minor">
+            <a:schemeClr val="dk1"/>
+          </a:fontRef>
+        </p:style>
+        <p:txBody>
+          <a:bodyPr rtlCol="0" anchor="ctr"/>
+          <a:lstStyle/>
+          <a:p>
+            <a:r>
+              <a:rPr lang="en-US" sz="800">
+                <a:solidFill>
+                  <a:schemeClr val="bg1"/>
+                </a:solidFill>
+                <a:latin typeface="Arial" panose="020B0604020202020204" pitchFamily="34" charset="0"/>
+                <a:cs typeface="Arial" panose="020B0604020202020204" pitchFamily="34" charset="0"/>
+              </a:rPr>
+              <a:t>Win3(self, win_manager) </a:t>
+            </a:r>
+          </a:p>
+        </p:txBody>
+      </p:sp>
+      <p:sp>
+        <p:nvSpPr>
+          <p:cNvPr id="24" name="Rectangle: Folded Corner 23">
+            <a:extLst>
+              <a:ext uri="{FF2B5EF4-FFF2-40B4-BE49-F238E27FC236}">
+                <a16:creationId xmlns:a16="http://schemas.microsoft.com/office/drawing/2014/main" id="{F404C50B-90EA-4B4B-9321-3C1B39148959}"/>
+              </a:ext>
+            </a:extLst>
+          </p:cNvPr>
+          <p:cNvSpPr/>
+          <p:nvPr/>
+        </p:nvSpPr>
+        <p:spPr>
+          <a:xfrm>
+            <a:off x="6534225" y="2684240"/>
+            <a:ext cx="1934551" cy="341743"/>
+          </a:xfrm>
+          <a:prstGeom prst="foldedCorner">
+            <a:avLst/>
+          </a:prstGeom>
+          <a:solidFill>
+            <a:srgbClr val="FFFFCC"/>
+          </a:solidFill>
+          <a:ln w="9525" cap="flat" cmpd="sng" algn="ctr">
+            <a:solidFill>
+              <a:schemeClr val="dk1"/>
+            </a:solidFill>
+            <a:prstDash val="solid"/>
+            <a:round/>
+            <a:headEnd type="none" w="med" len="med"/>
+            <a:tailEnd type="none" w="med" len="med"/>
+          </a:ln>
+        </p:spPr>
+        <p:style>
+          <a:lnRef idx="0">
+            <a:scrgbClr r="0" g="0" b="0"/>
+          </a:lnRef>
+          <a:fillRef idx="0">
+            <a:scrgbClr r="0" g="0" b="0"/>
+          </a:fillRef>
+          <a:effectRef idx="0">
+            <a:scrgbClr r="0" g="0" b="0"/>
+          </a:effectRef>
+          <a:fontRef idx="minor">
+            <a:schemeClr val="dk1"/>
+          </a:fontRef>
+        </p:style>
+        <p:txBody>
+          <a:bodyPr rtlCol="0" anchor="ctr"/>
+          <a:lstStyle/>
+          <a:p>
+            <a:pPr marL="171450" indent="-171450">
+              <a:buFont typeface="Arial" panose="020B0604020202020204" pitchFamily="34" charset="0"/>
+              <a:buChar char="•"/>
+            </a:pPr>
+            <a:r>
+              <a:rPr lang="en-US" sz="800" b="1">
+                <a:solidFill>
+                  <a:schemeClr val="bg1"/>
+                </a:solidFill>
+                <a:latin typeface="Arial" panose="020B0604020202020204" pitchFamily="34" charset="0"/>
+                <a:cs typeface="Arial" panose="020B0604020202020204" pitchFamily="34" charset="0"/>
+              </a:rPr>
+              <a:t>self</a:t>
+            </a:r>
+            <a:r>
+              <a:rPr lang="en-US" sz="800">
+                <a:solidFill>
+                  <a:schemeClr val="bg1"/>
+                </a:solidFill>
+                <a:latin typeface="Arial" panose="020B0604020202020204" pitchFamily="34" charset="0"/>
+                <a:cs typeface="Arial" panose="020B0604020202020204" pitchFamily="34" charset="0"/>
+              </a:rPr>
+              <a:t> − This represents Win#.</a:t>
+            </a:r>
+          </a:p>
+          <a:p>
+            <a:pPr marL="171450" indent="-171450">
+              <a:buFont typeface="Arial" panose="020B0604020202020204" pitchFamily="34" charset="0"/>
+              <a:buChar char="•"/>
+            </a:pPr>
+            <a:r>
+              <a:rPr lang="en-US" sz="800" b="1">
+                <a:solidFill>
+                  <a:schemeClr val="bg1"/>
+                </a:solidFill>
+                <a:latin typeface="Arial" panose="020B0604020202020204" pitchFamily="34" charset="0"/>
+                <a:cs typeface="Arial" panose="020B0604020202020204" pitchFamily="34" charset="0"/>
+              </a:rPr>
+              <a:t>win_manager </a:t>
+            </a:r>
+            <a:r>
+              <a:rPr lang="en-US" sz="800">
+                <a:solidFill>
+                  <a:schemeClr val="bg1"/>
+                </a:solidFill>
+                <a:latin typeface="Arial" panose="020B0604020202020204" pitchFamily="34" charset="0"/>
+                <a:cs typeface="Arial" panose="020B0604020202020204" pitchFamily="34" charset="0"/>
+              </a:rPr>
+              <a:t>−View window</a:t>
+            </a:r>
+          </a:p>
+        </p:txBody>
+      </p:sp>
+      <p:sp>
+        <p:nvSpPr>
+          <p:cNvPr id="26" name="Rectangle 25">
+            <a:extLst>
+              <a:ext uri="{FF2B5EF4-FFF2-40B4-BE49-F238E27FC236}">
+                <a16:creationId xmlns:a16="http://schemas.microsoft.com/office/drawing/2014/main" id="{686327AA-1C35-4097-988A-F1B5623FC627}"/>
+              </a:ext>
+            </a:extLst>
+          </p:cNvPr>
+          <p:cNvSpPr/>
+          <p:nvPr/>
+        </p:nvSpPr>
+        <p:spPr>
+          <a:xfrm>
+            <a:off x="6534226" y="839989"/>
+            <a:ext cx="1934550" cy="1537451"/>
+          </a:xfrm>
+          <a:prstGeom prst="rect">
+            <a:avLst/>
+          </a:prstGeom>
+          <a:noFill/>
+          <a:ln w="9525" cap="flat" cmpd="sng" algn="ctr">
+            <a:solidFill>
+              <a:schemeClr val="dk1"/>
+            </a:solidFill>
+            <a:prstDash val="solid"/>
+            <a:round/>
+            <a:headEnd type="none" w="med" len="med"/>
+            <a:tailEnd type="none" w="med" len="med"/>
+          </a:ln>
+        </p:spPr>
+        <p:style>
+          <a:lnRef idx="0">
+            <a:scrgbClr r="0" g="0" b="0"/>
+          </a:lnRef>
+          <a:fillRef idx="0">
+            <a:scrgbClr r="0" g="0" b="0"/>
+          </a:fillRef>
+          <a:effectRef idx="0">
+            <a:scrgbClr r="0" g="0" b="0"/>
+          </a:effectRef>
+          <a:fontRef idx="minor">
+            <a:schemeClr val="dk1"/>
+          </a:fontRef>
+        </p:style>
+        <p:txBody>
+          <a:bodyPr rtlCol="0" anchor="t"/>
+          <a:lstStyle/>
+          <a:p>
+            <a:r>
+              <a:rPr lang="en-US" sz="800">
+                <a:solidFill>
+                  <a:schemeClr val="bg1"/>
+                </a:solidFill>
+                <a:latin typeface="Arial" panose="020B0604020202020204" pitchFamily="34" charset="0"/>
+                <a:cs typeface="Arial" panose="020B0604020202020204" pitchFamily="34" charset="0"/>
+              </a:rPr>
+              <a:t>Properties:</a:t>
+            </a:r>
+          </a:p>
+          <a:p>
+            <a:r>
+              <a:rPr lang="en-US" sz="800">
+                <a:solidFill>
+                  <a:schemeClr val="bg1"/>
+                </a:solidFill>
+                <a:latin typeface="Arial" panose="020B0604020202020204" pitchFamily="34" charset="0"/>
+                <a:cs typeface="Arial" panose="020B0604020202020204" pitchFamily="34" charset="0"/>
+              </a:rPr>
+              <a:t>win_manager</a:t>
+            </a:r>
+          </a:p>
+          <a:p>
+            <a:r>
+              <a:rPr lang="en-US" sz="800">
+                <a:solidFill>
+                  <a:schemeClr val="bg1"/>
+                </a:solidFill>
+                <a:latin typeface="Arial" panose="020B0604020202020204" pitchFamily="34" charset="0"/>
+                <a:cs typeface="Arial" panose="020B0604020202020204" pitchFamily="34" charset="0"/>
+              </a:rPr>
+              <a:t>App_Name</a:t>
+            </a:r>
+          </a:p>
+          <a:p>
+            <a:r>
+              <a:rPr lang="en-US" sz="800">
+                <a:solidFill>
+                  <a:schemeClr val="bg1"/>
+                </a:solidFill>
+                <a:latin typeface="Arial" panose="020B0604020202020204" pitchFamily="34" charset="0"/>
+                <a:cs typeface="Arial" panose="020B0604020202020204" pitchFamily="34" charset="0"/>
+              </a:rPr>
+              <a:t>MVC_App</a:t>
+            </a:r>
+          </a:p>
+          <a:p>
+            <a:r>
+              <a:rPr lang="en-US" sz="800">
+                <a:solidFill>
+                  <a:schemeClr val="bg1"/>
+                </a:solidFill>
+                <a:latin typeface="Arial" panose="020B0604020202020204" pitchFamily="34" charset="0"/>
+                <a:cs typeface="Arial" panose="020B0604020202020204" pitchFamily="34" charset="0"/>
+              </a:rPr>
+              <a:t>tkint</a:t>
+            </a:r>
+          </a:p>
+          <a:p>
+            <a:r>
+              <a:rPr lang="en-US" sz="800">
+                <a:solidFill>
+                  <a:schemeClr val="bg1"/>
+                </a:solidFill>
+                <a:latin typeface="Arial" panose="020B0604020202020204" pitchFamily="34" charset="0"/>
+                <a:cs typeface="Arial" panose="020B0604020202020204" pitchFamily="34" charset="0"/>
+              </a:rPr>
+              <a:t>app_</a:t>
+            </a:r>
+            <a:r>
+              <a:rPr lang="en-US" sz="800" err="1">
+                <a:solidFill>
+                  <a:schemeClr val="bg1"/>
+                </a:solidFill>
+                <a:latin typeface="Arial" panose="020B0604020202020204" pitchFamily="34" charset="0"/>
+                <a:cs typeface="Arial" panose="020B0604020202020204" pitchFamily="34" charset="0"/>
+              </a:rPr>
+              <a:t>window</a:t>
+            </a:r>
+            <a:endParaRPr lang="en-US" sz="800">
+              <a:solidFill>
+                <a:schemeClr val="bg1"/>
+              </a:solidFill>
+              <a:latin typeface="Arial" panose="020B0604020202020204" pitchFamily="34" charset="0"/>
+              <a:cs typeface="Arial" panose="020B0604020202020204" pitchFamily="34" charset="0"/>
+            </a:endParaRPr>
+          </a:p>
+          <a:p>
+            <a:endParaRPr lang="en-US" sz="800">
+              <a:solidFill>
+                <a:schemeClr val="bg1"/>
+              </a:solidFill>
+              <a:latin typeface="Arial" panose="020B0604020202020204" pitchFamily="34" charset="0"/>
+              <a:cs typeface="Arial" panose="020B0604020202020204" pitchFamily="34" charset="0"/>
+            </a:endParaRPr>
+          </a:p>
+          <a:p>
+            <a:r>
+              <a:rPr lang="en-US" sz="800">
+                <a:solidFill>
+                  <a:schemeClr val="bg1"/>
+                </a:solidFill>
+                <a:latin typeface="Arial" panose="020B0604020202020204" pitchFamily="34" charset="0"/>
+                <a:cs typeface="Arial" panose="020B0604020202020204" pitchFamily="34" charset="0"/>
+              </a:rPr>
+              <a:t>Methods:</a:t>
+            </a:r>
+            <a:br>
+              <a:rPr lang="en-US" sz="800">
+                <a:solidFill>
+                  <a:schemeClr val="bg1"/>
+                </a:solidFill>
+                <a:latin typeface="Arial" panose="020B0604020202020204" pitchFamily="34" charset="0"/>
+                <a:cs typeface="Arial" panose="020B0604020202020204" pitchFamily="34" charset="0"/>
+              </a:rPr>
+            </a:br>
+            <a:r>
+              <a:rPr lang="en-US" sz="800" err="1">
+                <a:solidFill>
+                  <a:schemeClr val="bg1"/>
+                </a:solidFill>
+                <a:latin typeface="Arial" panose="020B0604020202020204" pitchFamily="34" charset="0"/>
+                <a:cs typeface="Arial" panose="020B0604020202020204" pitchFamily="34" charset="0"/>
+              </a:rPr>
+              <a:t>show_widgets</a:t>
+            </a:r>
+            <a:r>
+              <a:rPr lang="en-US" sz="800">
+                <a:solidFill>
+                  <a:schemeClr val="bg1"/>
+                </a:solidFill>
+                <a:latin typeface="Arial" panose="020B0604020202020204" pitchFamily="34" charset="0"/>
+                <a:cs typeface="Arial" panose="020B0604020202020204" pitchFamily="34" charset="0"/>
+              </a:rPr>
+              <a:t>()</a:t>
+            </a:r>
+          </a:p>
+          <a:p>
+            <a:endParaRPr lang="en-US" sz="800">
+              <a:solidFill>
+                <a:schemeClr val="bg1"/>
+              </a:solidFill>
+              <a:latin typeface="Arial" panose="020B0604020202020204" pitchFamily="34" charset="0"/>
+              <a:cs typeface="Arial" panose="020B0604020202020204" pitchFamily="34" charset="0"/>
+            </a:endParaRPr>
           </a:p>
         </p:txBody>
       </p:sp>
     </p:spTree>
     <p:extLst>
       <p:ext uri="{BB962C8B-B14F-4D97-AF65-F5344CB8AC3E}">
-        <p14:creationId xmlns:p14="http://schemas.microsoft.com/office/powerpoint/2010/main" val="3371809264"/>
+        <p14:creationId xmlns:p14="http://schemas.microsoft.com/office/powerpoint/2010/main" val="1828974586"/>
       </p:ext>
     </p:extLst>
   </p:cSld>

</xml_diff>